<commit_message>
Ini yang lupa Commit
</commit_message>
<xml_diff>
--- a/Presentasi/Pertemuan 2 Pengenalan Algoritma.pptx
+++ b/Presentasi/Pertemuan 2 Pengenalan Algoritma.pptx
@@ -5,7 +5,7 @@
     <p:sldMasterId id="2147483648" r:id="rId1"/>
   </p:sldMasterIdLst>
   <p:notesMasterIdLst>
-    <p:notesMasterId r:id="rId30"/>
+    <p:notesMasterId r:id="rId33"/>
   </p:notesMasterIdLst>
   <p:sldIdLst>
     <p:sldId id="256" r:id="rId2"/>
@@ -23,8 +23,8 @@
     <p:sldId id="314" r:id="rId14"/>
     <p:sldId id="315" r:id="rId15"/>
     <p:sldId id="308" r:id="rId16"/>
-    <p:sldId id="316" r:id="rId17"/>
-    <p:sldId id="328" r:id="rId18"/>
+    <p:sldId id="328" r:id="rId17"/>
+    <p:sldId id="316" r:id="rId18"/>
     <p:sldId id="317" r:id="rId19"/>
     <p:sldId id="318" r:id="rId20"/>
     <p:sldId id="320" r:id="rId21"/>
@@ -33,9 +33,12 @@
     <p:sldId id="310" r:id="rId24"/>
     <p:sldId id="325" r:id="rId25"/>
     <p:sldId id="326" r:id="rId26"/>
-    <p:sldId id="323" r:id="rId27"/>
-    <p:sldId id="324" r:id="rId28"/>
-    <p:sldId id="327" r:id="rId29"/>
+    <p:sldId id="329" r:id="rId27"/>
+    <p:sldId id="331" r:id="rId28"/>
+    <p:sldId id="330" r:id="rId29"/>
+    <p:sldId id="323" r:id="rId30"/>
+    <p:sldId id="324" r:id="rId31"/>
+    <p:sldId id="327" r:id="rId32"/>
   </p:sldIdLst>
   <p:sldSz cx="9144000" cy="6858000" type="screen4x3"/>
   <p:notesSz cx="6858000" cy="9144000"/>
@@ -2841,7 +2844,7 @@
             <a:fld id="{896F413C-F42A-4503-9253-83800F056F65}" type="datetimeFigureOut">
               <a:rPr lang="id-ID" smtClean="0"/>
               <a:pPr/>
-              <a:t>29/08/2014</a:t>
+              <a:t>01/09/2014</a:t>
             </a:fld>
             <a:endParaRPr lang="id-ID"/>
           </a:p>
@@ -3105,6 +3108,88 @@
     </a:lvl9pPr>
   </p:notesStyle>
 </p:notesMaster>
+</file>
+
+<file path=ppt/notesSlides/notesSlide1.xml><?xml version="1.0" encoding="utf-8"?>
+<p:notes xmlns:a="http://schemas.openxmlformats.org/drawingml/2006/main" xmlns:r="http://schemas.openxmlformats.org/officeDocument/2006/relationships" xmlns:p="http://schemas.openxmlformats.org/presentationml/2006/main">
+  <p:cSld>
+    <p:spTree>
+      <p:nvGrpSpPr>
+        <p:cNvPr id="1" name=""/>
+        <p:cNvGrpSpPr/>
+        <p:nvPr/>
+      </p:nvGrpSpPr>
+      <p:grpSpPr>
+        <a:xfrm>
+          <a:off x="0" y="0"/>
+          <a:ext cx="0" cy="0"/>
+          <a:chOff x="0" y="0"/>
+          <a:chExt cx="0" cy="0"/>
+        </a:xfrm>
+      </p:grpSpPr>
+      <p:sp>
+        <p:nvSpPr>
+          <p:cNvPr id="2" name="Slide Image Placeholder 1"/>
+          <p:cNvSpPr>
+            <a:spLocks noGrp="1" noRot="1" noChangeAspect="1"/>
+          </p:cNvSpPr>
+          <p:nvPr>
+            <p:ph type="sldImg"/>
+          </p:nvPr>
+        </p:nvSpPr>
+        <p:spPr/>
+      </p:sp>
+      <p:sp>
+        <p:nvSpPr>
+          <p:cNvPr id="3" name="Notes Placeholder 2"/>
+          <p:cNvSpPr>
+            <a:spLocks noGrp="1"/>
+          </p:cNvSpPr>
+          <p:nvPr>
+            <p:ph type="body" idx="1"/>
+          </p:nvPr>
+        </p:nvSpPr>
+        <p:spPr/>
+        <p:txBody>
+          <a:bodyPr>
+            <a:normAutofit/>
+          </a:bodyPr>
+          <a:lstStyle/>
+          <a:p>
+            <a:endParaRPr lang="id-ID"/>
+          </a:p>
+        </p:txBody>
+      </p:sp>
+      <p:sp>
+        <p:nvSpPr>
+          <p:cNvPr id="4" name="Slide Number Placeholder 3"/>
+          <p:cNvSpPr>
+            <a:spLocks noGrp="1"/>
+          </p:cNvSpPr>
+          <p:nvPr>
+            <p:ph type="sldNum" sz="quarter" idx="10"/>
+          </p:nvPr>
+        </p:nvSpPr>
+        <p:spPr/>
+        <p:txBody>
+          <a:bodyPr/>
+          <a:lstStyle/>
+          <a:p>
+            <a:fld id="{86561E7F-7AC7-46DF-B899-FB3793C68EF4}" type="slidenum">
+              <a:rPr lang="id-ID" smtClean="0"/>
+              <a:pPr/>
+              <a:t>27</a:t>
+            </a:fld>
+            <a:endParaRPr lang="id-ID"/>
+          </a:p>
+        </p:txBody>
+      </p:sp>
+    </p:spTree>
+  </p:cSld>
+  <p:clrMapOvr>
+    <a:masterClrMapping/>
+  </p:clrMapOvr>
+</p:notes>
 </file>
 
 <file path=ppt/slideLayouts/slideLayout1.xml><?xml version="1.0" encoding="utf-8"?>
@@ -3289,7 +3374,7 @@
             <a:fld id="{27137818-48BE-4108-840E-3B8BFE735C18}" type="datetimeFigureOut">
               <a:rPr lang="id-ID" smtClean="0"/>
               <a:pPr/>
-              <a:t>29/08/2014</a:t>
+              <a:t>01/09/2014</a:t>
             </a:fld>
             <a:endParaRPr lang="id-ID"/>
           </a:p>
@@ -3456,7 +3541,7 @@
             <a:fld id="{27137818-48BE-4108-840E-3B8BFE735C18}" type="datetimeFigureOut">
               <a:rPr lang="id-ID" smtClean="0"/>
               <a:pPr/>
-              <a:t>29/08/2014</a:t>
+              <a:t>01/09/2014</a:t>
             </a:fld>
             <a:endParaRPr lang="id-ID"/>
           </a:p>
@@ -3633,7 +3718,7 @@
             <a:fld id="{27137818-48BE-4108-840E-3B8BFE735C18}" type="datetimeFigureOut">
               <a:rPr lang="id-ID" smtClean="0"/>
               <a:pPr/>
-              <a:t>29/08/2014</a:t>
+              <a:t>01/09/2014</a:t>
             </a:fld>
             <a:endParaRPr lang="id-ID"/>
           </a:p>
@@ -3800,7 +3885,7 @@
             <a:fld id="{27137818-48BE-4108-840E-3B8BFE735C18}" type="datetimeFigureOut">
               <a:rPr lang="id-ID" smtClean="0"/>
               <a:pPr/>
-              <a:t>29/08/2014</a:t>
+              <a:t>01/09/2014</a:t>
             </a:fld>
             <a:endParaRPr lang="id-ID"/>
           </a:p>
@@ -4043,7 +4128,7 @@
             <a:fld id="{27137818-48BE-4108-840E-3B8BFE735C18}" type="datetimeFigureOut">
               <a:rPr lang="id-ID" smtClean="0"/>
               <a:pPr/>
-              <a:t>29/08/2014</a:t>
+              <a:t>01/09/2014</a:t>
             </a:fld>
             <a:endParaRPr lang="id-ID"/>
           </a:p>
@@ -4328,7 +4413,7 @@
             <a:fld id="{27137818-48BE-4108-840E-3B8BFE735C18}" type="datetimeFigureOut">
               <a:rPr lang="id-ID" smtClean="0"/>
               <a:pPr/>
-              <a:t>29/08/2014</a:t>
+              <a:t>01/09/2014</a:t>
             </a:fld>
             <a:endParaRPr lang="id-ID"/>
           </a:p>
@@ -4747,7 +4832,7 @@
             <a:fld id="{27137818-48BE-4108-840E-3B8BFE735C18}" type="datetimeFigureOut">
               <a:rPr lang="id-ID" smtClean="0"/>
               <a:pPr/>
-              <a:t>29/08/2014</a:t>
+              <a:t>01/09/2014</a:t>
             </a:fld>
             <a:endParaRPr lang="id-ID"/>
           </a:p>
@@ -4862,7 +4947,7 @@
             <a:fld id="{27137818-48BE-4108-840E-3B8BFE735C18}" type="datetimeFigureOut">
               <a:rPr lang="id-ID" smtClean="0"/>
               <a:pPr/>
-              <a:t>29/08/2014</a:t>
+              <a:t>01/09/2014</a:t>
             </a:fld>
             <a:endParaRPr lang="id-ID"/>
           </a:p>
@@ -4954,7 +5039,7 @@
             <a:fld id="{27137818-48BE-4108-840E-3B8BFE735C18}" type="datetimeFigureOut">
               <a:rPr lang="id-ID" smtClean="0"/>
               <a:pPr/>
-              <a:t>29/08/2014</a:t>
+              <a:t>01/09/2014</a:t>
             </a:fld>
             <a:endParaRPr lang="id-ID"/>
           </a:p>
@@ -5228,7 +5313,7 @@
             <a:fld id="{27137818-48BE-4108-840E-3B8BFE735C18}" type="datetimeFigureOut">
               <a:rPr lang="id-ID" smtClean="0"/>
               <a:pPr/>
-              <a:t>29/08/2014</a:t>
+              <a:t>01/09/2014</a:t>
             </a:fld>
             <a:endParaRPr lang="id-ID"/>
           </a:p>
@@ -5478,7 +5563,7 @@
             <a:fld id="{27137818-48BE-4108-840E-3B8BFE735C18}" type="datetimeFigureOut">
               <a:rPr lang="id-ID" smtClean="0"/>
               <a:pPr/>
-              <a:t>29/08/2014</a:t>
+              <a:t>01/09/2014</a:t>
             </a:fld>
             <a:endParaRPr lang="id-ID"/>
           </a:p>
@@ -5751,7 +5836,7 @@
             <a:fld id="{27137818-48BE-4108-840E-3B8BFE735C18}" type="datetimeFigureOut">
               <a:rPr lang="id-ID" smtClean="0"/>
               <a:pPr/>
-              <a:t>29/08/2014</a:t>
+              <a:t>01/09/2014</a:t>
             </a:fld>
             <a:endParaRPr lang="id-ID"/>
           </a:p>
@@ -6587,7 +6672,7 @@
         <p:spPr/>
         <p:txBody>
           <a:bodyPr>
-            <a:normAutofit fontScale="92500" lnSpcReduction="10000"/>
+            <a:normAutofit fontScale="77500" lnSpcReduction="20000"/>
           </a:bodyPr>
           <a:lstStyle/>
           <a:p>
@@ -6605,6 +6690,15 @@
                 <a:latin typeface="Times New Roman" pitchFamily="18" charset="0"/>
                 <a:cs typeface="Times New Roman" pitchFamily="18" charset="0"/>
               </a:rPr>
+              <a:t>Butuh sebuah cara untuk merepresentasikan / mewakili informasi dari masalah dunia nyata menjadi informasi algoritma yang dimengerti oleh program komputer</a:t>
+            </a:r>
+          </a:p>
+          <a:p>
+            <a:r>
+              <a:rPr lang="id-ID" smtClean="0">
+                <a:latin typeface="Times New Roman" pitchFamily="18" charset="0"/>
+                <a:cs typeface="Times New Roman" pitchFamily="18" charset="0"/>
+              </a:rPr>
               <a:t>Berbagai tipe data dasar antara lain : </a:t>
             </a:r>
           </a:p>
@@ -6659,6 +6753,9 @@
             </a:r>
           </a:p>
           <a:p>
+            <a:pPr>
+              <a:buNone/>
+            </a:pPr>
             <a:r>
               <a:rPr lang="id-ID" smtClean="0">
                 <a:latin typeface="Times New Roman" pitchFamily="18" charset="0"/>
@@ -6773,7 +6870,7 @@
                 <a:latin typeface="Times New Roman" pitchFamily="18" charset="0"/>
                 <a:cs typeface="Times New Roman" pitchFamily="18" charset="0"/>
               </a:rPr>
-              <a:t>Variable biasanya digunakan untuk menampung data yang nilainya akan diubah kembali atau akan dipakai kembali</a:t>
+              <a:t>Variable digunakan untuk menampung data yang nilainya akan diubah kembali atau akan dipakai kembali</a:t>
             </a:r>
           </a:p>
           <a:p>
@@ -6876,7 +6973,7 @@
         <p:spPr/>
         <p:txBody>
           <a:bodyPr>
-            <a:normAutofit fontScale="85000" lnSpcReduction="10000"/>
+            <a:normAutofit fontScale="85000" lnSpcReduction="20000"/>
           </a:bodyPr>
           <a:lstStyle/>
           <a:p>
@@ -6886,6 +6983,15 @@
                 <a:cs typeface="Times New Roman" pitchFamily="18" charset="0"/>
               </a:rPr>
               <a:t>Penamaan variabel sebaiknya eksplisit sesuai dengan tujuan dari pembuatan variabel tersebut. </a:t>
+            </a:r>
+          </a:p>
+          <a:p>
+            <a:r>
+              <a:rPr lang="id-ID" smtClean="0">
+                <a:latin typeface="Times New Roman" pitchFamily="18" charset="0"/>
+                <a:cs typeface="Times New Roman" pitchFamily="18" charset="0"/>
+              </a:rPr>
+              <a:t>Penamaan variabel tidak boleh melibatkan spasi !</a:t>
             </a:r>
           </a:p>
           <a:p>
@@ -7065,8 +7171,8 @@
         </p:blipFill>
         <p:spPr bwMode="auto">
           <a:xfrm>
-            <a:off x="2133600" y="4953000"/>
-            <a:ext cx="5534025" cy="1219200"/>
+            <a:off x="990600" y="4953000"/>
+            <a:ext cx="7580114" cy="1669973"/>
           </a:xfrm>
           <a:prstGeom prst="rect">
             <a:avLst/>
@@ -7118,148 +7224,21 @@
         </p:nvSpPr>
         <p:spPr/>
         <p:txBody>
-          <a:bodyPr/>
+          <a:bodyPr>
+            <a:normAutofit fontScale="90000"/>
+          </a:bodyPr>
           <a:lstStyle/>
           <a:p>
             <a:r>
-              <a:rPr lang="id-ID" smtClean="0">
-                <a:latin typeface="Times New Roman" pitchFamily="18" charset="0"/>
-                <a:cs typeface="Times New Roman" pitchFamily="18" charset="0"/>
-              </a:rPr>
-              <a:t>Variable &amp; Tipe Data pada Python</a:t>
-            </a:r>
-            <a:endParaRPr lang="id-ID">
-              <a:latin typeface="Times New Roman" pitchFamily="18" charset="0"/>
-              <a:cs typeface="Times New Roman" pitchFamily="18" charset="0"/>
-            </a:endParaRPr>
-          </a:p>
-        </p:txBody>
-      </p:sp>
-      <p:sp>
-        <p:nvSpPr>
-          <p:cNvPr id="3" name="Content Placeholder 2"/>
-          <p:cNvSpPr>
-            <a:spLocks noGrp="1"/>
-          </p:cNvSpPr>
-          <p:nvPr>
-            <p:ph idx="1"/>
-          </p:nvPr>
-        </p:nvSpPr>
-        <p:spPr/>
-        <p:txBody>
-          <a:bodyPr/>
-          <a:lstStyle/>
-          <a:p>
-            <a:r>
-              <a:rPr lang="id-ID" smtClean="0">
-                <a:latin typeface="Times New Roman" pitchFamily="18" charset="0"/>
-                <a:cs typeface="Times New Roman" pitchFamily="18" charset="0"/>
-              </a:rPr>
-              <a:t>Pada Python, tipe data dari variabel tidak perlu dideklarasikan secara spesifik. (Dynamic-Type Language)</a:t>
-            </a:r>
-          </a:p>
-          <a:p>
-            <a:r>
-              <a:rPr lang="id-ID" smtClean="0">
-                <a:latin typeface="Times New Roman" pitchFamily="18" charset="0"/>
-                <a:cs typeface="Times New Roman" pitchFamily="18" charset="0"/>
-              </a:rPr>
-              <a:t>Pada python, penamaan variable bersifat case-sensitive</a:t>
-            </a:r>
-          </a:p>
-          <a:p>
-            <a:r>
-              <a:rPr lang="id-ID" smtClean="0">
-                <a:latin typeface="Times New Roman" pitchFamily="18" charset="0"/>
-                <a:cs typeface="Times New Roman" pitchFamily="18" charset="0"/>
-              </a:rPr>
-              <a:t>Pada python, Jangan menamai variabel dengan kata – kata dibawah ini : </a:t>
-            </a:r>
-          </a:p>
-          <a:p>
-            <a:endParaRPr lang="id-ID">
-              <a:latin typeface="Times New Roman" pitchFamily="18" charset="0"/>
-              <a:cs typeface="Times New Roman" pitchFamily="18" charset="0"/>
-            </a:endParaRPr>
-          </a:p>
-        </p:txBody>
-      </p:sp>
-      <p:pic>
-        <p:nvPicPr>
-          <p:cNvPr id="1026" name="Picture 2"/>
-          <p:cNvPicPr>
-            <a:picLocks noChangeAspect="1" noChangeArrowheads="1"/>
-          </p:cNvPicPr>
-          <p:nvPr/>
-        </p:nvPicPr>
-        <p:blipFill>
-          <a:blip r:embed="rId2"/>
-          <a:srcRect/>
-          <a:stretch>
-            <a:fillRect/>
-          </a:stretch>
-        </p:blipFill>
-        <p:spPr bwMode="auto">
-          <a:xfrm>
-            <a:off x="2133600" y="5334000"/>
-            <a:ext cx="5534025" cy="1219200"/>
-          </a:xfrm>
-          <a:prstGeom prst="rect">
-            <a:avLst/>
-          </a:prstGeom>
-          <a:noFill/>
-          <a:ln w="9525">
-            <a:noFill/>
-            <a:miter lim="800000"/>
-            <a:headEnd/>
-            <a:tailEnd/>
-          </a:ln>
-          <a:effectLst/>
-        </p:spPr>
-      </p:pic>
-    </p:spTree>
-  </p:cSld>
-  <p:clrMapOvr>
-    <a:masterClrMapping/>
-  </p:clrMapOvr>
-</p:sld>
-</file>
-
-<file path=ppt/slides/slide17.xml><?xml version="1.0" encoding="utf-8"?>
-<p:sld xmlns:a="http://schemas.openxmlformats.org/drawingml/2006/main" xmlns:r="http://schemas.openxmlformats.org/officeDocument/2006/relationships" xmlns:p="http://schemas.openxmlformats.org/presentationml/2006/main">
-  <p:cSld>
-    <p:spTree>
-      <p:nvGrpSpPr>
-        <p:cNvPr id="1" name=""/>
-        <p:cNvGrpSpPr/>
-        <p:nvPr/>
-      </p:nvGrpSpPr>
-      <p:grpSpPr>
-        <a:xfrm>
-          <a:off x="0" y="0"/>
-          <a:ext cx="0" cy="0"/>
-          <a:chOff x="0" y="0"/>
-          <a:chExt cx="0" cy="0"/>
-        </a:xfrm>
-      </p:grpSpPr>
-      <p:sp>
-        <p:nvSpPr>
-          <p:cNvPr id="2" name="Title 1"/>
-          <p:cNvSpPr>
-            <a:spLocks noGrp="1"/>
-          </p:cNvSpPr>
-          <p:nvPr>
-            <p:ph type="title"/>
-          </p:nvPr>
-        </p:nvSpPr>
-        <p:spPr/>
-        <p:txBody>
-          <a:bodyPr/>
-          <a:lstStyle/>
-          <a:p>
-            <a:r>
               <a:rPr lang="id-ID" smtClean="0"/>
-              <a:t>Deklarasi dan Pemberian Nilai</a:t>
+              <a:t>Pemberian Nilai Variable Pada Python</a:t>
+            </a:r>
+            <a:br>
+              <a:rPr lang="id-ID" smtClean="0"/>
+            </a:br>
+            <a:r>
+              <a:rPr lang="id-ID" smtClean="0"/>
+              <a:t>(Assignment)</a:t>
             </a:r>
             <a:endParaRPr lang="id-ID"/>
           </a:p>
@@ -7339,6 +7318,142 @@
           <a:xfrm>
             <a:off x="1143000" y="3200400"/>
             <a:ext cx="6583363" cy="1676400"/>
+          </a:xfrm>
+          <a:prstGeom prst="rect">
+            <a:avLst/>
+          </a:prstGeom>
+          <a:noFill/>
+          <a:ln w="9525">
+            <a:noFill/>
+            <a:miter lim="800000"/>
+            <a:headEnd/>
+            <a:tailEnd/>
+          </a:ln>
+          <a:effectLst/>
+        </p:spPr>
+      </p:pic>
+    </p:spTree>
+  </p:cSld>
+  <p:clrMapOvr>
+    <a:masterClrMapping/>
+  </p:clrMapOvr>
+</p:sld>
+</file>
+
+<file path=ppt/slides/slide17.xml><?xml version="1.0" encoding="utf-8"?>
+<p:sld xmlns:a="http://schemas.openxmlformats.org/drawingml/2006/main" xmlns:r="http://schemas.openxmlformats.org/officeDocument/2006/relationships" xmlns:p="http://schemas.openxmlformats.org/presentationml/2006/main">
+  <p:cSld>
+    <p:spTree>
+      <p:nvGrpSpPr>
+        <p:cNvPr id="1" name=""/>
+        <p:cNvGrpSpPr/>
+        <p:nvPr/>
+      </p:nvGrpSpPr>
+      <p:grpSpPr>
+        <a:xfrm>
+          <a:off x="0" y="0"/>
+          <a:ext cx="0" cy="0"/>
+          <a:chOff x="0" y="0"/>
+          <a:chExt cx="0" cy="0"/>
+        </a:xfrm>
+      </p:grpSpPr>
+      <p:sp>
+        <p:nvSpPr>
+          <p:cNvPr id="2" name="Title 1"/>
+          <p:cNvSpPr>
+            <a:spLocks noGrp="1"/>
+          </p:cNvSpPr>
+          <p:nvPr>
+            <p:ph type="title"/>
+          </p:nvPr>
+        </p:nvSpPr>
+        <p:spPr/>
+        <p:txBody>
+          <a:bodyPr/>
+          <a:lstStyle/>
+          <a:p>
+            <a:r>
+              <a:rPr lang="id-ID" smtClean="0">
+                <a:latin typeface="Times New Roman" pitchFamily="18" charset="0"/>
+                <a:cs typeface="Times New Roman" pitchFamily="18" charset="0"/>
+              </a:rPr>
+              <a:t>Variable &amp; Tipe Data pada Python</a:t>
+            </a:r>
+            <a:endParaRPr lang="id-ID">
+              <a:latin typeface="Times New Roman" pitchFamily="18" charset="0"/>
+              <a:cs typeface="Times New Roman" pitchFamily="18" charset="0"/>
+            </a:endParaRPr>
+          </a:p>
+        </p:txBody>
+      </p:sp>
+      <p:sp>
+        <p:nvSpPr>
+          <p:cNvPr id="3" name="Content Placeholder 2"/>
+          <p:cNvSpPr>
+            <a:spLocks noGrp="1"/>
+          </p:cNvSpPr>
+          <p:nvPr>
+            <p:ph idx="1"/>
+          </p:nvPr>
+        </p:nvSpPr>
+        <p:spPr/>
+        <p:txBody>
+          <a:bodyPr/>
+          <a:lstStyle/>
+          <a:p>
+            <a:r>
+              <a:rPr lang="id-ID" smtClean="0">
+                <a:latin typeface="Times New Roman" pitchFamily="18" charset="0"/>
+                <a:cs typeface="Times New Roman" pitchFamily="18" charset="0"/>
+              </a:rPr>
+              <a:t>Pada Python, tipe data dari variabel tidak perlu dideklarasikan secara spesifik. (Dynamic-Type Language)</a:t>
+            </a:r>
+          </a:p>
+          <a:p>
+            <a:r>
+              <a:rPr lang="id-ID" smtClean="0">
+                <a:latin typeface="Times New Roman" pitchFamily="18" charset="0"/>
+                <a:cs typeface="Times New Roman" pitchFamily="18" charset="0"/>
+              </a:rPr>
+              <a:t>Pada python, penamaan variable bersifat case-sensitive</a:t>
+            </a:r>
+          </a:p>
+          <a:p>
+            <a:r>
+              <a:rPr lang="id-ID" smtClean="0">
+                <a:latin typeface="Times New Roman" pitchFamily="18" charset="0"/>
+                <a:cs typeface="Times New Roman" pitchFamily="18" charset="0"/>
+              </a:rPr>
+              <a:t>Pada python, Jangan menamai variabel dengan kata – kata dibawah ini : </a:t>
+            </a:r>
+          </a:p>
+          <a:p>
+            <a:endParaRPr lang="id-ID">
+              <a:latin typeface="Times New Roman" pitchFamily="18" charset="0"/>
+              <a:cs typeface="Times New Roman" pitchFamily="18" charset="0"/>
+            </a:endParaRPr>
+          </a:p>
+        </p:txBody>
+      </p:sp>
+      <p:pic>
+        <p:nvPicPr>
+          <p:cNvPr id="1026" name="Picture 2"/>
+          <p:cNvPicPr>
+            <a:picLocks noChangeAspect="1" noChangeArrowheads="1"/>
+          </p:cNvPicPr>
+          <p:nvPr/>
+        </p:nvPicPr>
+        <p:blipFill>
+          <a:blip r:embed="rId2"/>
+          <a:srcRect/>
+          <a:stretch>
+            <a:fillRect/>
+          </a:stretch>
+        </p:blipFill>
+        <p:spPr bwMode="auto">
+          <a:xfrm>
+            <a:off x="2133600" y="5334000"/>
+            <a:ext cx="5534025" cy="1219200"/>
           </a:xfrm>
           <a:prstGeom prst="rect">
             <a:avLst/>
@@ -9354,9 +9469,7 @@
         </p:nvSpPr>
         <p:spPr/>
         <p:txBody>
-          <a:bodyPr>
-            <a:normAutofit fontScale="90000"/>
-          </a:bodyPr>
+          <a:bodyPr/>
           <a:lstStyle/>
           <a:p>
             <a:r>
@@ -9364,7 +9477,22 @@
                 <a:latin typeface="Times New Roman" pitchFamily="18" charset="0"/>
                 <a:cs typeface="Times New Roman" pitchFamily="18" charset="0"/>
               </a:rPr>
-              <a:t>Gaya Input pada Pemrograman Normal</a:t>
+              <a:t>Algoritma : Masalah </a:t>
+            </a:r>
+            <a:r>
+              <a:rPr lang="id-ID" smtClean="0">
+                <a:latin typeface="Times New Roman" pitchFamily="18" charset="0"/>
+                <a:cs typeface="Times New Roman" pitchFamily="18" charset="0"/>
+                <a:sym typeface="Wingdings" pitchFamily="2" charset="2"/>
+              </a:rPr>
+              <a:t> </a:t>
+            </a:r>
+            <a:r>
+              <a:rPr lang="id-ID" smtClean="0">
+                <a:latin typeface="Times New Roman" pitchFamily="18" charset="0"/>
+                <a:cs typeface="Times New Roman" pitchFamily="18" charset="0"/>
+              </a:rPr>
+              <a:t>Input</a:t>
             </a:r>
             <a:endParaRPr lang="id-ID">
               <a:latin typeface="Times New Roman" pitchFamily="18" charset="0"/>
@@ -9373,84 +9501,182 @@
           </a:p>
         </p:txBody>
       </p:sp>
-      <p:sp>
-        <p:nvSpPr>
-          <p:cNvPr id="3" name="Content Placeholder 2"/>
-          <p:cNvSpPr>
-            <a:spLocks noGrp="1"/>
-          </p:cNvSpPr>
-          <p:nvPr>
-            <p:ph idx="1"/>
-          </p:nvPr>
-        </p:nvSpPr>
-        <p:spPr/>
-        <p:txBody>
-          <a:bodyPr/>
-          <a:lstStyle/>
-          <a:p>
-            <a:r>
-              <a:rPr lang="id-ID" smtClean="0">
-                <a:latin typeface="Times New Roman" pitchFamily="18" charset="0"/>
-                <a:cs typeface="Times New Roman" pitchFamily="18" charset="0"/>
-              </a:rPr>
-              <a:t>Menghitung Luas Persegi Panjang</a:t>
-            </a:r>
-          </a:p>
-          <a:p>
-            <a:r>
-              <a:rPr lang="id-ID" smtClean="0">
-                <a:latin typeface="Times New Roman" pitchFamily="18" charset="0"/>
-                <a:cs typeface="Times New Roman" pitchFamily="18" charset="0"/>
-              </a:rPr>
-              <a:t>Menghitung Luas Lingkaran</a:t>
-            </a:r>
-          </a:p>
-          <a:p>
-            <a:r>
-              <a:rPr lang="id-ID" smtClean="0">
-                <a:latin typeface="Times New Roman" pitchFamily="18" charset="0"/>
-                <a:cs typeface="Times New Roman" pitchFamily="18" charset="0"/>
-              </a:rPr>
-              <a:t>Konversi Suhu</a:t>
-            </a:r>
-          </a:p>
-          <a:p>
-            <a:r>
-              <a:rPr lang="id-ID" smtClean="0">
-                <a:latin typeface="Times New Roman" pitchFamily="18" charset="0"/>
-                <a:cs typeface="Times New Roman" pitchFamily="18" charset="0"/>
-              </a:rPr>
-              <a:t>Mencari titik tengah dari 2 buah titik</a:t>
-            </a:r>
-          </a:p>
-          <a:p>
-            <a:r>
-              <a:rPr lang="id-ID" smtClean="0">
-                <a:latin typeface="Times New Roman" pitchFamily="18" charset="0"/>
-                <a:cs typeface="Times New Roman" pitchFamily="18" charset="0"/>
-              </a:rPr>
-              <a:t>Detik ke Menit</a:t>
-            </a:r>
-          </a:p>
-          <a:p>
-            <a:endParaRPr lang="id-ID" smtClean="0">
-              <a:latin typeface="Times New Roman" pitchFamily="18" charset="0"/>
-              <a:cs typeface="Times New Roman" pitchFamily="18" charset="0"/>
-            </a:endParaRPr>
-          </a:p>
-          <a:p>
-            <a:endParaRPr lang="id-ID">
-              <a:latin typeface="Times New Roman" pitchFamily="18" charset="0"/>
-              <a:cs typeface="Times New Roman" pitchFamily="18" charset="0"/>
-            </a:endParaRPr>
-          </a:p>
-        </p:txBody>
-      </p:sp>
+      <p:grpSp>
+        <p:nvGrpSpPr>
+          <p:cNvPr id="8" name="Group 7"/>
+          <p:cNvGrpSpPr/>
+          <p:nvPr/>
+        </p:nvGrpSpPr>
+        <p:grpSpPr>
+          <a:xfrm>
+            <a:off x="2057400" y="1752600"/>
+            <a:ext cx="5067300" cy="4762500"/>
+            <a:chOff x="2057400" y="1752600"/>
+            <a:chExt cx="5067300" cy="4762500"/>
+          </a:xfrm>
+        </p:grpSpPr>
+        <p:pic>
+          <p:nvPicPr>
+            <p:cNvPr id="4" name="Picture 8" descr="D:\Users\GrandCross\Desktop\Transparant Bahan Ajar\gelas.png"/>
+            <p:cNvPicPr>
+              <a:picLocks noChangeAspect="1" noChangeArrowheads="1"/>
+            </p:cNvPicPr>
+            <p:nvPr/>
+          </p:nvPicPr>
+          <p:blipFill>
+            <a:blip r:embed="rId2"/>
+            <a:srcRect/>
+            <a:stretch>
+              <a:fillRect/>
+            </a:stretch>
+          </p:blipFill>
+          <p:spPr bwMode="auto">
+            <a:xfrm>
+              <a:off x="5105400" y="3124200"/>
+              <a:ext cx="2019300" cy="3390900"/>
+            </a:xfrm>
+            <a:prstGeom prst="rect">
+              <a:avLst/>
+            </a:prstGeom>
+            <a:noFill/>
+          </p:spPr>
+        </p:pic>
+        <p:pic>
+          <p:nvPicPr>
+            <p:cNvPr id="5" name="Picture 8" descr="D:\Users\GrandCross\Desktop\Transparant Bahan Ajar\gelas.png"/>
+            <p:cNvPicPr>
+              <a:picLocks noChangeAspect="1" noChangeArrowheads="1"/>
+            </p:cNvPicPr>
+            <p:nvPr/>
+          </p:nvPicPr>
+          <p:blipFill>
+            <a:blip r:embed="rId2">
+              <a:duotone>
+                <a:prstClr val="black"/>
+                <a:schemeClr val="bg1">
+                  <a:lumMod val="95000"/>
+                  <a:tint val="45000"/>
+                  <a:satMod val="400000"/>
+                </a:schemeClr>
+              </a:duotone>
+            </a:blip>
+            <a:srcRect/>
+            <a:stretch>
+              <a:fillRect/>
+            </a:stretch>
+          </p:blipFill>
+          <p:spPr bwMode="auto">
+            <a:xfrm>
+              <a:off x="2057400" y="3048000"/>
+              <a:ext cx="2019300" cy="3390900"/>
+            </a:xfrm>
+            <a:prstGeom prst="rect">
+              <a:avLst/>
+            </a:prstGeom>
+            <a:noFill/>
+          </p:spPr>
+        </p:pic>
+        <p:sp>
+          <p:nvSpPr>
+            <p:cNvPr id="6" name="Rectangle 5"/>
+            <p:cNvSpPr/>
+            <p:nvPr/>
+          </p:nvSpPr>
+          <p:spPr>
+            <a:xfrm>
+              <a:off x="2514600" y="1752600"/>
+              <a:ext cx="1074333" cy="1569660"/>
+            </a:xfrm>
+            <a:prstGeom prst="rect">
+              <a:avLst/>
+            </a:prstGeom>
+          </p:spPr>
+          <p:txBody>
+            <a:bodyPr wrap="none">
+              <a:spAutoFit/>
+            </a:bodyPr>
+            <a:lstStyle/>
+            <a:p>
+              <a:r>
+                <a:rPr lang="id-ID" sz="9600" smtClean="0">
+                  <a:solidFill>
+                    <a:schemeClr val="tx2">
+                      <a:lumMod val="75000"/>
+                    </a:schemeClr>
+                  </a:solidFill>
+                  <a:effectLst>
+                    <a:outerShdw blurRad="38100" dist="38100" dir="2700000" algn="tl">
+                      <a:srgbClr val="000000">
+                        <a:alpha val="43137"/>
+                      </a:srgbClr>
+                    </a:outerShdw>
+                  </a:effectLst>
+                  <a:latin typeface="Times New Roman" pitchFamily="18" charset="0"/>
+                  <a:cs typeface="Times New Roman" pitchFamily="18" charset="0"/>
+                </a:rPr>
+                <a:t>A</a:t>
+              </a:r>
+              <a:endParaRPr lang="id-ID" sz="9600"/>
+            </a:p>
+          </p:txBody>
+        </p:sp>
+        <p:sp>
+          <p:nvSpPr>
+            <p:cNvPr id="7" name="Rectangle 6"/>
+            <p:cNvSpPr/>
+            <p:nvPr/>
+          </p:nvSpPr>
+          <p:spPr>
+            <a:xfrm>
+              <a:off x="5638800" y="1752600"/>
+              <a:ext cx="1005403" cy="1569660"/>
+            </a:xfrm>
+            <a:prstGeom prst="rect">
+              <a:avLst/>
+            </a:prstGeom>
+          </p:spPr>
+          <p:txBody>
+            <a:bodyPr wrap="none">
+              <a:spAutoFit/>
+            </a:bodyPr>
+            <a:lstStyle/>
+            <a:p>
+              <a:r>
+                <a:rPr lang="id-ID" sz="9600" smtClean="0">
+                  <a:solidFill>
+                    <a:schemeClr val="tx2">
+                      <a:lumMod val="75000"/>
+                    </a:schemeClr>
+                  </a:solidFill>
+                  <a:effectLst>
+                    <a:outerShdw blurRad="38100" dist="38100" dir="2700000" algn="tl">
+                      <a:srgbClr val="000000">
+                        <a:alpha val="43137"/>
+                      </a:srgbClr>
+                    </a:outerShdw>
+                  </a:effectLst>
+                  <a:latin typeface="Times New Roman" pitchFamily="18" charset="0"/>
+                  <a:cs typeface="Times New Roman" pitchFamily="18" charset="0"/>
+                </a:rPr>
+                <a:t>B</a:t>
+              </a:r>
+              <a:endParaRPr lang="id-ID" sz="9600"/>
+            </a:p>
+          </p:txBody>
+        </p:sp>
+      </p:grpSp>
     </p:spTree>
   </p:cSld>
   <p:clrMapOvr>
     <a:masterClrMapping/>
   </p:clrMapOvr>
+  <p:timing>
+    <p:tnLst>
+      <p:par>
+        <p:cTn id="1" dur="indefinite" restart="never" nodeType="tmRoot"/>
+      </p:par>
+    </p:tnLst>
+  </p:timing>
 </p:sld>
 </file>
 
@@ -9483,9 +9709,7 @@
         </p:nvSpPr>
         <p:spPr/>
         <p:txBody>
-          <a:bodyPr>
-            <a:normAutofit fontScale="90000"/>
-          </a:bodyPr>
+          <a:bodyPr/>
           <a:lstStyle/>
           <a:p>
             <a:r>
@@ -9493,7 +9717,22 @@
                 <a:latin typeface="Times New Roman" pitchFamily="18" charset="0"/>
                 <a:cs typeface="Times New Roman" pitchFamily="18" charset="0"/>
               </a:rPr>
-              <a:t>Gaya Input pada Kontes Pemrograman</a:t>
+              <a:t>Algoritma : Algoritma </a:t>
+            </a:r>
+            <a:r>
+              <a:rPr lang="id-ID" smtClean="0">
+                <a:latin typeface="Times New Roman" pitchFamily="18" charset="0"/>
+                <a:cs typeface="Times New Roman" pitchFamily="18" charset="0"/>
+                <a:sym typeface="Wingdings" pitchFamily="2" charset="2"/>
+              </a:rPr>
+              <a:t> </a:t>
+            </a:r>
+            <a:r>
+              <a:rPr lang="id-ID" smtClean="0">
+                <a:latin typeface="Times New Roman" pitchFamily="18" charset="0"/>
+                <a:cs typeface="Times New Roman" pitchFamily="18" charset="0"/>
+              </a:rPr>
+              <a:t>Proses</a:t>
             </a:r>
             <a:endParaRPr lang="id-ID">
               <a:latin typeface="Times New Roman" pitchFamily="18" charset="0"/>
@@ -9502,67 +9741,329 @@
           </a:p>
         </p:txBody>
       </p:sp>
+      <p:grpSp>
+        <p:nvGrpSpPr>
+          <p:cNvPr id="3" name="Group 19"/>
+          <p:cNvGrpSpPr/>
+          <p:nvPr/>
+        </p:nvGrpSpPr>
+        <p:grpSpPr>
+          <a:xfrm>
+            <a:off x="152400" y="1600200"/>
+            <a:ext cx="5029200" cy="3048000"/>
+            <a:chOff x="152400" y="1600200"/>
+            <a:chExt cx="5029200" cy="3048000"/>
+          </a:xfrm>
+        </p:grpSpPr>
+        <p:pic>
+          <p:nvPicPr>
+            <p:cNvPr id="1032" name="Picture 8" descr="D:\Users\GrandCross\Desktop\Transparant Bahan Ajar\gelas.png"/>
+            <p:cNvPicPr>
+              <a:picLocks noChangeAspect="1" noChangeArrowheads="1"/>
+            </p:cNvPicPr>
+            <p:nvPr/>
+          </p:nvPicPr>
+          <p:blipFill>
+            <a:blip r:embed="rId3"/>
+            <a:srcRect/>
+            <a:stretch>
+              <a:fillRect/>
+            </a:stretch>
+          </p:blipFill>
+          <p:spPr bwMode="auto">
+            <a:xfrm>
+              <a:off x="152400" y="2497615"/>
+              <a:ext cx="1169068" cy="2149652"/>
+            </a:xfrm>
+            <a:prstGeom prst="rect">
+              <a:avLst/>
+            </a:prstGeom>
+            <a:noFill/>
+          </p:spPr>
+        </p:pic>
+        <p:pic>
+          <p:nvPicPr>
+            <p:cNvPr id="14" name="Picture 8" descr="D:\Users\GrandCross\Desktop\Transparant Bahan Ajar\gelas.png"/>
+            <p:cNvPicPr>
+              <a:picLocks noChangeAspect="1" noChangeArrowheads="1"/>
+            </p:cNvPicPr>
+            <p:nvPr/>
+          </p:nvPicPr>
+          <p:blipFill>
+            <a:blip r:embed="rId3">
+              <a:duotone>
+                <a:prstClr val="black"/>
+                <a:schemeClr val="bg1">
+                  <a:lumMod val="95000"/>
+                  <a:tint val="45000"/>
+                  <a:satMod val="400000"/>
+                </a:schemeClr>
+              </a:duotone>
+            </a:blip>
+            <a:srcRect/>
+            <a:stretch>
+              <a:fillRect/>
+            </a:stretch>
+          </p:blipFill>
+          <p:spPr bwMode="auto">
+            <a:xfrm>
+              <a:off x="1872916" y="2497615"/>
+              <a:ext cx="1169068" cy="2149652"/>
+            </a:xfrm>
+            <a:prstGeom prst="rect">
+              <a:avLst/>
+            </a:prstGeom>
+            <a:noFill/>
+          </p:spPr>
+        </p:pic>
+        <p:sp>
+          <p:nvSpPr>
+            <p:cNvPr id="15" name="Rectangle 14"/>
+            <p:cNvSpPr/>
+            <p:nvPr/>
+          </p:nvSpPr>
+          <p:spPr>
+            <a:xfrm>
+              <a:off x="417095" y="1676400"/>
+              <a:ext cx="591829" cy="769441"/>
+            </a:xfrm>
+            <a:prstGeom prst="rect">
+              <a:avLst/>
+            </a:prstGeom>
+          </p:spPr>
+          <p:txBody>
+            <a:bodyPr wrap="none">
+              <a:spAutoFit/>
+            </a:bodyPr>
+            <a:lstStyle/>
+            <a:p>
+              <a:r>
+                <a:rPr lang="id-ID" sz="4400" smtClean="0">
+                  <a:solidFill>
+                    <a:schemeClr val="tx2">
+                      <a:lumMod val="75000"/>
+                    </a:schemeClr>
+                  </a:solidFill>
+                  <a:effectLst>
+                    <a:outerShdw blurRad="38100" dist="38100" dir="2700000" algn="tl">
+                      <a:srgbClr val="000000">
+                        <a:alpha val="43137"/>
+                      </a:srgbClr>
+                    </a:outerShdw>
+                  </a:effectLst>
+                  <a:latin typeface="Times New Roman" pitchFamily="18" charset="0"/>
+                  <a:cs typeface="Times New Roman" pitchFamily="18" charset="0"/>
+                </a:rPr>
+                <a:t>A</a:t>
+              </a:r>
+              <a:endParaRPr lang="id-ID" sz="4400"/>
+            </a:p>
+          </p:txBody>
+        </p:sp>
+        <p:sp>
+          <p:nvSpPr>
+            <p:cNvPr id="16" name="Rectangle 15"/>
+            <p:cNvSpPr/>
+            <p:nvPr/>
+          </p:nvSpPr>
+          <p:spPr>
+            <a:xfrm>
+              <a:off x="2225842" y="1676400"/>
+              <a:ext cx="561372" cy="769441"/>
+            </a:xfrm>
+            <a:prstGeom prst="rect">
+              <a:avLst/>
+            </a:prstGeom>
+          </p:spPr>
+          <p:txBody>
+            <a:bodyPr wrap="none">
+              <a:spAutoFit/>
+            </a:bodyPr>
+            <a:lstStyle/>
+            <a:p>
+              <a:r>
+                <a:rPr lang="id-ID" sz="4400" smtClean="0">
+                  <a:solidFill>
+                    <a:schemeClr val="tx2">
+                      <a:lumMod val="75000"/>
+                    </a:schemeClr>
+                  </a:solidFill>
+                  <a:effectLst>
+                    <a:outerShdw blurRad="38100" dist="38100" dir="2700000" algn="tl">
+                      <a:srgbClr val="000000">
+                        <a:alpha val="43137"/>
+                      </a:srgbClr>
+                    </a:outerShdw>
+                  </a:effectLst>
+                  <a:latin typeface="Times New Roman" pitchFamily="18" charset="0"/>
+                  <a:cs typeface="Times New Roman" pitchFamily="18" charset="0"/>
+                </a:rPr>
+                <a:t>B</a:t>
+              </a:r>
+              <a:endParaRPr lang="id-ID" sz="4400"/>
+            </a:p>
+          </p:txBody>
+        </p:sp>
+        <p:pic>
+          <p:nvPicPr>
+            <p:cNvPr id="1033" name="Picture 9" descr="D:\Users\GrandCross\Desktop\Transparant Bahan Ajar\gelaskosong.png"/>
+            <p:cNvPicPr>
+              <a:picLocks noChangeAspect="1" noChangeArrowheads="1"/>
+            </p:cNvPicPr>
+            <p:nvPr/>
+          </p:nvPicPr>
+          <p:blipFill>
+            <a:blip r:embed="rId4" cstate="print"/>
+            <a:srcRect t="6529"/>
+            <a:stretch>
+              <a:fillRect/>
+            </a:stretch>
+          </p:blipFill>
+          <p:spPr bwMode="auto">
+            <a:xfrm>
+              <a:off x="3461084" y="2256081"/>
+              <a:ext cx="1720516" cy="2392119"/>
+            </a:xfrm>
+            <a:prstGeom prst="rect">
+              <a:avLst/>
+            </a:prstGeom>
+            <a:noFill/>
+          </p:spPr>
+        </p:pic>
+        <p:sp>
+          <p:nvSpPr>
+            <p:cNvPr id="18" name="Rectangle 17"/>
+            <p:cNvSpPr/>
+            <p:nvPr/>
+          </p:nvSpPr>
+          <p:spPr>
+            <a:xfrm>
+              <a:off x="4114800" y="1600200"/>
+              <a:ext cx="561372" cy="769441"/>
+            </a:xfrm>
+            <a:prstGeom prst="rect">
+              <a:avLst/>
+            </a:prstGeom>
+          </p:spPr>
+          <p:txBody>
+            <a:bodyPr wrap="none">
+              <a:spAutoFit/>
+            </a:bodyPr>
+            <a:lstStyle/>
+            <a:p>
+              <a:r>
+                <a:rPr lang="id-ID" sz="4400" smtClean="0">
+                  <a:solidFill>
+                    <a:schemeClr val="tx2">
+                      <a:lumMod val="75000"/>
+                    </a:schemeClr>
+                  </a:solidFill>
+                  <a:effectLst>
+                    <a:outerShdw blurRad="38100" dist="38100" dir="2700000" algn="tl">
+                      <a:srgbClr val="000000">
+                        <a:alpha val="43137"/>
+                      </a:srgbClr>
+                    </a:outerShdw>
+                  </a:effectLst>
+                  <a:latin typeface="Times New Roman" pitchFamily="18" charset="0"/>
+                  <a:cs typeface="Times New Roman" pitchFamily="18" charset="0"/>
+                </a:rPr>
+                <a:t>C</a:t>
+              </a:r>
+              <a:endParaRPr lang="id-ID" sz="4400"/>
+            </a:p>
+          </p:txBody>
+        </p:sp>
+      </p:grpSp>
       <p:sp>
         <p:nvSpPr>
-          <p:cNvPr id="3" name="Content Placeholder 2"/>
-          <p:cNvSpPr>
-            <a:spLocks noGrp="1"/>
-          </p:cNvSpPr>
-          <p:nvPr>
-            <p:ph idx="1"/>
-          </p:nvPr>
+          <p:cNvPr id="17" name="Rectangle 16"/>
+          <p:cNvSpPr/>
+          <p:nvPr/>
         </p:nvSpPr>
-        <p:spPr/>
+        <p:spPr>
+          <a:xfrm>
+            <a:off x="5029200" y="2895600"/>
+            <a:ext cx="3804439" cy="1569660"/>
+          </a:xfrm>
+          <a:prstGeom prst="rect">
+            <a:avLst/>
+          </a:prstGeom>
+        </p:spPr>
         <p:txBody>
-          <a:bodyPr/>
+          <a:bodyPr wrap="square">
+            <a:spAutoFit/>
+          </a:bodyPr>
           <a:lstStyle/>
           <a:p>
-            <a:r>
-              <a:rPr lang="id-ID" smtClean="0">
-                <a:latin typeface="Times New Roman" pitchFamily="18" charset="0"/>
-                <a:cs typeface="Times New Roman" pitchFamily="18" charset="0"/>
-              </a:rPr>
-              <a:t>Menghitung Luas Persegi Panjang</a:t>
-            </a:r>
-          </a:p>
-          <a:p>
-            <a:r>
-              <a:rPr lang="id-ID" smtClean="0">
-                <a:latin typeface="Times New Roman" pitchFamily="18" charset="0"/>
-                <a:cs typeface="Times New Roman" pitchFamily="18" charset="0"/>
-              </a:rPr>
-              <a:t>Menghitung Luas Lingkaran</a:t>
-            </a:r>
-          </a:p>
-          <a:p>
-            <a:r>
-              <a:rPr lang="id-ID" smtClean="0">
-                <a:latin typeface="Times New Roman" pitchFamily="18" charset="0"/>
-                <a:cs typeface="Times New Roman" pitchFamily="18" charset="0"/>
-              </a:rPr>
-              <a:t>Konversi Suhu</a:t>
-            </a:r>
-          </a:p>
-          <a:p>
-            <a:r>
-              <a:rPr lang="id-ID" smtClean="0">
-                <a:latin typeface="Times New Roman" pitchFamily="18" charset="0"/>
-                <a:cs typeface="Times New Roman" pitchFamily="18" charset="0"/>
-              </a:rPr>
-              <a:t>Mencari titik tengah dari 2 buah titik</a:t>
-            </a:r>
-          </a:p>
-          <a:p>
-            <a:r>
-              <a:rPr lang="id-ID" smtClean="0">
-                <a:latin typeface="Times New Roman" pitchFamily="18" charset="0"/>
-                <a:cs typeface="Times New Roman" pitchFamily="18" charset="0"/>
-              </a:rPr>
-              <a:t>Detik ke Menit</a:t>
-            </a:r>
-          </a:p>
-          <a:p>
-            <a:endParaRPr lang="id-ID">
+            <a:pPr marL="914400" indent="-914400"/>
+            <a:r>
+              <a:rPr lang="id-ID" sz="2400" smtClean="0">
+                <a:solidFill>
+                  <a:srgbClr val="002060"/>
+                </a:solidFill>
+                <a:effectLst>
+                  <a:outerShdw blurRad="38100" dist="38100" dir="2700000" algn="tl">
+                    <a:srgbClr val="000000">
+                      <a:alpha val="43137"/>
+                    </a:srgbClr>
+                  </a:outerShdw>
+                </a:effectLst>
+                <a:latin typeface="Times New Roman" pitchFamily="18" charset="0"/>
+                <a:cs typeface="Times New Roman" pitchFamily="18" charset="0"/>
+              </a:rPr>
+              <a:t>Algoritma  </a:t>
+            </a:r>
+            <a:r>
+              <a:rPr lang="id-ID" sz="2400" smtClean="0">
+                <a:solidFill>
+                  <a:srgbClr val="002060"/>
+                </a:solidFill>
+                <a:latin typeface="Times New Roman" pitchFamily="18" charset="0"/>
+                <a:cs typeface="Times New Roman" pitchFamily="18" charset="0"/>
+              </a:rPr>
+              <a:t>: </a:t>
+            </a:r>
+          </a:p>
+          <a:p>
+            <a:pPr marL="914400" indent="-914400" algn="ctr">
+              <a:buFont typeface="+mj-lt"/>
+              <a:buAutoNum type="arabicPeriod"/>
+            </a:pPr>
+            <a:r>
+              <a:rPr lang="id-ID" sz="2400" smtClean="0">
+                <a:latin typeface="Times New Roman" pitchFamily="18" charset="0"/>
+                <a:cs typeface="Times New Roman" pitchFamily="18" charset="0"/>
+              </a:rPr>
+              <a:t>Pindahkan isi B ke C</a:t>
+            </a:r>
+          </a:p>
+          <a:p>
+            <a:pPr marL="914400" indent="-914400" algn="ctr">
+              <a:buFont typeface="+mj-lt"/>
+              <a:buAutoNum type="arabicPeriod"/>
+            </a:pPr>
+            <a:r>
+              <a:rPr lang="id-ID" sz="2400" smtClean="0">
+                <a:latin typeface="Times New Roman" pitchFamily="18" charset="0"/>
+                <a:cs typeface="Times New Roman" pitchFamily="18" charset="0"/>
+              </a:rPr>
+              <a:t>Pindahkan isi A ke B</a:t>
+            </a:r>
+          </a:p>
+          <a:p>
+            <a:pPr marL="914400" indent="-914400" algn="ctr">
+              <a:buFont typeface="+mj-lt"/>
+              <a:buAutoNum type="arabicPeriod"/>
+            </a:pPr>
+            <a:r>
+              <a:rPr lang="id-ID" sz="2400" smtClean="0">
+                <a:latin typeface="Times New Roman" pitchFamily="18" charset="0"/>
+                <a:cs typeface="Times New Roman" pitchFamily="18" charset="0"/>
+              </a:rPr>
+              <a:t>Pindahkan isi C ke A</a:t>
+            </a:r>
+            <a:endParaRPr lang="id-ID" sz="2400">
               <a:latin typeface="Times New Roman" pitchFamily="18" charset="0"/>
               <a:cs typeface="Times New Roman" pitchFamily="18" charset="0"/>
             </a:endParaRPr>
@@ -9617,29 +10118,198 @@
           <a:lstStyle/>
           <a:p>
             <a:r>
-              <a:rPr lang="id-ID" smtClean="0"/>
-              <a:t>Kesimpulan</a:t>
-            </a:r>
-            <a:endParaRPr lang="id-ID"/>
+              <a:rPr lang="id-ID" smtClean="0">
+                <a:latin typeface="Times New Roman" pitchFamily="18" charset="0"/>
+                <a:cs typeface="Times New Roman" pitchFamily="18" charset="0"/>
+              </a:rPr>
+              <a:t>Algoritma : Solusi </a:t>
+            </a:r>
+            <a:r>
+              <a:rPr lang="id-ID" smtClean="0">
+                <a:latin typeface="Times New Roman" pitchFamily="18" charset="0"/>
+                <a:cs typeface="Times New Roman" pitchFamily="18" charset="0"/>
+                <a:sym typeface="Wingdings" pitchFamily="2" charset="2"/>
+              </a:rPr>
+              <a:t> </a:t>
+            </a:r>
+            <a:r>
+              <a:rPr lang="id-ID" smtClean="0">
+                <a:latin typeface="Times New Roman" pitchFamily="18" charset="0"/>
+                <a:cs typeface="Times New Roman" pitchFamily="18" charset="0"/>
+              </a:rPr>
+              <a:t>Output</a:t>
+            </a:r>
+            <a:endParaRPr lang="id-ID">
+              <a:latin typeface="Times New Roman" pitchFamily="18" charset="0"/>
+              <a:cs typeface="Times New Roman" pitchFamily="18" charset="0"/>
+            </a:endParaRPr>
           </a:p>
         </p:txBody>
       </p:sp>
-      <p:graphicFrame>
-        <p:nvGraphicFramePr>
-          <p:cNvPr id="4" name="Diagram 3"/>
-          <p:cNvGraphicFramePr/>
+      <p:grpSp>
+        <p:nvGrpSpPr>
+          <p:cNvPr id="8" name="Group 7"/>
+          <p:cNvGrpSpPr/>
           <p:nvPr/>
-        </p:nvGraphicFramePr>
-        <p:xfrm>
-          <a:off x="1676400" y="1752600"/>
-          <a:ext cx="6096000" cy="4064000"/>
-        </p:xfrm>
-        <a:graphic>
-          <a:graphicData uri="http://schemas.openxmlformats.org/drawingml/2006/diagram">
-            <dgm:relIds xmlns:dgm="http://schemas.openxmlformats.org/drawingml/2006/diagram" xmlns:r="http://schemas.openxmlformats.org/officeDocument/2006/relationships" r:dm="rId2" r:lo="rId3" r:qs="rId4" r:cs="rId5"/>
-          </a:graphicData>
-        </a:graphic>
-      </p:graphicFrame>
+        </p:nvGrpSpPr>
+        <p:grpSpPr>
+          <a:xfrm>
+            <a:off x="2057400" y="1752600"/>
+            <a:ext cx="5067300" cy="4762500"/>
+            <a:chOff x="2057400" y="1752600"/>
+            <a:chExt cx="5067300" cy="4762500"/>
+          </a:xfrm>
+        </p:grpSpPr>
+        <p:pic>
+          <p:nvPicPr>
+            <p:cNvPr id="5" name="Picture 8" descr="D:\Users\GrandCross\Desktop\Transparant Bahan Ajar\gelas.png"/>
+            <p:cNvPicPr>
+              <a:picLocks noChangeAspect="1" noChangeArrowheads="1"/>
+            </p:cNvPicPr>
+            <p:nvPr/>
+          </p:nvPicPr>
+          <p:blipFill>
+            <a:blip r:embed="rId2">
+              <a:duotone>
+                <a:prstClr val="black"/>
+                <a:schemeClr val="bg1">
+                  <a:lumMod val="95000"/>
+                  <a:tint val="45000"/>
+                  <a:satMod val="400000"/>
+                </a:schemeClr>
+              </a:duotone>
+            </a:blip>
+            <a:srcRect/>
+            <a:stretch>
+              <a:fillRect/>
+            </a:stretch>
+          </p:blipFill>
+          <p:spPr bwMode="auto">
+            <a:xfrm>
+              <a:off x="5105400" y="3124200"/>
+              <a:ext cx="2019300" cy="3390900"/>
+            </a:xfrm>
+            <a:prstGeom prst="rect">
+              <a:avLst/>
+            </a:prstGeom>
+            <a:noFill/>
+          </p:spPr>
+        </p:pic>
+        <p:pic>
+          <p:nvPicPr>
+            <p:cNvPr id="4" name="Picture 8" descr="D:\Users\GrandCross\Desktop\Transparant Bahan Ajar\gelas.png"/>
+            <p:cNvPicPr>
+              <a:picLocks noChangeAspect="1" noChangeArrowheads="1"/>
+            </p:cNvPicPr>
+            <p:nvPr/>
+          </p:nvPicPr>
+          <p:blipFill>
+            <a:blip r:embed="rId2"/>
+            <a:srcRect/>
+            <a:stretch>
+              <a:fillRect/>
+            </a:stretch>
+          </p:blipFill>
+          <p:spPr bwMode="auto">
+            <a:xfrm>
+              <a:off x="2057400" y="3048000"/>
+              <a:ext cx="2019300" cy="3390900"/>
+            </a:xfrm>
+            <a:prstGeom prst="rect">
+              <a:avLst/>
+            </a:prstGeom>
+            <a:noFill/>
+          </p:spPr>
+        </p:pic>
+        <p:sp>
+          <p:nvSpPr>
+            <p:cNvPr id="6" name="Rectangle 5"/>
+            <p:cNvSpPr/>
+            <p:nvPr/>
+          </p:nvSpPr>
+          <p:spPr>
+            <a:xfrm>
+              <a:off x="2514600" y="1752600"/>
+              <a:ext cx="1074333" cy="1569660"/>
+            </a:xfrm>
+            <a:prstGeom prst="rect">
+              <a:avLst/>
+            </a:prstGeom>
+          </p:spPr>
+          <p:txBody>
+            <a:bodyPr wrap="none">
+              <a:spAutoFit/>
+            </a:bodyPr>
+            <a:lstStyle/>
+            <a:p>
+              <a:r>
+                <a:rPr lang="id-ID" sz="9600" smtClean="0">
+                  <a:solidFill>
+                    <a:schemeClr val="tx2">
+                      <a:lumMod val="75000"/>
+                    </a:schemeClr>
+                  </a:solidFill>
+                  <a:effectLst>
+                    <a:outerShdw blurRad="38100" dist="38100" dir="2700000" algn="tl">
+                      <a:srgbClr val="000000">
+                        <a:alpha val="43137"/>
+                      </a:srgbClr>
+                    </a:outerShdw>
+                  </a:effectLst>
+                  <a:latin typeface="Times New Roman" pitchFamily="18" charset="0"/>
+                  <a:cs typeface="Times New Roman" pitchFamily="18" charset="0"/>
+                </a:rPr>
+                <a:t>A</a:t>
+              </a:r>
+              <a:endParaRPr lang="id-ID" sz="9600"/>
+            </a:p>
+          </p:txBody>
+        </p:sp>
+        <p:sp>
+          <p:nvSpPr>
+            <p:cNvPr id="7" name="Rectangle 6"/>
+            <p:cNvSpPr/>
+            <p:nvPr/>
+          </p:nvSpPr>
+          <p:spPr>
+            <a:xfrm>
+              <a:off x="5638800" y="1752600"/>
+              <a:ext cx="1005403" cy="1569660"/>
+            </a:xfrm>
+            <a:prstGeom prst="rect">
+              <a:avLst/>
+            </a:prstGeom>
+          </p:spPr>
+          <p:txBody>
+            <a:bodyPr wrap="none">
+              <a:spAutoFit/>
+            </a:bodyPr>
+            <a:lstStyle/>
+            <a:p>
+              <a:r>
+                <a:rPr lang="id-ID" sz="9600" smtClean="0">
+                  <a:solidFill>
+                    <a:schemeClr val="tx2">
+                      <a:lumMod val="75000"/>
+                    </a:schemeClr>
+                  </a:solidFill>
+                  <a:effectLst>
+                    <a:outerShdw blurRad="38100" dist="38100" dir="2700000" algn="tl">
+                      <a:srgbClr val="000000">
+                        <a:alpha val="43137"/>
+                      </a:srgbClr>
+                    </a:outerShdw>
+                  </a:effectLst>
+                  <a:latin typeface="Times New Roman" pitchFamily="18" charset="0"/>
+                  <a:cs typeface="Times New Roman" pitchFamily="18" charset="0"/>
+                </a:rPr>
+                <a:t>B</a:t>
+              </a:r>
+              <a:endParaRPr lang="id-ID" sz="9600"/>
+            </a:p>
+          </p:txBody>
+        </p:sp>
+      </p:grpSp>
     </p:spTree>
   </p:cSld>
   <p:clrMapOvr>
@@ -9652,6 +10322,135 @@
       </p:par>
     </p:tnLst>
   </p:timing>
+</p:sld>
+</file>
+
+<file path=ppt/slides/slide29.xml><?xml version="1.0" encoding="utf-8"?>
+<p:sld xmlns:a="http://schemas.openxmlformats.org/drawingml/2006/main" xmlns:r="http://schemas.openxmlformats.org/officeDocument/2006/relationships" xmlns:p="http://schemas.openxmlformats.org/presentationml/2006/main">
+  <p:cSld>
+    <p:spTree>
+      <p:nvGrpSpPr>
+        <p:cNvPr id="1" name=""/>
+        <p:cNvGrpSpPr/>
+        <p:nvPr/>
+      </p:nvGrpSpPr>
+      <p:grpSpPr>
+        <a:xfrm>
+          <a:off x="0" y="0"/>
+          <a:ext cx="0" cy="0"/>
+          <a:chOff x="0" y="0"/>
+          <a:chExt cx="0" cy="0"/>
+        </a:xfrm>
+      </p:grpSpPr>
+      <p:sp>
+        <p:nvSpPr>
+          <p:cNvPr id="2" name="Title 1"/>
+          <p:cNvSpPr>
+            <a:spLocks noGrp="1"/>
+          </p:cNvSpPr>
+          <p:nvPr>
+            <p:ph type="title"/>
+          </p:nvPr>
+        </p:nvSpPr>
+        <p:spPr/>
+        <p:txBody>
+          <a:bodyPr>
+            <a:normAutofit fontScale="90000"/>
+          </a:bodyPr>
+          <a:lstStyle/>
+          <a:p>
+            <a:r>
+              <a:rPr lang="id-ID" smtClean="0">
+                <a:latin typeface="Times New Roman" pitchFamily="18" charset="0"/>
+                <a:cs typeface="Times New Roman" pitchFamily="18" charset="0"/>
+              </a:rPr>
+              <a:t>Gaya Input pada Pemrograman Normal</a:t>
+            </a:r>
+            <a:endParaRPr lang="id-ID">
+              <a:latin typeface="Times New Roman" pitchFamily="18" charset="0"/>
+              <a:cs typeface="Times New Roman" pitchFamily="18" charset="0"/>
+            </a:endParaRPr>
+          </a:p>
+        </p:txBody>
+      </p:sp>
+      <p:sp>
+        <p:nvSpPr>
+          <p:cNvPr id="3" name="Content Placeholder 2"/>
+          <p:cNvSpPr>
+            <a:spLocks noGrp="1"/>
+          </p:cNvSpPr>
+          <p:nvPr>
+            <p:ph idx="1"/>
+          </p:nvPr>
+        </p:nvSpPr>
+        <p:spPr/>
+        <p:txBody>
+          <a:bodyPr/>
+          <a:lstStyle/>
+          <a:p>
+            <a:r>
+              <a:rPr lang="id-ID" smtClean="0">
+                <a:latin typeface="Times New Roman" pitchFamily="18" charset="0"/>
+                <a:cs typeface="Times New Roman" pitchFamily="18" charset="0"/>
+              </a:rPr>
+              <a:t>Menghitung Luas Persegi Panjang</a:t>
+            </a:r>
+          </a:p>
+          <a:p>
+            <a:r>
+              <a:rPr lang="id-ID" smtClean="0">
+                <a:latin typeface="Times New Roman" pitchFamily="18" charset="0"/>
+                <a:cs typeface="Times New Roman" pitchFamily="18" charset="0"/>
+              </a:rPr>
+              <a:t>Menghitung Luas Lingkaran</a:t>
+            </a:r>
+          </a:p>
+          <a:p>
+            <a:r>
+              <a:rPr lang="id-ID" smtClean="0">
+                <a:latin typeface="Times New Roman" pitchFamily="18" charset="0"/>
+                <a:cs typeface="Times New Roman" pitchFamily="18" charset="0"/>
+              </a:rPr>
+              <a:t>Konversi Suhu</a:t>
+            </a:r>
+          </a:p>
+          <a:p>
+            <a:r>
+              <a:rPr lang="id-ID" smtClean="0">
+                <a:latin typeface="Times New Roman" pitchFamily="18" charset="0"/>
+                <a:cs typeface="Times New Roman" pitchFamily="18" charset="0"/>
+              </a:rPr>
+              <a:t>Mencari titik tengah dari 2 buah titik</a:t>
+            </a:r>
+          </a:p>
+          <a:p>
+            <a:r>
+              <a:rPr lang="id-ID" smtClean="0">
+                <a:latin typeface="Times New Roman" pitchFamily="18" charset="0"/>
+                <a:cs typeface="Times New Roman" pitchFamily="18" charset="0"/>
+              </a:rPr>
+              <a:t>Detik ke Menit</a:t>
+            </a:r>
+          </a:p>
+          <a:p>
+            <a:endParaRPr lang="id-ID" smtClean="0">
+              <a:latin typeface="Times New Roman" pitchFamily="18" charset="0"/>
+              <a:cs typeface="Times New Roman" pitchFamily="18" charset="0"/>
+            </a:endParaRPr>
+          </a:p>
+          <a:p>
+            <a:endParaRPr lang="id-ID">
+              <a:latin typeface="Times New Roman" pitchFamily="18" charset="0"/>
+              <a:cs typeface="Times New Roman" pitchFamily="18" charset="0"/>
+            </a:endParaRPr>
+          </a:p>
+        </p:txBody>
+      </p:sp>
+    </p:spTree>
+  </p:cSld>
+  <p:clrMapOvr>
+    <a:masterClrMapping/>
+  </p:clrMapOvr>
 </p:sld>
 </file>
 
@@ -10319,6 +11118,207 @@
 </p:sld>
 </file>
 
+<file path=ppt/slides/slide30.xml><?xml version="1.0" encoding="utf-8"?>
+<p:sld xmlns:a="http://schemas.openxmlformats.org/drawingml/2006/main" xmlns:r="http://schemas.openxmlformats.org/officeDocument/2006/relationships" xmlns:p="http://schemas.openxmlformats.org/presentationml/2006/main">
+  <p:cSld>
+    <p:spTree>
+      <p:nvGrpSpPr>
+        <p:cNvPr id="1" name=""/>
+        <p:cNvGrpSpPr/>
+        <p:nvPr/>
+      </p:nvGrpSpPr>
+      <p:grpSpPr>
+        <a:xfrm>
+          <a:off x="0" y="0"/>
+          <a:ext cx="0" cy="0"/>
+          <a:chOff x="0" y="0"/>
+          <a:chExt cx="0" cy="0"/>
+        </a:xfrm>
+      </p:grpSpPr>
+      <p:sp>
+        <p:nvSpPr>
+          <p:cNvPr id="2" name="Title 1"/>
+          <p:cNvSpPr>
+            <a:spLocks noGrp="1"/>
+          </p:cNvSpPr>
+          <p:nvPr>
+            <p:ph type="title"/>
+          </p:nvPr>
+        </p:nvSpPr>
+        <p:spPr/>
+        <p:txBody>
+          <a:bodyPr>
+            <a:normAutofit fontScale="90000"/>
+          </a:bodyPr>
+          <a:lstStyle/>
+          <a:p>
+            <a:r>
+              <a:rPr lang="id-ID" smtClean="0">
+                <a:latin typeface="Times New Roman" pitchFamily="18" charset="0"/>
+                <a:cs typeface="Times New Roman" pitchFamily="18" charset="0"/>
+              </a:rPr>
+              <a:t>Gaya Input pada Kontes Pemrograman</a:t>
+            </a:r>
+            <a:endParaRPr lang="id-ID">
+              <a:latin typeface="Times New Roman" pitchFamily="18" charset="0"/>
+              <a:cs typeface="Times New Roman" pitchFamily="18" charset="0"/>
+            </a:endParaRPr>
+          </a:p>
+        </p:txBody>
+      </p:sp>
+      <p:sp>
+        <p:nvSpPr>
+          <p:cNvPr id="3" name="Content Placeholder 2"/>
+          <p:cNvSpPr>
+            <a:spLocks noGrp="1"/>
+          </p:cNvSpPr>
+          <p:nvPr>
+            <p:ph idx="1"/>
+          </p:nvPr>
+        </p:nvSpPr>
+        <p:spPr/>
+        <p:txBody>
+          <a:bodyPr/>
+          <a:lstStyle/>
+          <a:p>
+            <a:r>
+              <a:rPr lang="id-ID" smtClean="0">
+                <a:latin typeface="Times New Roman" pitchFamily="18" charset="0"/>
+                <a:cs typeface="Times New Roman" pitchFamily="18" charset="0"/>
+              </a:rPr>
+              <a:t>Menghitung Luas Persegi Panjang</a:t>
+            </a:r>
+          </a:p>
+          <a:p>
+            <a:r>
+              <a:rPr lang="id-ID" smtClean="0">
+                <a:latin typeface="Times New Roman" pitchFamily="18" charset="0"/>
+                <a:cs typeface="Times New Roman" pitchFamily="18" charset="0"/>
+              </a:rPr>
+              <a:t>Menghitung Luas Lingkaran</a:t>
+            </a:r>
+          </a:p>
+          <a:p>
+            <a:r>
+              <a:rPr lang="id-ID" smtClean="0">
+                <a:latin typeface="Times New Roman" pitchFamily="18" charset="0"/>
+                <a:cs typeface="Times New Roman" pitchFamily="18" charset="0"/>
+              </a:rPr>
+              <a:t>Konversi Suhu</a:t>
+            </a:r>
+          </a:p>
+          <a:p>
+            <a:r>
+              <a:rPr lang="id-ID" smtClean="0">
+                <a:latin typeface="Times New Roman" pitchFamily="18" charset="0"/>
+                <a:cs typeface="Times New Roman" pitchFamily="18" charset="0"/>
+              </a:rPr>
+              <a:t>Mencari titik tengah dari 2 buah titik</a:t>
+            </a:r>
+          </a:p>
+          <a:p>
+            <a:r>
+              <a:rPr lang="id-ID" smtClean="0">
+                <a:latin typeface="Times New Roman" pitchFamily="18" charset="0"/>
+                <a:cs typeface="Times New Roman" pitchFamily="18" charset="0"/>
+              </a:rPr>
+              <a:t>Detik ke Menit</a:t>
+            </a:r>
+          </a:p>
+          <a:p>
+            <a:endParaRPr lang="id-ID">
+              <a:latin typeface="Times New Roman" pitchFamily="18" charset="0"/>
+              <a:cs typeface="Times New Roman" pitchFamily="18" charset="0"/>
+            </a:endParaRPr>
+          </a:p>
+        </p:txBody>
+      </p:sp>
+    </p:spTree>
+  </p:cSld>
+  <p:clrMapOvr>
+    <a:masterClrMapping/>
+  </p:clrMapOvr>
+  <p:timing>
+    <p:tnLst>
+      <p:par>
+        <p:cTn id="1" dur="indefinite" restart="never" nodeType="tmRoot"/>
+      </p:par>
+    </p:tnLst>
+  </p:timing>
+</p:sld>
+</file>
+
+<file path=ppt/slides/slide31.xml><?xml version="1.0" encoding="utf-8"?>
+<p:sld xmlns:a="http://schemas.openxmlformats.org/drawingml/2006/main" xmlns:r="http://schemas.openxmlformats.org/officeDocument/2006/relationships" xmlns:p="http://schemas.openxmlformats.org/presentationml/2006/main">
+  <p:cSld>
+    <p:spTree>
+      <p:nvGrpSpPr>
+        <p:cNvPr id="1" name=""/>
+        <p:cNvGrpSpPr/>
+        <p:nvPr/>
+      </p:nvGrpSpPr>
+      <p:grpSpPr>
+        <a:xfrm>
+          <a:off x="0" y="0"/>
+          <a:ext cx="0" cy="0"/>
+          <a:chOff x="0" y="0"/>
+          <a:chExt cx="0" cy="0"/>
+        </a:xfrm>
+      </p:grpSpPr>
+      <p:sp>
+        <p:nvSpPr>
+          <p:cNvPr id="2" name="Title 1"/>
+          <p:cNvSpPr>
+            <a:spLocks noGrp="1"/>
+          </p:cNvSpPr>
+          <p:nvPr>
+            <p:ph type="title"/>
+          </p:nvPr>
+        </p:nvSpPr>
+        <p:spPr/>
+        <p:txBody>
+          <a:bodyPr/>
+          <a:lstStyle/>
+          <a:p>
+            <a:r>
+              <a:rPr lang="id-ID" smtClean="0"/>
+              <a:t>Kesimpulan</a:t>
+            </a:r>
+            <a:endParaRPr lang="id-ID"/>
+          </a:p>
+        </p:txBody>
+      </p:sp>
+      <p:graphicFrame>
+        <p:nvGraphicFramePr>
+          <p:cNvPr id="4" name="Diagram 3"/>
+          <p:cNvGraphicFramePr/>
+          <p:nvPr/>
+        </p:nvGraphicFramePr>
+        <p:xfrm>
+          <a:off x="1676400" y="1752600"/>
+          <a:ext cx="6096000" cy="4064000"/>
+        </p:xfrm>
+        <a:graphic>
+          <a:graphicData uri="http://schemas.openxmlformats.org/drawingml/2006/diagram">
+            <dgm:relIds xmlns:dgm="http://schemas.openxmlformats.org/drawingml/2006/diagram" xmlns:r="http://schemas.openxmlformats.org/officeDocument/2006/relationships" r:dm="rId2" r:lo="rId3" r:qs="rId4" r:cs="rId5"/>
+          </a:graphicData>
+        </a:graphic>
+      </p:graphicFrame>
+    </p:spTree>
+  </p:cSld>
+  <p:clrMapOvr>
+    <a:masterClrMapping/>
+  </p:clrMapOvr>
+  <p:timing>
+    <p:tnLst>
+      <p:par>
+        <p:cTn id="1" dur="indefinite" restart="never" nodeType="tmRoot"/>
+      </p:par>
+    </p:tnLst>
+  </p:timing>
+</p:sld>
+</file>
+
 <file path=ppt/slides/slide4.xml><?xml version="1.0" encoding="utf-8"?>
 <p:sld xmlns:a="http://schemas.openxmlformats.org/drawingml/2006/main" xmlns:r="http://schemas.openxmlformats.org/officeDocument/2006/relationships" xmlns:p="http://schemas.openxmlformats.org/presentationml/2006/main">
   <p:cSld>
@@ -10726,89 +11726,28 @@
       </p:sp>
       <p:grpSp>
         <p:nvGrpSpPr>
-          <p:cNvPr id="4" name="Group 3"/>
+          <p:cNvPr id="13" name="Group 12"/>
           <p:cNvGrpSpPr/>
           <p:nvPr/>
         </p:nvGrpSpPr>
         <p:grpSpPr>
           <a:xfrm>
             <a:off x="2514600" y="1752600"/>
-            <a:ext cx="5029200" cy="2971800"/>
-            <a:chOff x="228600" y="1600200"/>
-            <a:chExt cx="8686800" cy="4687771"/>
+            <a:ext cx="5029200" cy="4617660"/>
+            <a:chOff x="2514600" y="1752600"/>
+            <a:chExt cx="5029200" cy="4617660"/>
           </a:xfrm>
         </p:grpSpPr>
-        <p:pic>
-          <p:nvPicPr>
-            <p:cNvPr id="5" name="Picture 8" descr="D:\Users\GrandCross\Desktop\Transparant Bahan Ajar\gelas.png"/>
-            <p:cNvPicPr>
-              <a:picLocks noChangeAspect="1" noChangeArrowheads="1"/>
-            </p:cNvPicPr>
-            <p:nvPr/>
-          </p:nvPicPr>
-          <p:blipFill>
-            <a:blip r:embed="rId2"/>
-            <a:srcRect/>
-            <a:stretch>
-              <a:fillRect/>
-            </a:stretch>
-          </p:blipFill>
-          <p:spPr bwMode="auto">
-            <a:xfrm>
-              <a:off x="228600" y="2895600"/>
-              <a:ext cx="2019300" cy="3390900"/>
-            </a:xfrm>
-            <a:prstGeom prst="rect">
-              <a:avLst/>
-            </a:prstGeom>
-            <a:noFill/>
-          </p:spPr>
-        </p:pic>
-        <p:pic>
-          <p:nvPicPr>
-            <p:cNvPr id="6" name="Picture 8" descr="D:\Users\GrandCross\Desktop\Transparant Bahan Ajar\gelas.png"/>
-            <p:cNvPicPr>
-              <a:picLocks noChangeAspect="1" noChangeArrowheads="1"/>
-            </p:cNvPicPr>
-            <p:nvPr/>
-          </p:nvPicPr>
-          <p:blipFill>
-            <a:blip r:embed="rId2">
-              <a:duotone>
-                <a:prstClr val="black"/>
-                <a:schemeClr val="bg1">
-                  <a:lumMod val="95000"/>
-                  <a:tint val="45000"/>
-                  <a:satMod val="400000"/>
-                </a:schemeClr>
-              </a:duotone>
-            </a:blip>
-            <a:srcRect/>
-            <a:stretch>
-              <a:fillRect/>
-            </a:stretch>
-          </p:blipFill>
-          <p:spPr bwMode="auto">
-            <a:xfrm>
-              <a:off x="3200400" y="2895600"/>
-              <a:ext cx="2019300" cy="3390900"/>
-            </a:xfrm>
-            <a:prstGeom prst="rect">
-              <a:avLst/>
-            </a:prstGeom>
-            <a:noFill/>
-          </p:spPr>
-        </p:pic>
         <p:sp>
           <p:nvSpPr>
-            <p:cNvPr id="7" name="Rectangle 6"/>
+            <p:cNvPr id="10" name="Rectangle 9"/>
             <p:cNvSpPr/>
             <p:nvPr/>
           </p:nvSpPr>
           <p:spPr>
             <a:xfrm>
-              <a:off x="685800" y="1600200"/>
-              <a:ext cx="1022250" cy="1213730"/>
+              <a:off x="6324600" y="1752600"/>
+              <a:ext cx="561372" cy="769441"/>
             </a:xfrm>
             <a:prstGeom prst="rect">
               <a:avLst/>
@@ -10837,222 +11776,313 @@
                   <a:latin typeface="Times New Roman" pitchFamily="18" charset="0"/>
                   <a:cs typeface="Times New Roman" pitchFamily="18" charset="0"/>
                 </a:rPr>
-                <a:t>A</a:t>
+                <a:t>C</a:t>
               </a:r>
               <a:endParaRPr lang="id-ID" sz="4400"/>
             </a:p>
           </p:txBody>
         </p:sp>
-        <p:sp>
-          <p:nvSpPr>
-            <p:cNvPr id="8" name="Rectangle 7"/>
-            <p:cNvSpPr/>
+        <p:grpSp>
+          <p:nvGrpSpPr>
+            <p:cNvPr id="12" name="Group 11"/>
+            <p:cNvGrpSpPr/>
             <p:nvPr/>
-          </p:nvSpPr>
-          <p:spPr>
+          </p:nvGrpSpPr>
+          <p:grpSpPr>
             <a:xfrm>
-              <a:off x="3810000" y="1600200"/>
-              <a:ext cx="969643" cy="1213730"/>
+              <a:off x="2514600" y="1752600"/>
+              <a:ext cx="5029200" cy="4617660"/>
+              <a:chOff x="2514600" y="1752600"/>
+              <a:chExt cx="5029200" cy="4617660"/>
             </a:xfrm>
-            <a:prstGeom prst="rect">
-              <a:avLst/>
-            </a:prstGeom>
-          </p:spPr>
-          <p:txBody>
-            <a:bodyPr wrap="none">
-              <a:spAutoFit/>
-            </a:bodyPr>
-            <a:lstStyle/>
-            <a:p>
-              <a:r>
-                <a:rPr lang="id-ID" sz="4400" smtClean="0">
-                  <a:solidFill>
-                    <a:schemeClr val="tx2">
-                      <a:lumMod val="75000"/>
+          </p:grpSpPr>
+          <p:grpSp>
+            <p:nvGrpSpPr>
+              <p:cNvPr id="4" name="Group 3"/>
+              <p:cNvGrpSpPr/>
+              <p:nvPr/>
+            </p:nvGrpSpPr>
+            <p:grpSpPr>
+              <a:xfrm>
+                <a:off x="2514600" y="1752600"/>
+                <a:ext cx="5029200" cy="2971800"/>
+                <a:chOff x="228600" y="1600200"/>
+                <a:chExt cx="8686800" cy="4687771"/>
+              </a:xfrm>
+            </p:grpSpPr>
+            <p:pic>
+              <p:nvPicPr>
+                <p:cNvPr id="5" name="Picture 8" descr="D:\Users\GrandCross\Desktop\Transparant Bahan Ajar\gelas.png"/>
+                <p:cNvPicPr>
+                  <a:picLocks noChangeAspect="1" noChangeArrowheads="1"/>
+                </p:cNvPicPr>
+                <p:nvPr/>
+              </p:nvPicPr>
+              <p:blipFill>
+                <a:blip r:embed="rId2"/>
+                <a:srcRect/>
+                <a:stretch>
+                  <a:fillRect/>
+                </a:stretch>
+              </p:blipFill>
+              <p:spPr bwMode="auto">
+                <a:xfrm>
+                  <a:off x="228600" y="2895600"/>
+                  <a:ext cx="2019300" cy="3390900"/>
+                </a:xfrm>
+                <a:prstGeom prst="rect">
+                  <a:avLst/>
+                </a:prstGeom>
+                <a:noFill/>
+              </p:spPr>
+            </p:pic>
+            <p:pic>
+              <p:nvPicPr>
+                <p:cNvPr id="6" name="Picture 8" descr="D:\Users\GrandCross\Desktop\Transparant Bahan Ajar\gelas.png"/>
+                <p:cNvPicPr>
+                  <a:picLocks noChangeAspect="1" noChangeArrowheads="1"/>
+                </p:cNvPicPr>
+                <p:nvPr/>
+              </p:nvPicPr>
+              <p:blipFill>
+                <a:blip r:embed="rId2">
+                  <a:duotone>
+                    <a:prstClr val="black"/>
+                    <a:schemeClr val="bg1">
+                      <a:lumMod val="95000"/>
+                      <a:tint val="45000"/>
+                      <a:satMod val="400000"/>
                     </a:schemeClr>
-                  </a:solidFill>
-                  <a:effectLst>
-                    <a:outerShdw blurRad="38100" dist="38100" dir="2700000" algn="tl">
-                      <a:srgbClr val="000000">
-                        <a:alpha val="43137"/>
-                      </a:srgbClr>
-                    </a:outerShdw>
-                  </a:effectLst>
+                  </a:duotone>
+                </a:blip>
+                <a:srcRect/>
+                <a:stretch>
+                  <a:fillRect/>
+                </a:stretch>
+              </p:blipFill>
+              <p:spPr bwMode="auto">
+                <a:xfrm>
+                  <a:off x="3200400" y="2895600"/>
+                  <a:ext cx="2019300" cy="3390900"/>
+                </a:xfrm>
+                <a:prstGeom prst="rect">
+                  <a:avLst/>
+                </a:prstGeom>
+                <a:noFill/>
+              </p:spPr>
+            </p:pic>
+            <p:sp>
+              <p:nvSpPr>
+                <p:cNvPr id="7" name="Rectangle 6"/>
+                <p:cNvSpPr/>
+                <p:nvPr/>
+              </p:nvSpPr>
+              <p:spPr>
+                <a:xfrm>
+                  <a:off x="685800" y="1600200"/>
+                  <a:ext cx="1022250" cy="1213730"/>
+                </a:xfrm>
+                <a:prstGeom prst="rect">
+                  <a:avLst/>
+                </a:prstGeom>
+              </p:spPr>
+              <p:txBody>
+                <a:bodyPr wrap="none">
+                  <a:spAutoFit/>
+                </a:bodyPr>
+                <a:lstStyle/>
+                <a:p>
+                  <a:r>
+                    <a:rPr lang="id-ID" sz="4400" smtClean="0">
+                      <a:solidFill>
+                        <a:schemeClr val="tx2">
+                          <a:lumMod val="75000"/>
+                        </a:schemeClr>
+                      </a:solidFill>
+                      <a:effectLst>
+                        <a:outerShdw blurRad="38100" dist="38100" dir="2700000" algn="tl">
+                          <a:srgbClr val="000000">
+                            <a:alpha val="43137"/>
+                          </a:srgbClr>
+                        </a:outerShdw>
+                      </a:effectLst>
+                      <a:latin typeface="Times New Roman" pitchFamily="18" charset="0"/>
+                      <a:cs typeface="Times New Roman" pitchFamily="18" charset="0"/>
+                    </a:rPr>
+                    <a:t>A</a:t>
+                  </a:r>
+                  <a:endParaRPr lang="id-ID" sz="4400"/>
+                </a:p>
+              </p:txBody>
+            </p:sp>
+            <p:sp>
+              <p:nvSpPr>
+                <p:cNvPr id="8" name="Rectangle 7"/>
+                <p:cNvSpPr/>
+                <p:nvPr/>
+              </p:nvSpPr>
+              <p:spPr>
+                <a:xfrm>
+                  <a:off x="3810000" y="1600200"/>
+                  <a:ext cx="969643" cy="1213730"/>
+                </a:xfrm>
+                <a:prstGeom prst="rect">
+                  <a:avLst/>
+                </a:prstGeom>
+              </p:spPr>
+              <p:txBody>
+                <a:bodyPr wrap="none">
+                  <a:spAutoFit/>
+                </a:bodyPr>
+                <a:lstStyle/>
+                <a:p>
+                  <a:r>
+                    <a:rPr lang="id-ID" sz="4400" smtClean="0">
+                      <a:solidFill>
+                        <a:schemeClr val="tx2">
+                          <a:lumMod val="75000"/>
+                        </a:schemeClr>
+                      </a:solidFill>
+                      <a:effectLst>
+                        <a:outerShdw blurRad="38100" dist="38100" dir="2700000" algn="tl">
+                          <a:srgbClr val="000000">
+                            <a:alpha val="43137"/>
+                          </a:srgbClr>
+                        </a:outerShdw>
+                      </a:effectLst>
+                      <a:latin typeface="Times New Roman" pitchFamily="18" charset="0"/>
+                      <a:cs typeface="Times New Roman" pitchFamily="18" charset="0"/>
+                    </a:rPr>
+                    <a:t>B</a:t>
+                  </a:r>
+                  <a:endParaRPr lang="id-ID" sz="4400"/>
+                </a:p>
+              </p:txBody>
+            </p:sp>
+            <p:pic>
+              <p:nvPicPr>
+                <p:cNvPr id="9" name="Picture 9" descr="D:\Users\GrandCross\Desktop\Transparant Bahan Ajar\gelaskosong.png"/>
+                <p:cNvPicPr>
+                  <a:picLocks noChangeAspect="1" noChangeArrowheads="1"/>
+                </p:cNvPicPr>
+                <p:nvPr/>
+              </p:nvPicPr>
+              <p:blipFill>
+                <a:blip r:embed="rId3" cstate="print"/>
+                <a:srcRect t="6529"/>
+                <a:stretch>
+                  <a:fillRect/>
+                </a:stretch>
+              </p:blipFill>
+              <p:spPr bwMode="auto">
+                <a:xfrm>
+                  <a:off x="5943600" y="2514600"/>
+                  <a:ext cx="2971800" cy="3773371"/>
+                </a:xfrm>
+                <a:prstGeom prst="rect">
+                  <a:avLst/>
+                </a:prstGeom>
+                <a:noFill/>
+              </p:spPr>
+            </p:pic>
+          </p:grpSp>
+          <p:sp>
+            <p:nvSpPr>
+              <p:cNvPr id="11" name="Rectangle 10"/>
+              <p:cNvSpPr/>
+              <p:nvPr/>
+            </p:nvSpPr>
+            <p:spPr>
+              <a:xfrm>
+                <a:off x="2743200" y="4800600"/>
+                <a:ext cx="3804439" cy="1569660"/>
+              </a:xfrm>
+              <a:prstGeom prst="rect">
+                <a:avLst/>
+              </a:prstGeom>
+            </p:spPr>
+            <p:txBody>
+              <a:bodyPr wrap="square">
+                <a:spAutoFit/>
+              </a:bodyPr>
+              <a:lstStyle/>
+              <a:p>
+                <a:pPr marL="914400" indent="-914400"/>
+                <a:r>
+                  <a:rPr lang="id-ID" sz="2400" smtClean="0">
+                    <a:solidFill>
+                      <a:srgbClr val="002060"/>
+                    </a:solidFill>
+                    <a:effectLst>
+                      <a:outerShdw blurRad="38100" dist="38100" dir="2700000" algn="tl">
+                        <a:srgbClr val="000000">
+                          <a:alpha val="43137"/>
+                        </a:srgbClr>
+                      </a:outerShdw>
+                    </a:effectLst>
+                    <a:latin typeface="Times New Roman" pitchFamily="18" charset="0"/>
+                    <a:cs typeface="Times New Roman" pitchFamily="18" charset="0"/>
+                  </a:rPr>
+                  <a:t>Algoritma  </a:t>
+                </a:r>
+                <a:r>
+                  <a:rPr lang="id-ID" sz="2400" smtClean="0">
+                    <a:solidFill>
+                      <a:srgbClr val="002060"/>
+                    </a:solidFill>
+                    <a:latin typeface="Times New Roman" pitchFamily="18" charset="0"/>
+                    <a:cs typeface="Times New Roman" pitchFamily="18" charset="0"/>
+                  </a:rPr>
+                  <a:t>: </a:t>
+                </a:r>
+              </a:p>
+              <a:p>
+                <a:pPr marL="914400" indent="-914400" algn="ctr">
+                  <a:buFont typeface="+mj-lt"/>
+                  <a:buAutoNum type="arabicPeriod"/>
+                </a:pPr>
+                <a:r>
+                  <a:rPr lang="id-ID" sz="2400" smtClean="0">
+                    <a:latin typeface="Times New Roman" pitchFamily="18" charset="0"/>
+                    <a:cs typeface="Times New Roman" pitchFamily="18" charset="0"/>
+                  </a:rPr>
+                  <a:t>Pindahkan isi B ke C</a:t>
+                </a:r>
+              </a:p>
+              <a:p>
+                <a:pPr marL="914400" indent="-914400" algn="ctr">
+                  <a:buFont typeface="+mj-lt"/>
+                  <a:buAutoNum type="arabicPeriod"/>
+                </a:pPr>
+                <a:r>
+                  <a:rPr lang="id-ID" sz="2400" smtClean="0">
+                    <a:latin typeface="Times New Roman" pitchFamily="18" charset="0"/>
+                    <a:cs typeface="Times New Roman" pitchFamily="18" charset="0"/>
+                  </a:rPr>
+                  <a:t>Pindahkan isi A ke B</a:t>
+                </a:r>
+              </a:p>
+              <a:p>
+                <a:pPr marL="914400" indent="-914400" algn="ctr">
+                  <a:buFont typeface="+mj-lt"/>
+                  <a:buAutoNum type="arabicPeriod"/>
+                </a:pPr>
+                <a:r>
+                  <a:rPr lang="id-ID" sz="2400" smtClean="0">
+                    <a:latin typeface="Times New Roman" pitchFamily="18" charset="0"/>
+                    <a:cs typeface="Times New Roman" pitchFamily="18" charset="0"/>
+                  </a:rPr>
+                  <a:t>Pindahkan isi C ke A</a:t>
+                </a:r>
+                <a:endParaRPr lang="id-ID" sz="2400">
                   <a:latin typeface="Times New Roman" pitchFamily="18" charset="0"/>
                   <a:cs typeface="Times New Roman" pitchFamily="18" charset="0"/>
-                </a:rPr>
-                <a:t>B</a:t>
-              </a:r>
-              <a:endParaRPr lang="id-ID" sz="4400"/>
-            </a:p>
-          </p:txBody>
-        </p:sp>
-        <p:pic>
-          <p:nvPicPr>
-            <p:cNvPr id="9" name="Picture 9" descr="D:\Users\GrandCross\Desktop\Transparant Bahan Ajar\gelaskosong.png"/>
-            <p:cNvPicPr>
-              <a:picLocks noChangeAspect="1" noChangeArrowheads="1"/>
-            </p:cNvPicPr>
-            <p:nvPr/>
-          </p:nvPicPr>
-          <p:blipFill>
-            <a:blip r:embed="rId3" cstate="print"/>
-            <a:srcRect t="6529"/>
-            <a:stretch>
-              <a:fillRect/>
-            </a:stretch>
-          </p:blipFill>
-          <p:spPr bwMode="auto">
-            <a:xfrm>
-              <a:off x="5943600" y="2514600"/>
-              <a:ext cx="2971800" cy="3773371"/>
-            </a:xfrm>
-            <a:prstGeom prst="rect">
-              <a:avLst/>
-            </a:prstGeom>
-            <a:noFill/>
-          </p:spPr>
-        </p:pic>
+                </a:endParaRPr>
+              </a:p>
+            </p:txBody>
+          </p:sp>
+        </p:grpSp>
       </p:grpSp>
-      <p:sp>
-        <p:nvSpPr>
-          <p:cNvPr id="10" name="Rectangle 9"/>
-          <p:cNvSpPr/>
-          <p:nvPr/>
-        </p:nvSpPr>
-        <p:spPr>
-          <a:xfrm>
-            <a:off x="6324600" y="1752600"/>
-            <a:ext cx="561372" cy="769441"/>
-          </a:xfrm>
-          <a:prstGeom prst="rect">
-            <a:avLst/>
-          </a:prstGeom>
-        </p:spPr>
-        <p:txBody>
-          <a:bodyPr wrap="none">
-            <a:spAutoFit/>
-          </a:bodyPr>
-          <a:lstStyle/>
-          <a:p>
-            <a:r>
-              <a:rPr lang="id-ID" sz="4400" smtClean="0">
-                <a:solidFill>
-                  <a:schemeClr val="tx2">
-                    <a:lumMod val="75000"/>
-                  </a:schemeClr>
-                </a:solidFill>
-                <a:effectLst>
-                  <a:outerShdw blurRad="38100" dist="38100" dir="2700000" algn="tl">
-                    <a:srgbClr val="000000">
-                      <a:alpha val="43137"/>
-                    </a:srgbClr>
-                  </a:outerShdw>
-                </a:effectLst>
-                <a:latin typeface="Times New Roman" pitchFamily="18" charset="0"/>
-                <a:cs typeface="Times New Roman" pitchFamily="18" charset="0"/>
-              </a:rPr>
-              <a:t>C</a:t>
-            </a:r>
-            <a:endParaRPr lang="id-ID" sz="4400"/>
-          </a:p>
-        </p:txBody>
-      </p:sp>
-      <p:sp>
-        <p:nvSpPr>
-          <p:cNvPr id="11" name="Rectangle 10"/>
-          <p:cNvSpPr/>
-          <p:nvPr/>
-        </p:nvSpPr>
-        <p:spPr>
-          <a:xfrm>
-            <a:off x="2743200" y="4800600"/>
-            <a:ext cx="3804439" cy="1569660"/>
-          </a:xfrm>
-          <a:prstGeom prst="rect">
-            <a:avLst/>
-          </a:prstGeom>
-        </p:spPr>
-        <p:txBody>
-          <a:bodyPr wrap="square">
-            <a:spAutoFit/>
-          </a:bodyPr>
-          <a:lstStyle/>
-          <a:p>
-            <a:pPr marL="914400" indent="-914400"/>
-            <a:r>
-              <a:rPr lang="id-ID" sz="2400" smtClean="0">
-                <a:solidFill>
-                  <a:srgbClr val="002060"/>
-                </a:solidFill>
-                <a:effectLst>
-                  <a:outerShdw blurRad="38100" dist="38100" dir="2700000" algn="tl">
-                    <a:srgbClr val="000000">
-                      <a:alpha val="43137"/>
-                    </a:srgbClr>
-                  </a:outerShdw>
-                </a:effectLst>
-                <a:latin typeface="Times New Roman" pitchFamily="18" charset="0"/>
-                <a:cs typeface="Times New Roman" pitchFamily="18" charset="0"/>
-              </a:rPr>
-              <a:t>Algoritma  </a:t>
-            </a:r>
-            <a:r>
-              <a:rPr lang="id-ID" sz="2400" smtClean="0">
-                <a:solidFill>
-                  <a:srgbClr val="002060"/>
-                </a:solidFill>
-                <a:latin typeface="Times New Roman" pitchFamily="18" charset="0"/>
-                <a:cs typeface="Times New Roman" pitchFamily="18" charset="0"/>
-              </a:rPr>
-              <a:t>: </a:t>
-            </a:r>
-          </a:p>
-          <a:p>
-            <a:pPr marL="914400" indent="-914400" algn="ctr">
-              <a:buFont typeface="+mj-lt"/>
-              <a:buAutoNum type="arabicPeriod"/>
-            </a:pPr>
-            <a:r>
-              <a:rPr lang="id-ID" sz="2400" smtClean="0">
-                <a:latin typeface="Times New Roman" pitchFamily="18" charset="0"/>
-                <a:cs typeface="Times New Roman" pitchFamily="18" charset="0"/>
-              </a:rPr>
-              <a:t>Pindahkan isi B ke C</a:t>
-            </a:r>
-          </a:p>
-          <a:p>
-            <a:pPr marL="914400" indent="-914400" algn="ctr">
-              <a:buFont typeface="+mj-lt"/>
-              <a:buAutoNum type="arabicPeriod"/>
-            </a:pPr>
-            <a:r>
-              <a:rPr lang="id-ID" sz="2400" smtClean="0">
-                <a:latin typeface="Times New Roman" pitchFamily="18" charset="0"/>
-                <a:cs typeface="Times New Roman" pitchFamily="18" charset="0"/>
-              </a:rPr>
-              <a:t>Pindahkan isi A ke B</a:t>
-            </a:r>
-          </a:p>
-          <a:p>
-            <a:pPr marL="914400" indent="-914400" algn="ctr">
-              <a:buFont typeface="+mj-lt"/>
-              <a:buAutoNum type="arabicPeriod"/>
-            </a:pPr>
-            <a:r>
-              <a:rPr lang="id-ID" sz="2400" smtClean="0">
-                <a:latin typeface="Times New Roman" pitchFamily="18" charset="0"/>
-                <a:cs typeface="Times New Roman" pitchFamily="18" charset="0"/>
-              </a:rPr>
-              <a:t>Pindahkan isi C ke A</a:t>
-            </a:r>
-            <a:endParaRPr lang="id-ID" sz="2400">
-              <a:latin typeface="Times New Roman" pitchFamily="18" charset="0"/>
-              <a:cs typeface="Times New Roman" pitchFamily="18" charset="0"/>
-            </a:endParaRPr>
-          </a:p>
-        </p:txBody>
-      </p:sp>
       <p:sp>
         <p:nvSpPr>
           <p:cNvPr id="23" name="Title 1"/>
@@ -11188,222 +12218,226 @@
           </a:p>
         </p:txBody>
       </p:sp>
-      <p:sp>
-        <p:nvSpPr>
-          <p:cNvPr id="9" name="Rectangle 8"/>
-          <p:cNvSpPr/>
-          <p:nvPr/>
-        </p:nvSpPr>
-        <p:spPr>
-          <a:xfrm>
-            <a:off x="914400" y="2209800"/>
-            <a:ext cx="6019800" cy="3785652"/>
-          </a:xfrm>
-          <a:prstGeom prst="rect">
-            <a:avLst/>
-          </a:prstGeom>
-        </p:spPr>
-        <p:txBody>
-          <a:bodyPr wrap="square">
-            <a:spAutoFit/>
-          </a:bodyPr>
-          <a:lstStyle/>
-          <a:p>
-            <a:pPr marL="914400" indent="-914400"/>
-            <a:r>
-              <a:rPr lang="id-ID" sz="2400" smtClean="0">
-                <a:solidFill>
-                  <a:srgbClr val="002060"/>
-                </a:solidFill>
-                <a:effectLst>
-                  <a:outerShdw blurRad="38100" dist="38100" dir="2700000" algn="tl">
-                    <a:srgbClr val="000000">
-                      <a:alpha val="43137"/>
-                    </a:srgbClr>
-                  </a:outerShdw>
-                </a:effectLst>
-                <a:latin typeface="Times New Roman" pitchFamily="18" charset="0"/>
-                <a:cs typeface="Times New Roman" pitchFamily="18" charset="0"/>
-              </a:rPr>
-              <a:t>Algoritma  </a:t>
-            </a:r>
-            <a:r>
-              <a:rPr lang="id-ID" sz="2400" smtClean="0">
-                <a:solidFill>
-                  <a:srgbClr val="002060"/>
-                </a:solidFill>
-                <a:latin typeface="Times New Roman" pitchFamily="18" charset="0"/>
-                <a:cs typeface="Times New Roman" pitchFamily="18" charset="0"/>
-              </a:rPr>
-              <a:t>: </a:t>
-            </a:r>
-          </a:p>
-          <a:p>
-            <a:pPr marL="914400" indent="-914400"/>
-            <a:r>
-              <a:rPr lang="id-ID" sz="2400" smtClean="0">
-                <a:latin typeface="Times New Roman" pitchFamily="18" charset="0"/>
-                <a:cs typeface="Times New Roman" pitchFamily="18" charset="0"/>
-              </a:rPr>
-              <a:t>Jika kertas, </a:t>
-            </a:r>
-          </a:p>
-          <a:p>
-            <a:pPr marL="914400" indent="-914400"/>
-            <a:r>
-              <a:rPr lang="id-ID" sz="2400" smtClean="0">
-                <a:latin typeface="Times New Roman" pitchFamily="18" charset="0"/>
-                <a:cs typeface="Times New Roman" pitchFamily="18" charset="0"/>
-              </a:rPr>
-              <a:t>	masukkan ke tong </a:t>
-            </a:r>
-            <a:r>
-              <a:rPr lang="id-ID" sz="2400" smtClean="0">
-                <a:latin typeface="Times New Roman" pitchFamily="18" charset="0"/>
-                <a:cs typeface="Times New Roman" pitchFamily="18" charset="0"/>
-              </a:rPr>
-              <a:t>biru</a:t>
-            </a:r>
-            <a:endParaRPr lang="id-ID" sz="2400" smtClean="0">
-              <a:latin typeface="Times New Roman" pitchFamily="18" charset="0"/>
-              <a:cs typeface="Times New Roman" pitchFamily="18" charset="0"/>
-            </a:endParaRPr>
-          </a:p>
-          <a:p>
-            <a:pPr marL="914400" indent="-914400"/>
-            <a:r>
-              <a:rPr lang="id-ID" sz="2400" smtClean="0">
-                <a:latin typeface="Times New Roman" pitchFamily="18" charset="0"/>
-                <a:cs typeface="Times New Roman" pitchFamily="18" charset="0"/>
-              </a:rPr>
-              <a:t>Jika plastik</a:t>
-            </a:r>
-          </a:p>
-          <a:p>
-            <a:pPr marL="914400" indent="-914400"/>
-            <a:r>
-              <a:rPr lang="id-ID" sz="2400" smtClean="0">
-                <a:latin typeface="Times New Roman" pitchFamily="18" charset="0"/>
-                <a:cs typeface="Times New Roman" pitchFamily="18" charset="0"/>
-              </a:rPr>
-              <a:t>	masukkan ke tong hijau</a:t>
-            </a:r>
-          </a:p>
-          <a:p>
-            <a:pPr marL="914400" indent="-914400"/>
-            <a:r>
-              <a:rPr lang="id-ID" sz="2400" smtClean="0">
-                <a:latin typeface="Times New Roman" pitchFamily="18" charset="0"/>
-                <a:cs typeface="Times New Roman" pitchFamily="18" charset="0"/>
-              </a:rPr>
-              <a:t>Jika kaleng </a:t>
-            </a:r>
-          </a:p>
-          <a:p>
-            <a:pPr marL="914400" indent="-914400"/>
-            <a:r>
-              <a:rPr lang="id-ID" sz="2400" smtClean="0">
-                <a:latin typeface="Times New Roman" pitchFamily="18" charset="0"/>
-                <a:cs typeface="Times New Roman" pitchFamily="18" charset="0"/>
-              </a:rPr>
-              <a:t>	masukkan ke tong kuning</a:t>
-            </a:r>
-          </a:p>
-          <a:p>
-            <a:pPr marL="914400" indent="-914400"/>
-            <a:r>
-              <a:rPr lang="id-ID" sz="2400" smtClean="0">
-                <a:latin typeface="Times New Roman" pitchFamily="18" charset="0"/>
-                <a:cs typeface="Times New Roman" pitchFamily="18" charset="0"/>
-              </a:rPr>
-              <a:t>Jika gelas,</a:t>
-            </a:r>
-          </a:p>
-          <a:p>
-            <a:pPr marL="914400" indent="-914400"/>
-            <a:r>
-              <a:rPr lang="id-ID" sz="2400" smtClean="0">
-                <a:latin typeface="Times New Roman" pitchFamily="18" charset="0"/>
-                <a:cs typeface="Times New Roman" pitchFamily="18" charset="0"/>
-              </a:rPr>
-              <a:t>	masukkan ke tong merah </a:t>
-            </a:r>
-          </a:p>
-          <a:p>
-            <a:pPr marL="914400" indent="-914400" algn="ctr"/>
-            <a:endParaRPr lang="id-ID" sz="2400">
-              <a:latin typeface="Times New Roman" pitchFamily="18" charset="0"/>
-              <a:cs typeface="Times New Roman" pitchFamily="18" charset="0"/>
-            </a:endParaRPr>
-          </a:p>
-        </p:txBody>
-      </p:sp>
       <p:grpSp>
         <p:nvGrpSpPr>
-          <p:cNvPr id="7" name="Group 6"/>
+          <p:cNvPr id="8" name="Group 7"/>
           <p:cNvGrpSpPr/>
           <p:nvPr/>
         </p:nvGrpSpPr>
         <p:grpSpPr>
           <a:xfrm>
-            <a:off x="5715000" y="1828800"/>
-            <a:ext cx="2895600" cy="4152900"/>
-            <a:chOff x="6248400" y="1828800"/>
-            <a:chExt cx="2895600" cy="4152900"/>
+            <a:off x="914400" y="1828800"/>
+            <a:ext cx="7696200" cy="4166652"/>
+            <a:chOff x="914400" y="1828800"/>
+            <a:chExt cx="7696200" cy="4166652"/>
           </a:xfrm>
         </p:grpSpPr>
-        <p:pic>
-          <p:nvPicPr>
-            <p:cNvPr id="1029" name="Picture 5" descr="D:\Users\GrandCross\Desktop\Transparant Bahan Ajar\Bins.png"/>
-            <p:cNvPicPr>
-              <a:picLocks noChangeAspect="1" noChangeArrowheads="1"/>
-            </p:cNvPicPr>
+        <p:sp>
+          <p:nvSpPr>
+            <p:cNvPr id="9" name="Rectangle 8"/>
+            <p:cNvSpPr/>
             <p:nvPr/>
-          </p:nvPicPr>
-          <p:blipFill>
-            <a:blip r:embed="rId2"/>
-            <a:srcRect r="49347"/>
-            <a:stretch>
-              <a:fillRect/>
-            </a:stretch>
-          </p:blipFill>
-          <p:spPr bwMode="auto">
+          </p:nvSpPr>
+          <p:spPr>
             <a:xfrm>
-              <a:off x="6248400" y="1828800"/>
-              <a:ext cx="2895600" cy="2095500"/>
+              <a:off x="914400" y="2209800"/>
+              <a:ext cx="6019800" cy="3785652"/>
             </a:xfrm>
             <a:prstGeom prst="rect">
               <a:avLst/>
             </a:prstGeom>
-            <a:noFill/>
           </p:spPr>
-        </p:pic>
-        <p:pic>
-          <p:nvPicPr>
-            <p:cNvPr id="10" name="Picture 5" descr="D:\Users\GrandCross\Desktop\Transparant Bahan Ajar\Bins.png"/>
-            <p:cNvPicPr>
-              <a:picLocks noChangeAspect="1" noChangeArrowheads="1"/>
-            </p:cNvPicPr>
+          <p:txBody>
+            <a:bodyPr wrap="square">
+              <a:spAutoFit/>
+            </a:bodyPr>
+            <a:lstStyle/>
+            <a:p>
+              <a:pPr marL="914400" indent="-914400"/>
+              <a:r>
+                <a:rPr lang="id-ID" sz="2400" smtClean="0">
+                  <a:solidFill>
+                    <a:srgbClr val="002060"/>
+                  </a:solidFill>
+                  <a:effectLst>
+                    <a:outerShdw blurRad="38100" dist="38100" dir="2700000" algn="tl">
+                      <a:srgbClr val="000000">
+                        <a:alpha val="43137"/>
+                      </a:srgbClr>
+                    </a:outerShdw>
+                  </a:effectLst>
+                  <a:latin typeface="Times New Roman" pitchFamily="18" charset="0"/>
+                  <a:cs typeface="Times New Roman" pitchFamily="18" charset="0"/>
+                </a:rPr>
+                <a:t>Algoritma  </a:t>
+              </a:r>
+              <a:r>
+                <a:rPr lang="id-ID" sz="2400" smtClean="0">
+                  <a:solidFill>
+                    <a:srgbClr val="002060"/>
+                  </a:solidFill>
+                  <a:latin typeface="Times New Roman" pitchFamily="18" charset="0"/>
+                  <a:cs typeface="Times New Roman" pitchFamily="18" charset="0"/>
+                </a:rPr>
+                <a:t>: </a:t>
+              </a:r>
+            </a:p>
+            <a:p>
+              <a:pPr marL="914400" indent="-914400"/>
+              <a:r>
+                <a:rPr lang="id-ID" sz="2400" smtClean="0">
+                  <a:latin typeface="Times New Roman" pitchFamily="18" charset="0"/>
+                  <a:cs typeface="Times New Roman" pitchFamily="18" charset="0"/>
+                </a:rPr>
+                <a:t>Jika kertas, </a:t>
+              </a:r>
+            </a:p>
+            <a:p>
+              <a:pPr marL="914400" indent="-914400"/>
+              <a:r>
+                <a:rPr lang="id-ID" sz="2400" smtClean="0">
+                  <a:latin typeface="Times New Roman" pitchFamily="18" charset="0"/>
+                  <a:cs typeface="Times New Roman" pitchFamily="18" charset="0"/>
+                </a:rPr>
+                <a:t>	masukkan ke tong biru</a:t>
+              </a:r>
+            </a:p>
+            <a:p>
+              <a:pPr marL="914400" indent="-914400"/>
+              <a:r>
+                <a:rPr lang="id-ID" sz="2400" smtClean="0">
+                  <a:latin typeface="Times New Roman" pitchFamily="18" charset="0"/>
+                  <a:cs typeface="Times New Roman" pitchFamily="18" charset="0"/>
+                </a:rPr>
+                <a:t>Jika plastik</a:t>
+              </a:r>
+            </a:p>
+            <a:p>
+              <a:pPr marL="914400" indent="-914400"/>
+              <a:r>
+                <a:rPr lang="id-ID" sz="2400" smtClean="0">
+                  <a:latin typeface="Times New Roman" pitchFamily="18" charset="0"/>
+                  <a:cs typeface="Times New Roman" pitchFamily="18" charset="0"/>
+                </a:rPr>
+                <a:t>	masukkan ke tong hijau</a:t>
+              </a:r>
+            </a:p>
+            <a:p>
+              <a:pPr marL="914400" indent="-914400"/>
+              <a:r>
+                <a:rPr lang="id-ID" sz="2400" smtClean="0">
+                  <a:latin typeface="Times New Roman" pitchFamily="18" charset="0"/>
+                  <a:cs typeface="Times New Roman" pitchFamily="18" charset="0"/>
+                </a:rPr>
+                <a:t>Jika kaleng </a:t>
+              </a:r>
+            </a:p>
+            <a:p>
+              <a:pPr marL="914400" indent="-914400"/>
+              <a:r>
+                <a:rPr lang="id-ID" sz="2400" smtClean="0">
+                  <a:latin typeface="Times New Roman" pitchFamily="18" charset="0"/>
+                  <a:cs typeface="Times New Roman" pitchFamily="18" charset="0"/>
+                </a:rPr>
+                <a:t>	masukkan ke tong kuning</a:t>
+              </a:r>
+            </a:p>
+            <a:p>
+              <a:pPr marL="914400" indent="-914400"/>
+              <a:r>
+                <a:rPr lang="id-ID" sz="2400" smtClean="0">
+                  <a:latin typeface="Times New Roman" pitchFamily="18" charset="0"/>
+                  <a:cs typeface="Times New Roman" pitchFamily="18" charset="0"/>
+                </a:rPr>
+                <a:t>Jika gelas,</a:t>
+              </a:r>
+            </a:p>
+            <a:p>
+              <a:pPr marL="914400" indent="-914400"/>
+              <a:r>
+                <a:rPr lang="id-ID" sz="2400" smtClean="0">
+                  <a:latin typeface="Times New Roman" pitchFamily="18" charset="0"/>
+                  <a:cs typeface="Times New Roman" pitchFamily="18" charset="0"/>
+                </a:rPr>
+                <a:t>	masukkan ke tong merah </a:t>
+              </a:r>
+            </a:p>
+            <a:p>
+              <a:pPr marL="914400" indent="-914400" algn="ctr"/>
+              <a:endParaRPr lang="id-ID" sz="2400">
+                <a:latin typeface="Times New Roman" pitchFamily="18" charset="0"/>
+                <a:cs typeface="Times New Roman" pitchFamily="18" charset="0"/>
+              </a:endParaRPr>
+            </a:p>
+          </p:txBody>
+        </p:sp>
+        <p:grpSp>
+          <p:nvGrpSpPr>
+            <p:cNvPr id="7" name="Group 6"/>
+            <p:cNvGrpSpPr/>
             <p:nvPr/>
-          </p:nvPicPr>
-          <p:blipFill>
-            <a:blip r:embed="rId2"/>
-            <a:srcRect l="51986"/>
-            <a:stretch>
-              <a:fillRect/>
-            </a:stretch>
-          </p:blipFill>
-          <p:spPr bwMode="auto">
+          </p:nvGrpSpPr>
+          <p:grpSpPr>
             <a:xfrm>
-              <a:off x="6248400" y="3886200"/>
-              <a:ext cx="2744788" cy="2095500"/>
+              <a:off x="5715000" y="1828800"/>
+              <a:ext cx="2895600" cy="4152900"/>
+              <a:chOff x="6248400" y="1828800"/>
+              <a:chExt cx="2895600" cy="4152900"/>
             </a:xfrm>
-            <a:prstGeom prst="rect">
-              <a:avLst/>
-            </a:prstGeom>
-            <a:noFill/>
-          </p:spPr>
-        </p:pic>
+          </p:grpSpPr>
+          <p:pic>
+            <p:nvPicPr>
+              <p:cNvPr id="1029" name="Picture 5" descr="D:\Users\GrandCross\Desktop\Transparant Bahan Ajar\Bins.png"/>
+              <p:cNvPicPr>
+                <a:picLocks noChangeAspect="1" noChangeArrowheads="1"/>
+              </p:cNvPicPr>
+              <p:nvPr/>
+            </p:nvPicPr>
+            <p:blipFill>
+              <a:blip r:embed="rId2"/>
+              <a:srcRect r="49347"/>
+              <a:stretch>
+                <a:fillRect/>
+              </a:stretch>
+            </p:blipFill>
+            <p:spPr bwMode="auto">
+              <a:xfrm>
+                <a:off x="6248400" y="1828800"/>
+                <a:ext cx="2895600" cy="2095500"/>
+              </a:xfrm>
+              <a:prstGeom prst="rect">
+                <a:avLst/>
+              </a:prstGeom>
+              <a:noFill/>
+            </p:spPr>
+          </p:pic>
+          <p:pic>
+            <p:nvPicPr>
+              <p:cNvPr id="10" name="Picture 5" descr="D:\Users\GrandCross\Desktop\Transparant Bahan Ajar\Bins.png"/>
+              <p:cNvPicPr>
+                <a:picLocks noChangeAspect="1" noChangeArrowheads="1"/>
+              </p:cNvPicPr>
+              <p:nvPr/>
+            </p:nvPicPr>
+            <p:blipFill>
+              <a:blip r:embed="rId2"/>
+              <a:srcRect l="51986"/>
+              <a:stretch>
+                <a:fillRect/>
+              </a:stretch>
+            </p:blipFill>
+            <p:spPr bwMode="auto">
+              <a:xfrm>
+                <a:off x="6248400" y="3886200"/>
+                <a:ext cx="2744788" cy="2095500"/>
+              </a:xfrm>
+              <a:prstGeom prst="rect">
+                <a:avLst/>
+              </a:prstGeom>
+              <a:noFill/>
+            </p:spPr>
+          </p:pic>
+        </p:grpSp>
       </p:grpSp>
       <p:sp>
         <p:nvSpPr>
@@ -11573,155 +12607,170 @@
           </a:p>
         </p:txBody>
       </p:sp>
-      <p:pic>
-        <p:nvPicPr>
-          <p:cNvPr id="4" name="Picture 2" descr="D:\Users\GrandCross\Desktop\Transparant Bahan Ajar\JarOfCandy.png"/>
-          <p:cNvPicPr>
-            <a:picLocks noChangeAspect="1" noChangeArrowheads="1"/>
-          </p:cNvPicPr>
+      <p:grpSp>
+        <p:nvGrpSpPr>
+          <p:cNvPr id="6" name="Group 5"/>
+          <p:cNvGrpSpPr/>
           <p:nvPr/>
-        </p:nvPicPr>
-        <p:blipFill>
-          <a:blip r:embed="rId2"/>
-          <a:srcRect/>
-          <a:stretch>
-            <a:fillRect/>
-          </a:stretch>
-        </p:blipFill>
-        <p:spPr bwMode="auto">
+        </p:nvGrpSpPr>
+        <p:grpSpPr>
           <a:xfrm>
             <a:off x="-228600" y="1828800"/>
-            <a:ext cx="3810000" cy="3810000"/>
+            <a:ext cx="9601200" cy="3810000"/>
+            <a:chOff x="-228600" y="1828800"/>
+            <a:chExt cx="9601200" cy="3810000"/>
           </a:xfrm>
-          <a:prstGeom prst="rect">
-            <a:avLst/>
-          </a:prstGeom>
-          <a:noFill/>
-        </p:spPr>
-      </p:pic>
-      <p:sp>
-        <p:nvSpPr>
-          <p:cNvPr id="5" name="Rectangle 4"/>
-          <p:cNvSpPr/>
-          <p:nvPr/>
-        </p:nvSpPr>
-        <p:spPr>
-          <a:xfrm>
-            <a:off x="3352800" y="2819400"/>
-            <a:ext cx="6019800" cy="2677656"/>
-          </a:xfrm>
-          <a:prstGeom prst="rect">
-            <a:avLst/>
-          </a:prstGeom>
-        </p:spPr>
-        <p:txBody>
-          <a:bodyPr wrap="square">
-            <a:spAutoFit/>
-          </a:bodyPr>
-          <a:lstStyle/>
-          <a:p>
-            <a:pPr marL="914400" indent="-914400"/>
-            <a:r>
-              <a:rPr lang="id-ID" sz="2400" smtClean="0">
-                <a:solidFill>
-                  <a:srgbClr val="002060"/>
-                </a:solidFill>
-                <a:effectLst>
-                  <a:outerShdw blurRad="38100" dist="38100" dir="2700000" algn="tl">
-                    <a:srgbClr val="000000">
-                      <a:alpha val="43137"/>
-                    </a:srgbClr>
-                  </a:outerShdw>
-                </a:effectLst>
-                <a:latin typeface="Times New Roman" pitchFamily="18" charset="0"/>
-                <a:cs typeface="Times New Roman" pitchFamily="18" charset="0"/>
-              </a:rPr>
-              <a:t>Algoritma  </a:t>
-            </a:r>
-            <a:r>
-              <a:rPr lang="id-ID" sz="2400" smtClean="0">
-                <a:solidFill>
-                  <a:srgbClr val="002060"/>
-                </a:solidFill>
-                <a:latin typeface="Times New Roman" pitchFamily="18" charset="0"/>
-                <a:cs typeface="Times New Roman" pitchFamily="18" charset="0"/>
-              </a:rPr>
-              <a:t>: </a:t>
-            </a:r>
-          </a:p>
-          <a:p>
-            <a:pPr marL="914400" indent="-914400"/>
-            <a:r>
-              <a:rPr lang="id-ID" sz="2400" b="1" smtClean="0">
-                <a:latin typeface="Times New Roman" pitchFamily="18" charset="0"/>
-                <a:cs typeface="Times New Roman" pitchFamily="18" charset="0"/>
-              </a:rPr>
-              <a:t>Lakukan</a:t>
-            </a:r>
-            <a:r>
-              <a:rPr lang="id-ID" sz="2400" smtClean="0">
-                <a:latin typeface="Times New Roman" pitchFamily="18" charset="0"/>
-                <a:cs typeface="Times New Roman" pitchFamily="18" charset="0"/>
-              </a:rPr>
-              <a:t> : </a:t>
-            </a:r>
-          </a:p>
-          <a:p>
-            <a:pPr marL="914400" indent="-914400"/>
-            <a:r>
-              <a:rPr lang="id-ID" sz="2400" smtClean="0">
-                <a:latin typeface="Times New Roman" pitchFamily="18" charset="0"/>
-                <a:cs typeface="Times New Roman" pitchFamily="18" charset="0"/>
-              </a:rPr>
-              <a:t>Berikan Satu Permen Kepada Anak Pertama</a:t>
-            </a:r>
-          </a:p>
-          <a:p>
-            <a:pPr marL="914400" indent="-914400"/>
-            <a:r>
-              <a:rPr lang="id-ID" sz="2400" smtClean="0">
-                <a:latin typeface="Times New Roman" pitchFamily="18" charset="0"/>
-                <a:cs typeface="Times New Roman" pitchFamily="18" charset="0"/>
-              </a:rPr>
-              <a:t>Berikan Satu Permen Kepada Anak Kedua</a:t>
-            </a:r>
-          </a:p>
-          <a:p>
-            <a:pPr marL="914400" indent="-914400"/>
-            <a:r>
-              <a:rPr lang="id-ID" sz="2400" smtClean="0">
-                <a:latin typeface="Times New Roman" pitchFamily="18" charset="0"/>
-                <a:cs typeface="Times New Roman" pitchFamily="18" charset="0"/>
-              </a:rPr>
-              <a:t>Berikan Satu Permen Kepada Anak Ketiga</a:t>
-            </a:r>
-          </a:p>
-          <a:p>
-            <a:pPr marL="914400" indent="-914400"/>
-            <a:r>
-              <a:rPr lang="id-ID" sz="2400" b="1" smtClean="0">
-                <a:latin typeface="Times New Roman" pitchFamily="18" charset="0"/>
-                <a:cs typeface="Times New Roman" pitchFamily="18" charset="0"/>
-              </a:rPr>
-              <a:t>Sampai</a:t>
-            </a:r>
-            <a:r>
-              <a:rPr lang="id-ID" sz="2400" smtClean="0">
-                <a:latin typeface="Times New Roman" pitchFamily="18" charset="0"/>
-                <a:cs typeface="Times New Roman" pitchFamily="18" charset="0"/>
-              </a:rPr>
-              <a:t> Permen Habis</a:t>
-            </a:r>
-          </a:p>
-          <a:p>
-            <a:pPr marL="914400" indent="-914400" algn="ctr"/>
-            <a:endParaRPr lang="id-ID" sz="2400">
-              <a:latin typeface="Times New Roman" pitchFamily="18" charset="0"/>
-              <a:cs typeface="Times New Roman" pitchFamily="18" charset="0"/>
-            </a:endParaRPr>
-          </a:p>
-        </p:txBody>
-      </p:sp>
+        </p:grpSpPr>
+        <p:pic>
+          <p:nvPicPr>
+            <p:cNvPr id="4" name="Picture 2" descr="D:\Users\GrandCross\Desktop\Transparant Bahan Ajar\JarOfCandy.png"/>
+            <p:cNvPicPr>
+              <a:picLocks noChangeAspect="1" noChangeArrowheads="1"/>
+            </p:cNvPicPr>
+            <p:nvPr/>
+          </p:nvPicPr>
+          <p:blipFill>
+            <a:blip r:embed="rId2"/>
+            <a:srcRect/>
+            <a:stretch>
+              <a:fillRect/>
+            </a:stretch>
+          </p:blipFill>
+          <p:spPr bwMode="auto">
+            <a:xfrm>
+              <a:off x="-228600" y="1828800"/>
+              <a:ext cx="3810000" cy="3810000"/>
+            </a:xfrm>
+            <a:prstGeom prst="rect">
+              <a:avLst/>
+            </a:prstGeom>
+            <a:noFill/>
+          </p:spPr>
+        </p:pic>
+        <p:sp>
+          <p:nvSpPr>
+            <p:cNvPr id="5" name="Rectangle 4"/>
+            <p:cNvSpPr/>
+            <p:nvPr/>
+          </p:nvSpPr>
+          <p:spPr>
+            <a:xfrm>
+              <a:off x="3352800" y="2819400"/>
+              <a:ext cx="6019800" cy="2677656"/>
+            </a:xfrm>
+            <a:prstGeom prst="rect">
+              <a:avLst/>
+            </a:prstGeom>
+          </p:spPr>
+          <p:txBody>
+            <a:bodyPr wrap="square">
+              <a:spAutoFit/>
+            </a:bodyPr>
+            <a:lstStyle/>
+            <a:p>
+              <a:pPr marL="914400" indent="-914400"/>
+              <a:r>
+                <a:rPr lang="id-ID" sz="2400" smtClean="0">
+                  <a:solidFill>
+                    <a:srgbClr val="002060"/>
+                  </a:solidFill>
+                  <a:effectLst>
+                    <a:outerShdw blurRad="38100" dist="38100" dir="2700000" algn="tl">
+                      <a:srgbClr val="000000">
+                        <a:alpha val="43137"/>
+                      </a:srgbClr>
+                    </a:outerShdw>
+                  </a:effectLst>
+                  <a:latin typeface="Times New Roman" pitchFamily="18" charset="0"/>
+                  <a:cs typeface="Times New Roman" pitchFamily="18" charset="0"/>
+                </a:rPr>
+                <a:t>Algoritma  </a:t>
+              </a:r>
+              <a:r>
+                <a:rPr lang="id-ID" sz="2400" smtClean="0">
+                  <a:solidFill>
+                    <a:srgbClr val="002060"/>
+                  </a:solidFill>
+                  <a:latin typeface="Times New Roman" pitchFamily="18" charset="0"/>
+                  <a:cs typeface="Times New Roman" pitchFamily="18" charset="0"/>
+                </a:rPr>
+                <a:t>: </a:t>
+              </a:r>
+            </a:p>
+            <a:p>
+              <a:pPr marL="914400" indent="-914400"/>
+              <a:r>
+                <a:rPr lang="id-ID" sz="2400" b="1" smtClean="0">
+                  <a:latin typeface="Times New Roman" pitchFamily="18" charset="0"/>
+                  <a:cs typeface="Times New Roman" pitchFamily="18" charset="0"/>
+                </a:rPr>
+                <a:t>Lakukan</a:t>
+              </a:r>
+              <a:r>
+                <a:rPr lang="id-ID" sz="2400" smtClean="0">
+                  <a:latin typeface="Times New Roman" pitchFamily="18" charset="0"/>
+                  <a:cs typeface="Times New Roman" pitchFamily="18" charset="0"/>
+                </a:rPr>
+                <a:t> : </a:t>
+              </a:r>
+            </a:p>
+            <a:p>
+              <a:pPr marL="914400" indent="-914400"/>
+              <a:r>
+                <a:rPr lang="id-ID" sz="2400" smtClean="0">
+                  <a:latin typeface="Times New Roman" pitchFamily="18" charset="0"/>
+                  <a:cs typeface="Times New Roman" pitchFamily="18" charset="0"/>
+                </a:rPr>
+                <a:t>Berikan Satu Permen Kepada Anak Pertama</a:t>
+              </a:r>
+            </a:p>
+            <a:p>
+              <a:pPr marL="914400" indent="-914400"/>
+              <a:r>
+                <a:rPr lang="id-ID" sz="2400" smtClean="0">
+                  <a:latin typeface="Times New Roman" pitchFamily="18" charset="0"/>
+                  <a:cs typeface="Times New Roman" pitchFamily="18" charset="0"/>
+                </a:rPr>
+                <a:t>Berikan Satu Permen Kepada Anak Kedua</a:t>
+              </a:r>
+            </a:p>
+            <a:p>
+              <a:pPr marL="914400" indent="-914400"/>
+              <a:r>
+                <a:rPr lang="id-ID" sz="2400" smtClean="0">
+                  <a:latin typeface="Times New Roman" pitchFamily="18" charset="0"/>
+                  <a:cs typeface="Times New Roman" pitchFamily="18" charset="0"/>
+                </a:rPr>
+                <a:t>Berikan Satu Permen Kepada Anak Ketiga</a:t>
+              </a:r>
+            </a:p>
+            <a:p>
+              <a:pPr marL="914400" indent="-914400"/>
+              <a:r>
+                <a:rPr lang="id-ID" sz="2400" b="1" smtClean="0">
+                  <a:latin typeface="Times New Roman" pitchFamily="18" charset="0"/>
+                  <a:cs typeface="Times New Roman" pitchFamily="18" charset="0"/>
+                </a:rPr>
+                <a:t>Sampai</a:t>
+              </a:r>
+              <a:r>
+                <a:rPr lang="id-ID" sz="2400" smtClean="0">
+                  <a:latin typeface="Times New Roman" pitchFamily="18" charset="0"/>
+                  <a:cs typeface="Times New Roman" pitchFamily="18" charset="0"/>
+                </a:rPr>
+                <a:t> Permen Habis</a:t>
+              </a:r>
+            </a:p>
+            <a:p>
+              <a:pPr marL="914400" indent="-914400" algn="ctr"/>
+              <a:endParaRPr lang="id-ID" sz="2400">
+                <a:latin typeface="Times New Roman" pitchFamily="18" charset="0"/>
+                <a:cs typeface="Times New Roman" pitchFamily="18" charset="0"/>
+              </a:endParaRPr>
+            </a:p>
+          </p:txBody>
+        </p:sp>
+      </p:grpSp>
       <p:sp>
         <p:nvSpPr>
           <p:cNvPr id="7" name="Title 1"/>

</xml_diff>

<commit_message>
Final Dari Andrew untuk Pertemuan 1 & 2(Butuh Masukkan lagi)
</commit_message>
<xml_diff>
--- a/Presentasi/Pertemuan 2 Pengenalan Algoritma.pptx
+++ b/Presentasi/Pertemuan 2 Pengenalan Algoritma.pptx
@@ -7656,10 +7656,16 @@
                     <a:p>
                       <a:pPr algn="ctr"/>
                       <a:r>
-                        <a:rPr lang="id-ID" smtClean="0"/>
+                        <a:rPr lang="id-ID" smtClean="0">
+                          <a:latin typeface="Times New Roman" pitchFamily="18" charset="0"/>
+                          <a:cs typeface="Times New Roman" pitchFamily="18" charset="0"/>
+                        </a:rPr>
                         <a:t>Operasi</a:t>
                       </a:r>
-                      <a:endParaRPr lang="id-ID"/>
+                      <a:endParaRPr lang="id-ID">
+                        <a:latin typeface="Times New Roman" pitchFamily="18" charset="0"/>
+                        <a:cs typeface="Times New Roman" pitchFamily="18" charset="0"/>
+                      </a:endParaRPr>
                     </a:p>
                   </a:txBody>
                   <a:tcPr/>
@@ -7671,10 +7677,16 @@
                     <a:p>
                       <a:pPr algn="ctr"/>
                       <a:r>
-                        <a:rPr lang="id-ID" smtClean="0"/>
+                        <a:rPr lang="id-ID" smtClean="0">
+                          <a:latin typeface="Times New Roman" pitchFamily="18" charset="0"/>
+                          <a:cs typeface="Times New Roman" pitchFamily="18" charset="0"/>
+                        </a:rPr>
                         <a:t>Simbol</a:t>
                       </a:r>
-                      <a:endParaRPr lang="id-ID"/>
+                      <a:endParaRPr lang="id-ID">
+                        <a:latin typeface="Times New Roman" pitchFamily="18" charset="0"/>
+                        <a:cs typeface="Times New Roman" pitchFamily="18" charset="0"/>
+                      </a:endParaRPr>
                     </a:p>
                   </a:txBody>
                   <a:tcPr/>
@@ -7686,10 +7698,16 @@
                     <a:p>
                       <a:pPr algn="ctr"/>
                       <a:r>
-                        <a:rPr lang="id-ID" smtClean="0"/>
+                        <a:rPr lang="id-ID" smtClean="0">
+                          <a:latin typeface="Times New Roman" pitchFamily="18" charset="0"/>
+                          <a:cs typeface="Times New Roman" pitchFamily="18" charset="0"/>
+                        </a:rPr>
                         <a:t>Python</a:t>
                       </a:r>
-                      <a:endParaRPr lang="id-ID"/>
+                      <a:endParaRPr lang="id-ID">
+                        <a:latin typeface="Times New Roman" pitchFamily="18" charset="0"/>
+                        <a:cs typeface="Times New Roman" pitchFamily="18" charset="0"/>
+                      </a:endParaRPr>
                     </a:p>
                   </a:txBody>
                   <a:tcPr/>
@@ -7703,10 +7721,16 @@
                     <a:p>
                       <a:pPr algn="ctr"/>
                       <a:r>
-                        <a:rPr lang="id-ID" smtClean="0"/>
+                        <a:rPr lang="id-ID" smtClean="0">
+                          <a:latin typeface="Times New Roman" pitchFamily="18" charset="0"/>
+                          <a:cs typeface="Times New Roman" pitchFamily="18" charset="0"/>
+                        </a:rPr>
                         <a:t>Penambahan</a:t>
                       </a:r>
-                      <a:endParaRPr lang="id-ID"/>
+                      <a:endParaRPr lang="id-ID">
+                        <a:latin typeface="Times New Roman" pitchFamily="18" charset="0"/>
+                        <a:cs typeface="Times New Roman" pitchFamily="18" charset="0"/>
+                      </a:endParaRPr>
                     </a:p>
                   </a:txBody>
                   <a:tcPr/>
@@ -7718,10 +7742,16 @@
                     <a:p>
                       <a:pPr algn="ctr"/>
                       <a:r>
-                        <a:rPr lang="id-ID" smtClean="0"/>
+                        <a:rPr lang="id-ID" smtClean="0">
+                          <a:latin typeface="Times New Roman" pitchFamily="18" charset="0"/>
+                          <a:cs typeface="Times New Roman" pitchFamily="18" charset="0"/>
+                        </a:rPr>
                         <a:t>+</a:t>
                       </a:r>
-                      <a:endParaRPr lang="id-ID"/>
+                      <a:endParaRPr lang="id-ID">
+                        <a:latin typeface="Times New Roman" pitchFamily="18" charset="0"/>
+                        <a:cs typeface="Times New Roman" pitchFamily="18" charset="0"/>
+                      </a:endParaRPr>
                     </a:p>
                   </a:txBody>
                   <a:tcPr/>
@@ -7733,10 +7763,16 @@
                     <a:p>
                       <a:pPr algn="ctr"/>
                       <a:r>
-                        <a:rPr lang="id-ID" smtClean="0"/>
+                        <a:rPr lang="id-ID" smtClean="0">
+                          <a:latin typeface="Times New Roman" pitchFamily="18" charset="0"/>
+                          <a:cs typeface="Times New Roman" pitchFamily="18" charset="0"/>
+                        </a:rPr>
                         <a:t>+</a:t>
                       </a:r>
-                      <a:endParaRPr lang="id-ID"/>
+                      <a:endParaRPr lang="id-ID">
+                        <a:latin typeface="Times New Roman" pitchFamily="18" charset="0"/>
+                        <a:cs typeface="Times New Roman" pitchFamily="18" charset="0"/>
+                      </a:endParaRPr>
                     </a:p>
                   </a:txBody>
                   <a:tcPr/>
@@ -7750,10 +7786,16 @@
                     <a:p>
                       <a:pPr algn="ctr"/>
                       <a:r>
-                        <a:rPr lang="id-ID" smtClean="0"/>
+                        <a:rPr lang="id-ID" smtClean="0">
+                          <a:latin typeface="Times New Roman" pitchFamily="18" charset="0"/>
+                          <a:cs typeface="Times New Roman" pitchFamily="18" charset="0"/>
+                        </a:rPr>
                         <a:t>Pengurangan</a:t>
                       </a:r>
-                      <a:endParaRPr lang="id-ID"/>
+                      <a:endParaRPr lang="id-ID">
+                        <a:latin typeface="Times New Roman" pitchFamily="18" charset="0"/>
+                        <a:cs typeface="Times New Roman" pitchFamily="18" charset="0"/>
+                      </a:endParaRPr>
                     </a:p>
                   </a:txBody>
                   <a:tcPr/>
@@ -7765,10 +7807,16 @@
                     <a:p>
                       <a:pPr algn="ctr"/>
                       <a:r>
-                        <a:rPr lang="id-ID" smtClean="0"/>
+                        <a:rPr lang="id-ID" smtClean="0">
+                          <a:latin typeface="Times New Roman" pitchFamily="18" charset="0"/>
+                          <a:cs typeface="Times New Roman" pitchFamily="18" charset="0"/>
+                        </a:rPr>
                         <a:t>-</a:t>
                       </a:r>
-                      <a:endParaRPr lang="id-ID"/>
+                      <a:endParaRPr lang="id-ID">
+                        <a:latin typeface="Times New Roman" pitchFamily="18" charset="0"/>
+                        <a:cs typeface="Times New Roman" pitchFamily="18" charset="0"/>
+                      </a:endParaRPr>
                     </a:p>
                   </a:txBody>
                   <a:tcPr/>
@@ -7780,10 +7828,16 @@
                     <a:p>
                       <a:pPr algn="ctr"/>
                       <a:r>
-                        <a:rPr lang="id-ID" smtClean="0"/>
+                        <a:rPr lang="id-ID" smtClean="0">
+                          <a:latin typeface="Times New Roman" pitchFamily="18" charset="0"/>
+                          <a:cs typeface="Times New Roman" pitchFamily="18" charset="0"/>
+                        </a:rPr>
                         <a:t>-</a:t>
                       </a:r>
-                      <a:endParaRPr lang="id-ID"/>
+                      <a:endParaRPr lang="id-ID">
+                        <a:latin typeface="Times New Roman" pitchFamily="18" charset="0"/>
+                        <a:cs typeface="Times New Roman" pitchFamily="18" charset="0"/>
+                      </a:endParaRPr>
                     </a:p>
                   </a:txBody>
                   <a:tcPr/>
@@ -7797,10 +7851,16 @@
                     <a:p>
                       <a:pPr algn="ctr"/>
                       <a:r>
-                        <a:rPr lang="id-ID" smtClean="0"/>
+                        <a:rPr lang="id-ID" smtClean="0">
+                          <a:latin typeface="Times New Roman" pitchFamily="18" charset="0"/>
+                          <a:cs typeface="Times New Roman" pitchFamily="18" charset="0"/>
+                        </a:rPr>
                         <a:t>Perkalian</a:t>
                       </a:r>
-                      <a:endParaRPr lang="id-ID"/>
+                      <a:endParaRPr lang="id-ID">
+                        <a:latin typeface="Times New Roman" pitchFamily="18" charset="0"/>
+                        <a:cs typeface="Times New Roman" pitchFamily="18" charset="0"/>
+                      </a:endParaRPr>
                     </a:p>
                   </a:txBody>
                   <a:tcPr/>
@@ -7812,10 +7872,16 @@
                     <a:p>
                       <a:pPr algn="ctr"/>
                       <a:r>
-                        <a:rPr lang="id-ID" smtClean="0"/>
+                        <a:rPr lang="id-ID" smtClean="0">
+                          <a:latin typeface="Times New Roman" pitchFamily="18" charset="0"/>
+                          <a:cs typeface="Times New Roman" pitchFamily="18" charset="0"/>
+                        </a:rPr>
                         <a:t>x</a:t>
                       </a:r>
-                      <a:endParaRPr lang="id-ID"/>
+                      <a:endParaRPr lang="id-ID">
+                        <a:latin typeface="Times New Roman" pitchFamily="18" charset="0"/>
+                        <a:cs typeface="Times New Roman" pitchFamily="18" charset="0"/>
+                      </a:endParaRPr>
                     </a:p>
                   </a:txBody>
                   <a:tcPr/>
@@ -7827,10 +7893,16 @@
                     <a:p>
                       <a:pPr algn="ctr"/>
                       <a:r>
-                        <a:rPr lang="id-ID" smtClean="0"/>
+                        <a:rPr lang="id-ID" smtClean="0">
+                          <a:latin typeface="Times New Roman" pitchFamily="18" charset="0"/>
+                          <a:cs typeface="Times New Roman" pitchFamily="18" charset="0"/>
+                        </a:rPr>
                         <a:t>*</a:t>
                       </a:r>
-                      <a:endParaRPr lang="id-ID"/>
+                      <a:endParaRPr lang="id-ID">
+                        <a:latin typeface="Times New Roman" pitchFamily="18" charset="0"/>
+                        <a:cs typeface="Times New Roman" pitchFamily="18" charset="0"/>
+                      </a:endParaRPr>
                     </a:p>
                   </a:txBody>
                   <a:tcPr/>
@@ -7844,10 +7916,16 @@
                     <a:p>
                       <a:pPr algn="ctr"/>
                       <a:r>
-                        <a:rPr lang="id-ID" smtClean="0"/>
+                        <a:rPr lang="id-ID" smtClean="0">
+                          <a:latin typeface="Times New Roman" pitchFamily="18" charset="0"/>
+                          <a:cs typeface="Times New Roman" pitchFamily="18" charset="0"/>
+                        </a:rPr>
                         <a:t>Pembagian</a:t>
                       </a:r>
-                      <a:endParaRPr lang="id-ID"/>
+                      <a:endParaRPr lang="id-ID">
+                        <a:latin typeface="Times New Roman" pitchFamily="18" charset="0"/>
+                        <a:cs typeface="Times New Roman" pitchFamily="18" charset="0"/>
+                      </a:endParaRPr>
                     </a:p>
                   </a:txBody>
                   <a:tcPr/>
@@ -7859,10 +7937,16 @@
                     <a:p>
                       <a:pPr algn="ctr"/>
                       <a:r>
-                        <a:rPr lang="id-ID" smtClean="0"/>
+                        <a:rPr lang="id-ID" smtClean="0">
+                          <a:latin typeface="Times New Roman" pitchFamily="18" charset="0"/>
+                          <a:cs typeface="Times New Roman" pitchFamily="18" charset="0"/>
+                        </a:rPr>
                         <a:t>:</a:t>
                       </a:r>
-                      <a:endParaRPr lang="id-ID"/>
+                      <a:endParaRPr lang="id-ID">
+                        <a:latin typeface="Times New Roman" pitchFamily="18" charset="0"/>
+                        <a:cs typeface="Times New Roman" pitchFamily="18" charset="0"/>
+                      </a:endParaRPr>
                     </a:p>
                   </a:txBody>
                   <a:tcPr/>
@@ -7874,10 +7958,16 @@
                     <a:p>
                       <a:pPr algn="ctr"/>
                       <a:r>
-                        <a:rPr lang="id-ID" smtClean="0"/>
+                        <a:rPr lang="id-ID" smtClean="0">
+                          <a:latin typeface="Times New Roman" pitchFamily="18" charset="0"/>
+                          <a:cs typeface="Times New Roman" pitchFamily="18" charset="0"/>
+                        </a:rPr>
                         <a:t>/ dan //</a:t>
                       </a:r>
-                      <a:endParaRPr lang="id-ID"/>
+                      <a:endParaRPr lang="id-ID">
+                        <a:latin typeface="Times New Roman" pitchFamily="18" charset="0"/>
+                        <a:cs typeface="Times New Roman" pitchFamily="18" charset="0"/>
+                      </a:endParaRPr>
                     </a:p>
                   </a:txBody>
                   <a:tcPr/>
@@ -7891,10 +7981,16 @@
                     <a:p>
                       <a:pPr algn="ctr"/>
                       <a:r>
-                        <a:rPr lang="id-ID" smtClean="0"/>
+                        <a:rPr lang="id-ID" smtClean="0">
+                          <a:latin typeface="Times New Roman" pitchFamily="18" charset="0"/>
+                          <a:cs typeface="Times New Roman" pitchFamily="18" charset="0"/>
+                        </a:rPr>
                         <a:t>Perpangkatan</a:t>
                       </a:r>
-                      <a:endParaRPr lang="id-ID"/>
+                      <a:endParaRPr lang="id-ID">
+                        <a:latin typeface="Times New Roman" pitchFamily="18" charset="0"/>
+                        <a:cs typeface="Times New Roman" pitchFamily="18" charset="0"/>
+                      </a:endParaRPr>
                     </a:p>
                   </a:txBody>
                   <a:tcPr/>
@@ -7906,10 +8002,16 @@
                     <a:p>
                       <a:pPr algn="ctr"/>
                       <a:r>
-                        <a:rPr lang="id-ID" smtClean="0"/>
+                        <a:rPr lang="id-ID" smtClean="0">
+                          <a:latin typeface="Times New Roman" pitchFamily="18" charset="0"/>
+                          <a:cs typeface="Times New Roman" pitchFamily="18" charset="0"/>
+                        </a:rPr>
                         <a:t>^</a:t>
                       </a:r>
-                      <a:endParaRPr lang="id-ID"/>
+                      <a:endParaRPr lang="id-ID">
+                        <a:latin typeface="Times New Roman" pitchFamily="18" charset="0"/>
+                        <a:cs typeface="Times New Roman" pitchFamily="18" charset="0"/>
+                      </a:endParaRPr>
                     </a:p>
                   </a:txBody>
                   <a:tcPr/>
@@ -7921,10 +8023,16 @@
                     <a:p>
                       <a:pPr algn="ctr"/>
                       <a:r>
-                        <a:rPr lang="id-ID" smtClean="0"/>
+                        <a:rPr lang="id-ID" smtClean="0">
+                          <a:latin typeface="Times New Roman" pitchFamily="18" charset="0"/>
+                          <a:cs typeface="Times New Roman" pitchFamily="18" charset="0"/>
+                        </a:rPr>
                         <a:t>**</a:t>
                       </a:r>
-                      <a:endParaRPr lang="id-ID"/>
+                      <a:endParaRPr lang="id-ID">
+                        <a:latin typeface="Times New Roman" pitchFamily="18" charset="0"/>
+                        <a:cs typeface="Times New Roman" pitchFamily="18" charset="0"/>
+                      </a:endParaRPr>
                     </a:p>
                   </a:txBody>
                   <a:tcPr/>
@@ -7938,14 +8046,23 @@
                     <a:p>
                       <a:pPr algn="ctr"/>
                       <a:r>
-                        <a:rPr lang="id-ID" smtClean="0"/>
+                        <a:rPr lang="id-ID" smtClean="0">
+                          <a:latin typeface="Times New Roman" pitchFamily="18" charset="0"/>
+                          <a:cs typeface="Times New Roman" pitchFamily="18" charset="0"/>
+                        </a:rPr>
                         <a:t>Hasil</a:t>
                       </a:r>
                       <a:r>
-                        <a:rPr lang="id-ID" baseline="0" smtClean="0"/>
+                        <a:rPr lang="id-ID" baseline="0" smtClean="0">
+                          <a:latin typeface="Times New Roman" pitchFamily="18" charset="0"/>
+                          <a:cs typeface="Times New Roman" pitchFamily="18" charset="0"/>
+                        </a:rPr>
                         <a:t> Sisa Bagi</a:t>
                       </a:r>
-                      <a:endParaRPr lang="id-ID"/>
+                      <a:endParaRPr lang="id-ID">
+                        <a:latin typeface="Times New Roman" pitchFamily="18" charset="0"/>
+                        <a:cs typeface="Times New Roman" pitchFamily="18" charset="0"/>
+                      </a:endParaRPr>
                     </a:p>
                   </a:txBody>
                   <a:tcPr/>
@@ -7957,10 +8074,16 @@
                     <a:p>
                       <a:pPr algn="ctr"/>
                       <a:r>
-                        <a:rPr lang="id-ID" smtClean="0"/>
+                        <a:rPr lang="id-ID" smtClean="0">
+                          <a:latin typeface="Times New Roman" pitchFamily="18" charset="0"/>
+                          <a:cs typeface="Times New Roman" pitchFamily="18" charset="0"/>
+                        </a:rPr>
                         <a:t>%</a:t>
                       </a:r>
-                      <a:endParaRPr lang="id-ID"/>
+                      <a:endParaRPr lang="id-ID">
+                        <a:latin typeface="Times New Roman" pitchFamily="18" charset="0"/>
+                        <a:cs typeface="Times New Roman" pitchFamily="18" charset="0"/>
+                      </a:endParaRPr>
                     </a:p>
                   </a:txBody>
                   <a:tcPr/>
@@ -7972,10 +8095,16 @@
                     <a:p>
                       <a:pPr algn="ctr"/>
                       <a:r>
-                        <a:rPr lang="id-ID" smtClean="0"/>
+                        <a:rPr lang="id-ID" smtClean="0">
+                          <a:latin typeface="Times New Roman" pitchFamily="18" charset="0"/>
+                          <a:cs typeface="Times New Roman" pitchFamily="18" charset="0"/>
+                        </a:rPr>
                         <a:t>%</a:t>
                       </a:r>
-                      <a:endParaRPr lang="id-ID"/>
+                      <a:endParaRPr lang="id-ID">
+                        <a:latin typeface="Times New Roman" pitchFamily="18" charset="0"/>
+                        <a:cs typeface="Times New Roman" pitchFamily="18" charset="0"/>
+                      </a:endParaRPr>
                     </a:p>
                   </a:txBody>
                   <a:tcPr/>
@@ -8265,10 +8394,16 @@
                     <a:p>
                       <a:pPr algn="ctr"/>
                       <a:r>
-                        <a:rPr lang="id-ID" smtClean="0"/>
+                        <a:rPr lang="id-ID" smtClean="0">
+                          <a:latin typeface="Times New Roman" pitchFamily="18" charset="0"/>
+                          <a:cs typeface="Times New Roman" pitchFamily="18" charset="0"/>
+                        </a:rPr>
                         <a:t>Operasi</a:t>
                       </a:r>
-                      <a:endParaRPr lang="id-ID"/>
+                      <a:endParaRPr lang="id-ID">
+                        <a:latin typeface="Times New Roman" pitchFamily="18" charset="0"/>
+                        <a:cs typeface="Times New Roman" pitchFamily="18" charset="0"/>
+                      </a:endParaRPr>
                     </a:p>
                   </a:txBody>
                   <a:tcPr/>
@@ -8280,10 +8415,16 @@
                     <a:p>
                       <a:pPr algn="ctr"/>
                       <a:r>
-                        <a:rPr lang="id-ID" smtClean="0"/>
+                        <a:rPr lang="id-ID" smtClean="0">
+                          <a:latin typeface="Times New Roman" pitchFamily="18" charset="0"/>
+                          <a:cs typeface="Times New Roman" pitchFamily="18" charset="0"/>
+                        </a:rPr>
                         <a:t>Simbol</a:t>
                       </a:r>
-                      <a:endParaRPr lang="id-ID"/>
+                      <a:endParaRPr lang="id-ID">
+                        <a:latin typeface="Times New Roman" pitchFamily="18" charset="0"/>
+                        <a:cs typeface="Times New Roman" pitchFamily="18" charset="0"/>
+                      </a:endParaRPr>
                     </a:p>
                   </a:txBody>
                   <a:tcPr/>
@@ -8295,10 +8436,16 @@
                     <a:p>
                       <a:pPr algn="ctr"/>
                       <a:r>
-                        <a:rPr lang="id-ID" smtClean="0"/>
+                        <a:rPr lang="id-ID" smtClean="0">
+                          <a:latin typeface="Times New Roman" pitchFamily="18" charset="0"/>
+                          <a:cs typeface="Times New Roman" pitchFamily="18" charset="0"/>
+                        </a:rPr>
                         <a:t>Python</a:t>
                       </a:r>
-                      <a:endParaRPr lang="id-ID"/>
+                      <a:endParaRPr lang="id-ID">
+                        <a:latin typeface="Times New Roman" pitchFamily="18" charset="0"/>
+                        <a:cs typeface="Times New Roman" pitchFamily="18" charset="0"/>
+                      </a:endParaRPr>
                     </a:p>
                   </a:txBody>
                   <a:tcPr/>
@@ -8312,10 +8459,16 @@
                     <a:p>
                       <a:pPr algn="ctr"/>
                       <a:r>
-                        <a:rPr lang="id-ID" smtClean="0"/>
+                        <a:rPr lang="id-ID" smtClean="0">
+                          <a:latin typeface="Times New Roman" pitchFamily="18" charset="0"/>
+                          <a:cs typeface="Times New Roman" pitchFamily="18" charset="0"/>
+                        </a:rPr>
                         <a:t>DAN</a:t>
                       </a:r>
-                      <a:endParaRPr lang="id-ID"/>
+                      <a:endParaRPr lang="id-ID">
+                        <a:latin typeface="Times New Roman" pitchFamily="18" charset="0"/>
+                        <a:cs typeface="Times New Roman" pitchFamily="18" charset="0"/>
+                      </a:endParaRPr>
                     </a:p>
                   </a:txBody>
                   <a:tcPr/>
@@ -8327,10 +8480,16 @@
                     <a:p>
                       <a:pPr algn="ctr"/>
                       <a:r>
-                        <a:rPr lang="id-ID" smtClean="0"/>
+                        <a:rPr lang="id-ID" smtClean="0">
+                          <a:latin typeface="Times New Roman" pitchFamily="18" charset="0"/>
+                          <a:cs typeface="Times New Roman" pitchFamily="18" charset="0"/>
+                        </a:rPr>
                         <a:t>&amp;&amp;</a:t>
                       </a:r>
-                      <a:endParaRPr lang="id-ID"/>
+                      <a:endParaRPr lang="id-ID">
+                        <a:latin typeface="Times New Roman" pitchFamily="18" charset="0"/>
+                        <a:cs typeface="Times New Roman" pitchFamily="18" charset="0"/>
+                      </a:endParaRPr>
                     </a:p>
                   </a:txBody>
                   <a:tcPr/>
@@ -8342,10 +8501,16 @@
                     <a:p>
                       <a:pPr algn="ctr"/>
                       <a:r>
-                        <a:rPr lang="id-ID" smtClean="0"/>
+                        <a:rPr lang="id-ID" smtClean="0">
+                          <a:latin typeface="Times New Roman" pitchFamily="18" charset="0"/>
+                          <a:cs typeface="Times New Roman" pitchFamily="18" charset="0"/>
+                        </a:rPr>
                         <a:t>AND</a:t>
                       </a:r>
-                      <a:endParaRPr lang="id-ID"/>
+                      <a:endParaRPr lang="id-ID">
+                        <a:latin typeface="Times New Roman" pitchFamily="18" charset="0"/>
+                        <a:cs typeface="Times New Roman" pitchFamily="18" charset="0"/>
+                      </a:endParaRPr>
                     </a:p>
                   </a:txBody>
                   <a:tcPr/>
@@ -8359,10 +8524,16 @@
                     <a:p>
                       <a:pPr algn="ctr"/>
                       <a:r>
-                        <a:rPr lang="id-ID" smtClean="0"/>
+                        <a:rPr lang="id-ID" smtClean="0">
+                          <a:latin typeface="Times New Roman" pitchFamily="18" charset="0"/>
+                          <a:cs typeface="Times New Roman" pitchFamily="18" charset="0"/>
+                        </a:rPr>
                         <a:t>ATAU</a:t>
                       </a:r>
-                      <a:endParaRPr lang="id-ID"/>
+                      <a:endParaRPr lang="id-ID">
+                        <a:latin typeface="Times New Roman" pitchFamily="18" charset="0"/>
+                        <a:cs typeface="Times New Roman" pitchFamily="18" charset="0"/>
+                      </a:endParaRPr>
                     </a:p>
                   </a:txBody>
                   <a:tcPr/>
@@ -8374,10 +8545,16 @@
                     <a:p>
                       <a:pPr algn="ctr"/>
                       <a:r>
-                        <a:rPr lang="id-ID" smtClean="0"/>
+                        <a:rPr lang="id-ID" smtClean="0">
+                          <a:latin typeface="Times New Roman" pitchFamily="18" charset="0"/>
+                          <a:cs typeface="Times New Roman" pitchFamily="18" charset="0"/>
+                        </a:rPr>
                         <a:t>||</a:t>
                       </a:r>
-                      <a:endParaRPr lang="id-ID"/>
+                      <a:endParaRPr lang="id-ID">
+                        <a:latin typeface="Times New Roman" pitchFamily="18" charset="0"/>
+                        <a:cs typeface="Times New Roman" pitchFamily="18" charset="0"/>
+                      </a:endParaRPr>
                     </a:p>
                   </a:txBody>
                   <a:tcPr/>
@@ -8389,10 +8566,16 @@
                     <a:p>
                       <a:pPr algn="ctr"/>
                       <a:r>
-                        <a:rPr lang="id-ID" smtClean="0"/>
+                        <a:rPr lang="id-ID" smtClean="0">
+                          <a:latin typeface="Times New Roman" pitchFamily="18" charset="0"/>
+                          <a:cs typeface="Times New Roman" pitchFamily="18" charset="0"/>
+                        </a:rPr>
                         <a:t>OR</a:t>
                       </a:r>
-                      <a:endParaRPr lang="id-ID"/>
+                      <a:endParaRPr lang="id-ID">
+                        <a:latin typeface="Times New Roman" pitchFamily="18" charset="0"/>
+                        <a:cs typeface="Times New Roman" pitchFamily="18" charset="0"/>
+                      </a:endParaRPr>
                     </a:p>
                   </a:txBody>
                   <a:tcPr/>
@@ -8406,10 +8589,16 @@
                     <a:p>
                       <a:pPr algn="ctr"/>
                       <a:r>
-                        <a:rPr lang="id-ID" smtClean="0"/>
+                        <a:rPr lang="id-ID" smtClean="0">
+                          <a:latin typeface="Times New Roman" pitchFamily="18" charset="0"/>
+                          <a:cs typeface="Times New Roman" pitchFamily="18" charset="0"/>
+                        </a:rPr>
                         <a:t>BUKAN</a:t>
                       </a:r>
-                      <a:endParaRPr lang="id-ID"/>
+                      <a:endParaRPr lang="id-ID">
+                        <a:latin typeface="Times New Roman" pitchFamily="18" charset="0"/>
+                        <a:cs typeface="Times New Roman" pitchFamily="18" charset="0"/>
+                      </a:endParaRPr>
                     </a:p>
                   </a:txBody>
                   <a:tcPr/>
@@ -8421,10 +8610,16 @@
                     <a:p>
                       <a:pPr algn="ctr"/>
                       <a:r>
-                        <a:rPr lang="id-ID" smtClean="0"/>
+                        <a:rPr lang="id-ID" smtClean="0">
+                          <a:latin typeface="Times New Roman" pitchFamily="18" charset="0"/>
+                          <a:cs typeface="Times New Roman" pitchFamily="18" charset="0"/>
+                        </a:rPr>
                         <a:t>!</a:t>
                       </a:r>
-                      <a:endParaRPr lang="id-ID"/>
+                      <a:endParaRPr lang="id-ID">
+                        <a:latin typeface="Times New Roman" pitchFamily="18" charset="0"/>
+                        <a:cs typeface="Times New Roman" pitchFamily="18" charset="0"/>
+                      </a:endParaRPr>
                     </a:p>
                   </a:txBody>
                   <a:tcPr/>
@@ -8436,10 +8631,16 @@
                     <a:p>
                       <a:pPr algn="ctr"/>
                       <a:r>
-                        <a:rPr lang="id-ID" smtClean="0"/>
+                        <a:rPr lang="id-ID" smtClean="0">
+                          <a:latin typeface="Times New Roman" pitchFamily="18" charset="0"/>
+                          <a:cs typeface="Times New Roman" pitchFamily="18" charset="0"/>
+                        </a:rPr>
                         <a:t>NOT</a:t>
                       </a:r>
-                      <a:endParaRPr lang="id-ID"/>
+                      <a:endParaRPr lang="id-ID">
+                        <a:latin typeface="Times New Roman" pitchFamily="18" charset="0"/>
+                        <a:cs typeface="Times New Roman" pitchFamily="18" charset="0"/>
+                      </a:endParaRPr>
                     </a:p>
                   </a:txBody>
                   <a:tcPr/>
@@ -8644,10 +8845,16 @@
                     <a:p>
                       <a:pPr algn="ctr"/>
                       <a:r>
-                        <a:rPr lang="id-ID" smtClean="0"/>
+                        <a:rPr lang="id-ID" b="0" smtClean="0">
+                          <a:latin typeface="Times New Roman" pitchFamily="18" charset="0"/>
+                          <a:cs typeface="Times New Roman" pitchFamily="18" charset="0"/>
+                        </a:rPr>
                         <a:t>Operasi</a:t>
                       </a:r>
-                      <a:endParaRPr lang="id-ID"/>
+                      <a:endParaRPr lang="id-ID" b="0">
+                        <a:latin typeface="Times New Roman" pitchFamily="18" charset="0"/>
+                        <a:cs typeface="Times New Roman" pitchFamily="18" charset="0"/>
+                      </a:endParaRPr>
                     </a:p>
                   </a:txBody>
                   <a:tcPr/>
@@ -8659,10 +8866,16 @@
                     <a:p>
                       <a:pPr algn="ctr"/>
                       <a:r>
-                        <a:rPr lang="id-ID" smtClean="0"/>
+                        <a:rPr lang="id-ID" b="0" smtClean="0">
+                          <a:latin typeface="Times New Roman" pitchFamily="18" charset="0"/>
+                          <a:cs typeface="Times New Roman" pitchFamily="18" charset="0"/>
+                        </a:rPr>
                         <a:t>Simbol</a:t>
                       </a:r>
-                      <a:endParaRPr lang="id-ID"/>
+                      <a:endParaRPr lang="id-ID" b="0">
+                        <a:latin typeface="Times New Roman" pitchFamily="18" charset="0"/>
+                        <a:cs typeface="Times New Roman" pitchFamily="18" charset="0"/>
+                      </a:endParaRPr>
                     </a:p>
                   </a:txBody>
                   <a:tcPr/>
@@ -8674,10 +8887,16 @@
                     <a:p>
                       <a:pPr algn="ctr"/>
                       <a:r>
-                        <a:rPr lang="id-ID" smtClean="0"/>
+                        <a:rPr lang="id-ID" b="0" smtClean="0">
+                          <a:latin typeface="Times New Roman" pitchFamily="18" charset="0"/>
+                          <a:cs typeface="Times New Roman" pitchFamily="18" charset="0"/>
+                        </a:rPr>
                         <a:t>Python</a:t>
                       </a:r>
-                      <a:endParaRPr lang="id-ID"/>
+                      <a:endParaRPr lang="id-ID" b="0">
+                        <a:latin typeface="Times New Roman" pitchFamily="18" charset="0"/>
+                        <a:cs typeface="Times New Roman" pitchFamily="18" charset="0"/>
+                      </a:endParaRPr>
                     </a:p>
                   </a:txBody>
                   <a:tcPr/>
@@ -8691,14 +8910,23 @@
                     <a:p>
                       <a:pPr algn="ctr"/>
                       <a:r>
-                        <a:rPr lang="id-ID" smtClean="0"/>
+                        <a:rPr lang="id-ID" b="0" smtClean="0">
+                          <a:latin typeface="Times New Roman" pitchFamily="18" charset="0"/>
+                          <a:cs typeface="Times New Roman" pitchFamily="18" charset="0"/>
+                        </a:rPr>
                         <a:t>Sama</a:t>
                       </a:r>
                       <a:r>
-                        <a:rPr lang="id-ID" baseline="0" smtClean="0"/>
+                        <a:rPr lang="id-ID" b="0" baseline="0" smtClean="0">
+                          <a:latin typeface="Times New Roman" pitchFamily="18" charset="0"/>
+                          <a:cs typeface="Times New Roman" pitchFamily="18" charset="0"/>
+                        </a:rPr>
                         <a:t> Dengan</a:t>
                       </a:r>
-                      <a:endParaRPr lang="id-ID"/>
+                      <a:endParaRPr lang="id-ID" b="0">
+                        <a:latin typeface="Times New Roman" pitchFamily="18" charset="0"/>
+                        <a:cs typeface="Times New Roman" pitchFamily="18" charset="0"/>
+                      </a:endParaRPr>
                     </a:p>
                   </a:txBody>
                   <a:tcPr/>
@@ -8710,10 +8938,16 @@
                     <a:p>
                       <a:pPr algn="ctr"/>
                       <a:r>
-                        <a:rPr lang="id-ID" smtClean="0"/>
+                        <a:rPr lang="id-ID" b="0" smtClean="0">
+                          <a:latin typeface="Times New Roman" pitchFamily="18" charset="0"/>
+                          <a:cs typeface="Times New Roman" pitchFamily="18" charset="0"/>
+                        </a:rPr>
                         <a:t>=</a:t>
                       </a:r>
-                      <a:endParaRPr lang="id-ID"/>
+                      <a:endParaRPr lang="id-ID" b="0">
+                        <a:latin typeface="Times New Roman" pitchFamily="18" charset="0"/>
+                        <a:cs typeface="Times New Roman" pitchFamily="18" charset="0"/>
+                      </a:endParaRPr>
                     </a:p>
                   </a:txBody>
                   <a:tcPr/>
@@ -8725,10 +8959,16 @@
                     <a:p>
                       <a:pPr algn="ctr"/>
                       <a:r>
-                        <a:rPr lang="id-ID" smtClean="0"/>
+                        <a:rPr lang="id-ID" b="0" smtClean="0">
+                          <a:latin typeface="Times New Roman" pitchFamily="18" charset="0"/>
+                          <a:cs typeface="Times New Roman" pitchFamily="18" charset="0"/>
+                        </a:rPr>
                         <a:t>==</a:t>
                       </a:r>
-                      <a:endParaRPr lang="id-ID"/>
+                      <a:endParaRPr lang="id-ID" b="0">
+                        <a:latin typeface="Times New Roman" pitchFamily="18" charset="0"/>
+                        <a:cs typeface="Times New Roman" pitchFamily="18" charset="0"/>
+                      </a:endParaRPr>
                     </a:p>
                   </a:txBody>
                   <a:tcPr/>
@@ -8742,14 +8982,23 @@
                     <a:p>
                       <a:pPr algn="ctr"/>
                       <a:r>
-                        <a:rPr lang="id-ID" smtClean="0"/>
+                        <a:rPr lang="id-ID" b="0" smtClean="0">
+                          <a:latin typeface="Times New Roman" pitchFamily="18" charset="0"/>
+                          <a:cs typeface="Times New Roman" pitchFamily="18" charset="0"/>
+                        </a:rPr>
                         <a:t>Tidak Sama</a:t>
                       </a:r>
                       <a:r>
-                        <a:rPr lang="id-ID" baseline="0" smtClean="0"/>
+                        <a:rPr lang="id-ID" b="0" baseline="0" smtClean="0">
+                          <a:latin typeface="Times New Roman" pitchFamily="18" charset="0"/>
+                          <a:cs typeface="Times New Roman" pitchFamily="18" charset="0"/>
+                        </a:rPr>
                         <a:t> Dengan</a:t>
                       </a:r>
-                      <a:endParaRPr lang="id-ID"/>
+                      <a:endParaRPr lang="id-ID" b="0">
+                        <a:latin typeface="Times New Roman" pitchFamily="18" charset="0"/>
+                        <a:cs typeface="Times New Roman" pitchFamily="18" charset="0"/>
+                      </a:endParaRPr>
                     </a:p>
                   </a:txBody>
                   <a:tcPr/>
@@ -8761,10 +9010,16 @@
                     <a:p>
                       <a:pPr algn="ctr"/>
                       <a:r>
-                        <a:rPr lang="id-ID" smtClean="0"/>
+                        <a:rPr lang="id-ID" b="0" smtClean="0">
+                          <a:latin typeface="Times New Roman" pitchFamily="18" charset="0"/>
+                          <a:cs typeface="Times New Roman" pitchFamily="18" charset="0"/>
+                        </a:rPr>
                         <a:t>≠</a:t>
                       </a:r>
-                      <a:endParaRPr lang="id-ID"/>
+                      <a:endParaRPr lang="id-ID" b="0">
+                        <a:latin typeface="Times New Roman" pitchFamily="18" charset="0"/>
+                        <a:cs typeface="Times New Roman" pitchFamily="18" charset="0"/>
+                      </a:endParaRPr>
                     </a:p>
                   </a:txBody>
                   <a:tcPr/>
@@ -8776,10 +9031,16 @@
                     <a:p>
                       <a:pPr algn="ctr"/>
                       <a:r>
-                        <a:rPr lang="id-ID" smtClean="0"/>
+                        <a:rPr lang="id-ID" b="0" smtClean="0">
+                          <a:latin typeface="Times New Roman" pitchFamily="18" charset="0"/>
+                          <a:cs typeface="Times New Roman" pitchFamily="18" charset="0"/>
+                        </a:rPr>
                         <a:t>!=</a:t>
                       </a:r>
-                      <a:endParaRPr lang="id-ID"/>
+                      <a:endParaRPr lang="id-ID" b="0">
+                        <a:latin typeface="Times New Roman" pitchFamily="18" charset="0"/>
+                        <a:cs typeface="Times New Roman" pitchFamily="18" charset="0"/>
+                      </a:endParaRPr>
                     </a:p>
                   </a:txBody>
                   <a:tcPr/>
@@ -8793,10 +9054,16 @@
                     <a:p>
                       <a:pPr algn="ctr"/>
                       <a:r>
-                        <a:rPr lang="id-ID" smtClean="0"/>
+                        <a:rPr lang="id-ID" b="0" smtClean="0">
+                          <a:latin typeface="Times New Roman" pitchFamily="18" charset="0"/>
+                          <a:cs typeface="Times New Roman" pitchFamily="18" charset="0"/>
+                        </a:rPr>
                         <a:t>Lebih Besar</a:t>
                       </a:r>
-                      <a:endParaRPr lang="id-ID"/>
+                      <a:endParaRPr lang="id-ID" b="0">
+                        <a:latin typeface="Times New Roman" pitchFamily="18" charset="0"/>
+                        <a:cs typeface="Times New Roman" pitchFamily="18" charset="0"/>
+                      </a:endParaRPr>
                     </a:p>
                   </a:txBody>
                   <a:tcPr/>
@@ -8808,10 +9075,16 @@
                     <a:p>
                       <a:pPr algn="ctr"/>
                       <a:r>
-                        <a:rPr lang="id-ID" smtClean="0"/>
+                        <a:rPr lang="id-ID" b="0" smtClean="0">
+                          <a:latin typeface="Times New Roman" pitchFamily="18" charset="0"/>
+                          <a:cs typeface="Times New Roman" pitchFamily="18" charset="0"/>
+                        </a:rPr>
                         <a:t>˃, ≥</a:t>
                       </a:r>
-                      <a:endParaRPr lang="id-ID"/>
+                      <a:endParaRPr lang="id-ID" b="0">
+                        <a:latin typeface="Times New Roman" pitchFamily="18" charset="0"/>
+                        <a:cs typeface="Times New Roman" pitchFamily="18" charset="0"/>
+                      </a:endParaRPr>
                     </a:p>
                   </a:txBody>
                   <a:tcPr/>
@@ -8823,14 +9096,23 @@
                     <a:p>
                       <a:pPr algn="ctr"/>
                       <a:r>
-                        <a:rPr lang="id-ID" smtClean="0"/>
+                        <a:rPr lang="id-ID" b="0" smtClean="0">
+                          <a:latin typeface="Times New Roman" pitchFamily="18" charset="0"/>
+                          <a:cs typeface="Times New Roman" pitchFamily="18" charset="0"/>
+                        </a:rPr>
                         <a:t>&gt;,</a:t>
                       </a:r>
                       <a:r>
-                        <a:rPr lang="id-ID" baseline="0" smtClean="0"/>
+                        <a:rPr lang="id-ID" b="0" baseline="0" smtClean="0">
+                          <a:latin typeface="Times New Roman" pitchFamily="18" charset="0"/>
+                          <a:cs typeface="Times New Roman" pitchFamily="18" charset="0"/>
+                        </a:rPr>
                         <a:t> &gt;=</a:t>
                       </a:r>
-                      <a:endParaRPr lang="id-ID"/>
+                      <a:endParaRPr lang="id-ID" b="0">
+                        <a:latin typeface="Times New Roman" pitchFamily="18" charset="0"/>
+                        <a:cs typeface="Times New Roman" pitchFamily="18" charset="0"/>
+                      </a:endParaRPr>
                     </a:p>
                   </a:txBody>
                   <a:tcPr/>
@@ -8844,10 +9126,16 @@
                     <a:p>
                       <a:pPr algn="ctr"/>
                       <a:r>
-                        <a:rPr lang="id-ID" smtClean="0"/>
+                        <a:rPr lang="id-ID" b="0" smtClean="0">
+                          <a:latin typeface="Times New Roman" pitchFamily="18" charset="0"/>
+                          <a:cs typeface="Times New Roman" pitchFamily="18" charset="0"/>
+                        </a:rPr>
                         <a:t>Lebih Kecil</a:t>
                       </a:r>
-                      <a:endParaRPr lang="id-ID"/>
+                      <a:endParaRPr lang="id-ID" b="0">
+                        <a:latin typeface="Times New Roman" pitchFamily="18" charset="0"/>
+                        <a:cs typeface="Times New Roman" pitchFamily="18" charset="0"/>
+                      </a:endParaRPr>
                     </a:p>
                   </a:txBody>
                   <a:tcPr/>
@@ -8859,10 +9147,16 @@
                     <a:p>
                       <a:pPr algn="ctr"/>
                       <a:r>
-                        <a:rPr lang="id-ID" smtClean="0"/>
+                        <a:rPr lang="id-ID" b="0" smtClean="0">
+                          <a:latin typeface="Times New Roman" pitchFamily="18" charset="0"/>
+                          <a:cs typeface="Times New Roman" pitchFamily="18" charset="0"/>
+                        </a:rPr>
                         <a:t>&lt;, ≤</a:t>
                       </a:r>
-                      <a:endParaRPr lang="id-ID"/>
+                      <a:endParaRPr lang="id-ID" b="0">
+                        <a:latin typeface="Times New Roman" pitchFamily="18" charset="0"/>
+                        <a:cs typeface="Times New Roman" pitchFamily="18" charset="0"/>
+                      </a:endParaRPr>
                     </a:p>
                   </a:txBody>
                   <a:tcPr/>
@@ -8874,10 +9168,16 @@
                     <a:p>
                       <a:pPr algn="ctr"/>
                       <a:r>
-                        <a:rPr lang="id-ID" smtClean="0"/>
+                        <a:rPr lang="id-ID" b="0" smtClean="0">
+                          <a:latin typeface="Times New Roman" pitchFamily="18" charset="0"/>
+                          <a:cs typeface="Times New Roman" pitchFamily="18" charset="0"/>
+                        </a:rPr>
                         <a:t>&lt;, &lt;=</a:t>
                       </a:r>
-                      <a:endParaRPr lang="id-ID"/>
+                      <a:endParaRPr lang="id-ID" b="0">
+                        <a:latin typeface="Times New Roman" pitchFamily="18" charset="0"/>
+                        <a:cs typeface="Times New Roman" pitchFamily="18" charset="0"/>
+                      </a:endParaRPr>
                     </a:p>
                   </a:txBody>
                   <a:tcPr/>
@@ -9187,8 +9487,51 @@
                 <a:latin typeface="Times New Roman" pitchFamily="18" charset="0"/>
                 <a:cs typeface="Times New Roman" pitchFamily="18" charset="0"/>
               </a:rPr>
-              <a:t>Input &amp; Output Pada Python</a:t>
-            </a:r>
+              <a:t>Mendefenisikan Permasalahan</a:t>
+            </a:r>
+          </a:p>
+          <a:p>
+            <a:r>
+              <a:rPr lang="id-ID" smtClean="0">
+                <a:latin typeface="Times New Roman" pitchFamily="18" charset="0"/>
+                <a:cs typeface="Times New Roman" pitchFamily="18" charset="0"/>
+              </a:rPr>
+              <a:t>(Input </a:t>
+            </a:r>
+            <a:r>
+              <a:rPr lang="id-ID" smtClean="0">
+                <a:latin typeface="Times New Roman" pitchFamily="18" charset="0"/>
+                <a:cs typeface="Times New Roman" pitchFamily="18" charset="0"/>
+                <a:sym typeface="Wingdings" pitchFamily="2" charset="2"/>
+              </a:rPr>
+              <a:t> </a:t>
+            </a:r>
+            <a:r>
+              <a:rPr lang="id-ID" smtClean="0">
+                <a:latin typeface="Times New Roman" pitchFamily="18" charset="0"/>
+                <a:cs typeface="Times New Roman" pitchFamily="18" charset="0"/>
+              </a:rPr>
+              <a:t>Proses </a:t>
+            </a:r>
+            <a:r>
+              <a:rPr lang="id-ID" smtClean="0">
+                <a:latin typeface="Times New Roman" pitchFamily="18" charset="0"/>
+                <a:cs typeface="Times New Roman" pitchFamily="18" charset="0"/>
+                <a:sym typeface="Wingdings" pitchFamily="2" charset="2"/>
+              </a:rPr>
+              <a:t></a:t>
+            </a:r>
+            <a:r>
+              <a:rPr lang="id-ID" smtClean="0">
+                <a:latin typeface="Times New Roman" pitchFamily="18" charset="0"/>
+                <a:cs typeface="Times New Roman" pitchFamily="18" charset="0"/>
+              </a:rPr>
+              <a:t> Output)</a:t>
+            </a:r>
+            <a:endParaRPr lang="id-ID" smtClean="0">
+              <a:latin typeface="Times New Roman" pitchFamily="18" charset="0"/>
+              <a:cs typeface="Times New Roman" pitchFamily="18" charset="0"/>
+            </a:endParaRPr>
           </a:p>
           <a:p>
             <a:endParaRPr lang="id-ID" smtClean="0">

</xml_diff>

<commit_message>
FINAL Pert 1/2 Pengantar : Menyesuaikan Slide dengan Textbook
</commit_message>
<xml_diff>
--- a/Presentasi/Pertemuan 2 Pengenalan Algoritma.pptx
+++ b/Presentasi/Pertemuan 2 Pengenalan Algoritma.pptx
@@ -5,7 +5,7 @@
     <p:sldMasterId id="2147483648" r:id="rId1"/>
   </p:sldMasterIdLst>
   <p:notesMasterIdLst>
-    <p:notesMasterId r:id="rId33"/>
+    <p:notesMasterId r:id="rId36"/>
   </p:notesMasterIdLst>
   <p:sldIdLst>
     <p:sldId id="256" r:id="rId2"/>
@@ -36,9 +36,12 @@
     <p:sldId id="329" r:id="rId27"/>
     <p:sldId id="331" r:id="rId28"/>
     <p:sldId id="330" r:id="rId29"/>
-    <p:sldId id="323" r:id="rId30"/>
-    <p:sldId id="324" r:id="rId31"/>
-    <p:sldId id="327" r:id="rId32"/>
+    <p:sldId id="332" r:id="rId30"/>
+    <p:sldId id="333" r:id="rId31"/>
+    <p:sldId id="334" r:id="rId32"/>
+    <p:sldId id="323" r:id="rId33"/>
+    <p:sldId id="324" r:id="rId34"/>
+    <p:sldId id="327" r:id="rId35"/>
   </p:sldIdLst>
   <p:sldSz cx="9144000" cy="6858000" type="screen4x3"/>
   <p:notesSz cx="6858000" cy="9144000"/>
@@ -1246,9 +1249,9 @@
     <dgm:cxn modelId="{B56DC54B-77A8-4B7A-AEDD-F6411917B66F}" type="presOf" srcId="{B8893A64-B5D2-4DDE-AB60-9D6CD0D8E7F0}" destId="{0008D5CC-3FFD-48AC-9FFB-209F74600CB4}" srcOrd="0" destOrd="0" presId="urn:microsoft.com/office/officeart/2005/8/layout/chevron2"/>
     <dgm:cxn modelId="{1AA0DEBC-8FF8-4D68-8F0D-6F13D5190141}" srcId="{FB2E215A-7F85-41FA-BB79-4E34A43FD686}" destId="{16D334F4-6137-44F0-BA80-62BBBA5F243B}" srcOrd="1" destOrd="0" parTransId="{5158015F-2FE7-47A3-AB7B-CC8CD2FAEC23}" sibTransId="{8C233449-EFC3-4706-B0FE-4480DE0DB9B8}"/>
     <dgm:cxn modelId="{EFF5E79D-E2F3-475A-ADE6-DD765FF7906C}" type="presOf" srcId="{E06C426D-0692-46B4-859D-A7CC314D27A9}" destId="{233D6B79-D047-4B29-B341-B7F499ECD095}" srcOrd="0" destOrd="0" presId="urn:microsoft.com/office/officeart/2005/8/layout/chevron2"/>
+    <dgm:cxn modelId="{762B1B52-7987-4722-8AA9-8CD924D94F3C}" srcId="{957397C6-21B9-4024-B5E3-C450089478F4}" destId="{E7A31D9A-BE2C-45BC-9E92-B9D63CFE4BC0}" srcOrd="0" destOrd="0" parTransId="{1DE1A28D-C71C-44E7-8754-04EBE8F3F854}" sibTransId="{EC00E223-744D-4DA4-90DF-C65C52CEE937}"/>
+    <dgm:cxn modelId="{4B194EAB-9A2D-4D9C-9862-E5E599FD42C3}" type="presOf" srcId="{CF838919-EBEC-4DDE-8531-4D5A1FD6C212}" destId="{C8E46865-81C5-40BF-A8DE-88D50BA3C041}" srcOrd="0" destOrd="0" presId="urn:microsoft.com/office/officeart/2005/8/layout/chevron2"/>
     <dgm:cxn modelId="{89323953-5EF5-4E99-91F5-A703F7870FEA}" srcId="{16D334F4-6137-44F0-BA80-62BBBA5F243B}" destId="{B8893A64-B5D2-4DDE-AB60-9D6CD0D8E7F0}" srcOrd="0" destOrd="0" parTransId="{D4F1C0E8-17F3-45F9-814F-196FF2E848BF}" sibTransId="{E443A93F-458B-441A-9397-CD4860BC655C}"/>
-    <dgm:cxn modelId="{4B194EAB-9A2D-4D9C-9862-E5E599FD42C3}" type="presOf" srcId="{CF838919-EBEC-4DDE-8531-4D5A1FD6C212}" destId="{C8E46865-81C5-40BF-A8DE-88D50BA3C041}" srcOrd="0" destOrd="0" presId="urn:microsoft.com/office/officeart/2005/8/layout/chevron2"/>
-    <dgm:cxn modelId="{762B1B52-7987-4722-8AA9-8CD924D94F3C}" srcId="{957397C6-21B9-4024-B5E3-C450089478F4}" destId="{E7A31D9A-BE2C-45BC-9E92-B9D63CFE4BC0}" srcOrd="0" destOrd="0" parTransId="{1DE1A28D-C71C-44E7-8754-04EBE8F3F854}" sibTransId="{EC00E223-744D-4DA4-90DF-C65C52CEE937}"/>
     <dgm:cxn modelId="{FAC04EB1-3819-43ED-AEDB-EE3FCCBBF402}" type="presOf" srcId="{FB2E215A-7F85-41FA-BB79-4E34A43FD686}" destId="{2F77F6FE-38D7-4C2B-A8C5-BC11D3A82888}" srcOrd="0" destOrd="0" presId="urn:microsoft.com/office/officeart/2005/8/layout/chevron2"/>
     <dgm:cxn modelId="{8DEA2216-34CB-40B4-980C-3FC6E73A01C3}" type="presOf" srcId="{E7A31D9A-BE2C-45BC-9E92-B9D63CFE4BC0}" destId="{3C824A84-D91E-428E-9D70-D9819BF03FC2}" srcOrd="0" destOrd="0" presId="urn:microsoft.com/office/officeart/2005/8/layout/chevron2"/>
     <dgm:cxn modelId="{535DFE24-CB14-4E77-AEA0-475E2C99657E}" srcId="{FB2E215A-7F85-41FA-BB79-4E34A43FD686}" destId="{957397C6-21B9-4024-B5E3-C450089478F4}" srcOrd="2" destOrd="0" parTransId="{DD7B48C4-548B-4B9F-84A6-2F12CF2ADF6C}" sibTransId="{73DDCC34-24AD-4F62-8634-FB18C8593508}"/>
@@ -2844,7 +2847,7 @@
             <a:fld id="{896F413C-F42A-4503-9253-83800F056F65}" type="datetimeFigureOut">
               <a:rPr lang="id-ID" smtClean="0"/>
               <a:pPr/>
-              <a:t>02/09/2014</a:t>
+              <a:t>08/09/2014</a:t>
             </a:fld>
             <a:endParaRPr lang="id-ID"/>
           </a:p>
@@ -3374,7 +3377,7 @@
             <a:fld id="{27137818-48BE-4108-840E-3B8BFE735C18}" type="datetimeFigureOut">
               <a:rPr lang="id-ID" smtClean="0"/>
               <a:pPr/>
-              <a:t>02/09/2014</a:t>
+              <a:t>08/09/2014</a:t>
             </a:fld>
             <a:endParaRPr lang="id-ID"/>
           </a:p>
@@ -3541,7 +3544,7 @@
             <a:fld id="{27137818-48BE-4108-840E-3B8BFE735C18}" type="datetimeFigureOut">
               <a:rPr lang="id-ID" smtClean="0"/>
               <a:pPr/>
-              <a:t>02/09/2014</a:t>
+              <a:t>08/09/2014</a:t>
             </a:fld>
             <a:endParaRPr lang="id-ID"/>
           </a:p>
@@ -3718,7 +3721,7 @@
             <a:fld id="{27137818-48BE-4108-840E-3B8BFE735C18}" type="datetimeFigureOut">
               <a:rPr lang="id-ID" smtClean="0"/>
               <a:pPr/>
-              <a:t>02/09/2014</a:t>
+              <a:t>08/09/2014</a:t>
             </a:fld>
             <a:endParaRPr lang="id-ID"/>
           </a:p>
@@ -3885,7 +3888,7 @@
             <a:fld id="{27137818-48BE-4108-840E-3B8BFE735C18}" type="datetimeFigureOut">
               <a:rPr lang="id-ID" smtClean="0"/>
               <a:pPr/>
-              <a:t>02/09/2014</a:t>
+              <a:t>08/09/2014</a:t>
             </a:fld>
             <a:endParaRPr lang="id-ID"/>
           </a:p>
@@ -4128,7 +4131,7 @@
             <a:fld id="{27137818-48BE-4108-840E-3B8BFE735C18}" type="datetimeFigureOut">
               <a:rPr lang="id-ID" smtClean="0"/>
               <a:pPr/>
-              <a:t>02/09/2014</a:t>
+              <a:t>08/09/2014</a:t>
             </a:fld>
             <a:endParaRPr lang="id-ID"/>
           </a:p>
@@ -4413,7 +4416,7 @@
             <a:fld id="{27137818-48BE-4108-840E-3B8BFE735C18}" type="datetimeFigureOut">
               <a:rPr lang="id-ID" smtClean="0"/>
               <a:pPr/>
-              <a:t>02/09/2014</a:t>
+              <a:t>08/09/2014</a:t>
             </a:fld>
             <a:endParaRPr lang="id-ID"/>
           </a:p>
@@ -4832,7 +4835,7 @@
             <a:fld id="{27137818-48BE-4108-840E-3B8BFE735C18}" type="datetimeFigureOut">
               <a:rPr lang="id-ID" smtClean="0"/>
               <a:pPr/>
-              <a:t>02/09/2014</a:t>
+              <a:t>08/09/2014</a:t>
             </a:fld>
             <a:endParaRPr lang="id-ID"/>
           </a:p>
@@ -4947,7 +4950,7 @@
             <a:fld id="{27137818-48BE-4108-840E-3B8BFE735C18}" type="datetimeFigureOut">
               <a:rPr lang="id-ID" smtClean="0"/>
               <a:pPr/>
-              <a:t>02/09/2014</a:t>
+              <a:t>08/09/2014</a:t>
             </a:fld>
             <a:endParaRPr lang="id-ID"/>
           </a:p>
@@ -5039,7 +5042,7 @@
             <a:fld id="{27137818-48BE-4108-840E-3B8BFE735C18}" type="datetimeFigureOut">
               <a:rPr lang="id-ID" smtClean="0"/>
               <a:pPr/>
-              <a:t>02/09/2014</a:t>
+              <a:t>08/09/2014</a:t>
             </a:fld>
             <a:endParaRPr lang="id-ID"/>
           </a:p>
@@ -5313,7 +5316,7 @@
             <a:fld id="{27137818-48BE-4108-840E-3B8BFE735C18}" type="datetimeFigureOut">
               <a:rPr lang="id-ID" smtClean="0"/>
               <a:pPr/>
-              <a:t>02/09/2014</a:t>
+              <a:t>08/09/2014</a:t>
             </a:fld>
             <a:endParaRPr lang="id-ID"/>
           </a:p>
@@ -5563,7 +5566,7 @@
             <a:fld id="{27137818-48BE-4108-840E-3B8BFE735C18}" type="datetimeFigureOut">
               <a:rPr lang="id-ID" smtClean="0"/>
               <a:pPr/>
-              <a:t>02/09/2014</a:t>
+              <a:t>08/09/2014</a:t>
             </a:fld>
             <a:endParaRPr lang="id-ID"/>
           </a:p>
@@ -5836,7 +5839,7 @@
             <a:fld id="{27137818-48BE-4108-840E-3B8BFE735C18}" type="datetimeFigureOut">
               <a:rPr lang="id-ID" smtClean="0"/>
               <a:pPr/>
-              <a:t>02/09/2014</a:t>
+              <a:t>08/09/2014</a:t>
             </a:fld>
             <a:endParaRPr lang="id-ID"/>
           </a:p>
@@ -7225,20 +7228,13 @@
         <p:spPr/>
         <p:txBody>
           <a:bodyPr>
-            <a:normAutofit fontScale="90000"/>
+            <a:normAutofit/>
           </a:bodyPr>
           <a:lstStyle/>
           <a:p>
             <a:r>
               <a:rPr lang="id-ID" smtClean="0"/>
-              <a:t>Pemberian Nilai Variable Pada Python</a:t>
-            </a:r>
-            <a:br>
-              <a:rPr lang="id-ID" smtClean="0"/>
-            </a:br>
-            <a:r>
-              <a:rPr lang="id-ID" smtClean="0"/>
-              <a:t>(Assignment)</a:t>
+              <a:t>Definisi Variabel Pada Python</a:t>
             </a:r>
             <a:endParaRPr lang="id-ID"/>
           </a:p>
@@ -7268,7 +7264,7 @@
       </p:sp>
       <p:pic>
         <p:nvPicPr>
-          <p:cNvPr id="1026" name="Picture 2"/>
+          <p:cNvPr id="4" name="Picture 2"/>
           <p:cNvPicPr>
             <a:picLocks noChangeAspect="1" noChangeArrowheads="1"/>
           </p:cNvPicPr>
@@ -7283,25 +7279,27 @@
         </p:blipFill>
         <p:spPr bwMode="auto">
           <a:xfrm>
-            <a:off x="3048000" y="2209800"/>
-            <a:ext cx="3314700" cy="762000"/>
+            <a:off x="2057400" y="1676400"/>
+            <a:ext cx="4810125" cy="1362075"/>
           </a:xfrm>
           <a:prstGeom prst="rect">
             <a:avLst/>
           </a:prstGeom>
-          <a:noFill/>
-          <a:ln w="9525">
+          <a:ln>
             <a:noFill/>
-            <a:miter lim="800000"/>
-            <a:headEnd/>
-            <a:tailEnd/>
           </a:ln>
-          <a:effectLst/>
+          <a:effectLst>
+            <a:outerShdw blurRad="292100" dist="139700" dir="2700000" algn="tl" rotWithShape="0">
+              <a:srgbClr val="333333">
+                <a:alpha val="65000"/>
+              </a:srgbClr>
+            </a:outerShdw>
+          </a:effectLst>
         </p:spPr>
       </p:pic>
       <p:pic>
         <p:nvPicPr>
-          <p:cNvPr id="1027" name="Picture 3"/>
+          <p:cNvPr id="5" name="Picture 3"/>
           <p:cNvPicPr>
             <a:picLocks noChangeAspect="1" noChangeArrowheads="1"/>
           </p:cNvPicPr>
@@ -7316,20 +7314,22 @@
         </p:blipFill>
         <p:spPr bwMode="auto">
           <a:xfrm>
-            <a:off x="1143000" y="3200400"/>
-            <a:ext cx="6583363" cy="1676400"/>
+            <a:off x="1219200" y="3352800"/>
+            <a:ext cx="6581775" cy="2276475"/>
           </a:xfrm>
           <a:prstGeom prst="rect">
             <a:avLst/>
           </a:prstGeom>
-          <a:noFill/>
-          <a:ln w="9525">
+          <a:ln>
             <a:noFill/>
-            <a:miter lim="800000"/>
-            <a:headEnd/>
-            <a:tailEnd/>
           </a:ln>
-          <a:effectLst/>
+          <a:effectLst>
+            <a:outerShdw blurRad="292100" dist="139700" dir="2700000" algn="tl" rotWithShape="0">
+              <a:srgbClr val="333333">
+                <a:alpha val="65000"/>
+              </a:srgbClr>
+            </a:outerShdw>
+          </a:effectLst>
         </p:spPr>
       </p:pic>
     </p:spTree>
@@ -10693,22 +10693,14 @@
         </p:nvSpPr>
         <p:spPr/>
         <p:txBody>
-          <a:bodyPr>
-            <a:normAutofit fontScale="90000"/>
-          </a:bodyPr>
+          <a:bodyPr/>
           <a:lstStyle/>
           <a:p>
             <a:r>
-              <a:rPr lang="id-ID" smtClean="0">
-                <a:latin typeface="Times New Roman" pitchFamily="18" charset="0"/>
-                <a:cs typeface="Times New Roman" pitchFamily="18" charset="0"/>
-              </a:rPr>
-              <a:t>Gaya Input pada Pemrograman Normal</a:t>
-            </a:r>
-            <a:endParaRPr lang="id-ID">
-              <a:latin typeface="Times New Roman" pitchFamily="18" charset="0"/>
-              <a:cs typeface="Times New Roman" pitchFamily="18" charset="0"/>
-            </a:endParaRPr>
+              <a:rPr lang="id-ID" smtClean="0"/>
+              <a:t>Notasi Algoritma</a:t>
+            </a:r>
+            <a:endParaRPr lang="id-ID"/>
           </a:p>
         </p:txBody>
       </p:sp>
@@ -10727,69 +10719,55 @@
           <a:bodyPr/>
           <a:lstStyle/>
           <a:p>
-            <a:r>
-              <a:rPr lang="id-ID" smtClean="0">
-                <a:latin typeface="Times New Roman" pitchFamily="18" charset="0"/>
-                <a:cs typeface="Times New Roman" pitchFamily="18" charset="0"/>
-              </a:rPr>
-              <a:t>Menghitung Luas Persegi Panjang</a:t>
-            </a:r>
-          </a:p>
-          <a:p>
-            <a:r>
-              <a:rPr lang="id-ID" smtClean="0">
-                <a:latin typeface="Times New Roman" pitchFamily="18" charset="0"/>
-                <a:cs typeface="Times New Roman" pitchFamily="18" charset="0"/>
-              </a:rPr>
-              <a:t>Menghitung Luas Lingkaran</a:t>
-            </a:r>
-          </a:p>
-          <a:p>
-            <a:r>
-              <a:rPr lang="id-ID" smtClean="0">
-                <a:latin typeface="Times New Roman" pitchFamily="18" charset="0"/>
-                <a:cs typeface="Times New Roman" pitchFamily="18" charset="0"/>
-              </a:rPr>
-              <a:t>Konversi Suhu</a:t>
-            </a:r>
-          </a:p>
-          <a:p>
-            <a:r>
-              <a:rPr lang="id-ID" smtClean="0">
-                <a:latin typeface="Times New Roman" pitchFamily="18" charset="0"/>
-                <a:cs typeface="Times New Roman" pitchFamily="18" charset="0"/>
-              </a:rPr>
-              <a:t>Mencari titik tengah dari 2 buah titik</a:t>
-            </a:r>
-          </a:p>
-          <a:p>
-            <a:r>
-              <a:rPr lang="id-ID" smtClean="0">
-                <a:latin typeface="Times New Roman" pitchFamily="18" charset="0"/>
-                <a:cs typeface="Times New Roman" pitchFamily="18" charset="0"/>
-              </a:rPr>
-              <a:t>Detik ke Menit</a:t>
-            </a:r>
-          </a:p>
-          <a:p>
-            <a:endParaRPr lang="id-ID" smtClean="0">
-              <a:latin typeface="Times New Roman" pitchFamily="18" charset="0"/>
-              <a:cs typeface="Times New Roman" pitchFamily="18" charset="0"/>
-            </a:endParaRPr>
-          </a:p>
-          <a:p>
-            <a:endParaRPr lang="id-ID">
-              <a:latin typeface="Times New Roman" pitchFamily="18" charset="0"/>
-              <a:cs typeface="Times New Roman" pitchFamily="18" charset="0"/>
-            </a:endParaRPr>
+            <a:endParaRPr lang="id-ID"/>
           </a:p>
         </p:txBody>
       </p:sp>
+      <p:pic>
+        <p:nvPicPr>
+          <p:cNvPr id="2051" name="Picture 3"/>
+          <p:cNvPicPr>
+            <a:picLocks noChangeAspect="1" noChangeArrowheads="1"/>
+          </p:cNvPicPr>
+          <p:nvPr/>
+        </p:nvPicPr>
+        <p:blipFill>
+          <a:blip r:embed="rId2"/>
+          <a:srcRect/>
+          <a:stretch>
+            <a:fillRect/>
+          </a:stretch>
+        </p:blipFill>
+        <p:spPr bwMode="auto">
+          <a:xfrm>
+            <a:off x="1752600" y="1371600"/>
+            <a:ext cx="5791200" cy="5000625"/>
+          </a:xfrm>
+          <a:prstGeom prst="rect">
+            <a:avLst/>
+          </a:prstGeom>
+          <a:noFill/>
+          <a:ln w="9525">
+            <a:noFill/>
+            <a:miter lim="800000"/>
+            <a:headEnd/>
+            <a:tailEnd/>
+          </a:ln>
+          <a:effectLst/>
+        </p:spPr>
+      </p:pic>
     </p:spTree>
   </p:cSld>
   <p:clrMapOvr>
     <a:masterClrMapping/>
   </p:clrMapOvr>
+  <p:timing>
+    <p:tnLst>
+      <p:par>
+        <p:cTn id="1" dur="indefinite" restart="never" nodeType="tmRoot"/>
+      </p:par>
+    </p:tnLst>
+  </p:timing>
 </p:sld>
 </file>
 
@@ -11486,22 +11464,10 @@
         </p:nvSpPr>
         <p:spPr/>
         <p:txBody>
-          <a:bodyPr>
-            <a:normAutofit fontScale="90000"/>
-          </a:bodyPr>
+          <a:bodyPr/>
           <a:lstStyle/>
           <a:p>
-            <a:r>
-              <a:rPr lang="id-ID" smtClean="0">
-                <a:latin typeface="Times New Roman" pitchFamily="18" charset="0"/>
-                <a:cs typeface="Times New Roman" pitchFamily="18" charset="0"/>
-              </a:rPr>
-              <a:t>Gaya Input pada Kontes Pemrograman</a:t>
-            </a:r>
-            <a:endParaRPr lang="id-ID">
-              <a:latin typeface="Times New Roman" pitchFamily="18" charset="0"/>
-              <a:cs typeface="Times New Roman" pitchFamily="18" charset="0"/>
-            </a:endParaRPr>
+            <a:endParaRPr lang="id-ID"/>
           </a:p>
         </p:txBody>
       </p:sp>
@@ -11520,11 +11486,219 @@
           <a:bodyPr/>
           <a:lstStyle/>
           <a:p>
+            <a:endParaRPr lang="id-ID"/>
+          </a:p>
+        </p:txBody>
+      </p:sp>
+      <p:pic>
+        <p:nvPicPr>
+          <p:cNvPr id="3074" name="Picture 2"/>
+          <p:cNvPicPr>
+            <a:picLocks noChangeAspect="1" noChangeArrowheads="1"/>
+          </p:cNvPicPr>
+          <p:nvPr/>
+        </p:nvPicPr>
+        <p:blipFill>
+          <a:blip r:embed="rId2"/>
+          <a:srcRect b="47208"/>
+          <a:stretch>
+            <a:fillRect/>
+          </a:stretch>
+        </p:blipFill>
+        <p:spPr bwMode="auto">
+          <a:xfrm>
+            <a:off x="609600" y="457200"/>
+            <a:ext cx="8001000" cy="5943600"/>
+          </a:xfrm>
+          <a:prstGeom prst="rect">
+            <a:avLst/>
+          </a:prstGeom>
+          <a:ln>
+            <a:noFill/>
+          </a:ln>
+          <a:effectLst>
+            <a:outerShdw blurRad="292100" dist="139700" dir="2700000" algn="tl" rotWithShape="0">
+              <a:srgbClr val="333333">
+                <a:alpha val="65000"/>
+              </a:srgbClr>
+            </a:outerShdw>
+          </a:effectLst>
+        </p:spPr>
+      </p:pic>
+    </p:spTree>
+  </p:cSld>
+  <p:clrMapOvr>
+    <a:masterClrMapping/>
+  </p:clrMapOvr>
+</p:sld>
+</file>
+
+<file path=ppt/slides/slide31.xml><?xml version="1.0" encoding="utf-8"?>
+<p:sld xmlns:a="http://schemas.openxmlformats.org/drawingml/2006/main" xmlns:r="http://schemas.openxmlformats.org/officeDocument/2006/relationships" xmlns:p="http://schemas.openxmlformats.org/presentationml/2006/main">
+  <p:cSld>
+    <p:spTree>
+      <p:nvGrpSpPr>
+        <p:cNvPr id="1" name=""/>
+        <p:cNvGrpSpPr/>
+        <p:nvPr/>
+      </p:nvGrpSpPr>
+      <p:grpSpPr>
+        <a:xfrm>
+          <a:off x="0" y="0"/>
+          <a:ext cx="0" cy="0"/>
+          <a:chOff x="0" y="0"/>
+          <a:chExt cx="0" cy="0"/>
+        </a:xfrm>
+      </p:grpSpPr>
+      <p:sp>
+        <p:nvSpPr>
+          <p:cNvPr id="2" name="Title 1"/>
+          <p:cNvSpPr>
+            <a:spLocks noGrp="1"/>
+          </p:cNvSpPr>
+          <p:nvPr>
+            <p:ph type="title"/>
+          </p:nvPr>
+        </p:nvSpPr>
+        <p:spPr/>
+        <p:txBody>
+          <a:bodyPr/>
+          <a:lstStyle/>
+          <a:p>
+            <a:endParaRPr lang="id-ID"/>
+          </a:p>
+        </p:txBody>
+      </p:sp>
+      <p:sp>
+        <p:nvSpPr>
+          <p:cNvPr id="3" name="Content Placeholder 2"/>
+          <p:cNvSpPr>
+            <a:spLocks noGrp="1"/>
+          </p:cNvSpPr>
+          <p:nvPr>
+            <p:ph idx="1"/>
+          </p:nvPr>
+        </p:nvSpPr>
+        <p:spPr/>
+        <p:txBody>
+          <a:bodyPr/>
+          <a:lstStyle/>
+          <a:p>
+            <a:endParaRPr lang="id-ID"/>
+          </a:p>
+        </p:txBody>
+      </p:sp>
+      <p:pic>
+        <p:nvPicPr>
+          <p:cNvPr id="4" name="Picture 2"/>
+          <p:cNvPicPr>
+            <a:picLocks noChangeAspect="1" noChangeArrowheads="1"/>
+          </p:cNvPicPr>
+          <p:nvPr/>
+        </p:nvPicPr>
+        <p:blipFill>
+          <a:blip r:embed="rId2"/>
+          <a:srcRect t="51438"/>
+          <a:stretch>
+            <a:fillRect/>
+          </a:stretch>
+        </p:blipFill>
+        <p:spPr bwMode="auto">
+          <a:xfrm>
+            <a:off x="609600" y="990600"/>
+            <a:ext cx="8001000" cy="5467350"/>
+          </a:xfrm>
+          <a:prstGeom prst="rect">
+            <a:avLst/>
+          </a:prstGeom>
+          <a:ln>
+            <a:noFill/>
+          </a:ln>
+          <a:effectLst>
+            <a:outerShdw blurRad="292100" dist="139700" dir="2700000" algn="tl" rotWithShape="0">
+              <a:srgbClr val="333333">
+                <a:alpha val="65000"/>
+              </a:srgbClr>
+            </a:outerShdw>
+          </a:effectLst>
+        </p:spPr>
+      </p:pic>
+    </p:spTree>
+  </p:cSld>
+  <p:clrMapOvr>
+    <a:masterClrMapping/>
+  </p:clrMapOvr>
+</p:sld>
+</file>
+
+<file path=ppt/slides/slide32.xml><?xml version="1.0" encoding="utf-8"?>
+<p:sld xmlns:a="http://schemas.openxmlformats.org/drawingml/2006/main" xmlns:r="http://schemas.openxmlformats.org/officeDocument/2006/relationships" xmlns:p="http://schemas.openxmlformats.org/presentationml/2006/main" show="0">
+  <p:cSld>
+    <p:spTree>
+      <p:nvGrpSpPr>
+        <p:cNvPr id="1" name=""/>
+        <p:cNvGrpSpPr/>
+        <p:nvPr/>
+      </p:nvGrpSpPr>
+      <p:grpSpPr>
+        <a:xfrm>
+          <a:off x="0" y="0"/>
+          <a:ext cx="0" cy="0"/>
+          <a:chOff x="0" y="0"/>
+          <a:chExt cx="0" cy="0"/>
+        </a:xfrm>
+      </p:grpSpPr>
+      <p:sp>
+        <p:nvSpPr>
+          <p:cNvPr id="2" name="Title 1"/>
+          <p:cNvSpPr>
+            <a:spLocks noGrp="1"/>
+          </p:cNvSpPr>
+          <p:nvPr>
+            <p:ph type="title"/>
+          </p:nvPr>
+        </p:nvSpPr>
+        <p:spPr/>
+        <p:txBody>
+          <a:bodyPr>
+            <a:normAutofit fontScale="90000"/>
+          </a:bodyPr>
+          <a:lstStyle/>
+          <a:p>
             <a:r>
               <a:rPr lang="id-ID" smtClean="0">
                 <a:latin typeface="Times New Roman" pitchFamily="18" charset="0"/>
                 <a:cs typeface="Times New Roman" pitchFamily="18" charset="0"/>
               </a:rPr>
+              <a:t>Gaya Input pada Pemrograman Normal</a:t>
+            </a:r>
+            <a:endParaRPr lang="id-ID">
+              <a:latin typeface="Times New Roman" pitchFamily="18" charset="0"/>
+              <a:cs typeface="Times New Roman" pitchFamily="18" charset="0"/>
+            </a:endParaRPr>
+          </a:p>
+        </p:txBody>
+      </p:sp>
+      <p:sp>
+        <p:nvSpPr>
+          <p:cNvPr id="3" name="Content Placeholder 2"/>
+          <p:cNvSpPr>
+            <a:spLocks noGrp="1"/>
+          </p:cNvSpPr>
+          <p:nvPr>
+            <p:ph idx="1"/>
+          </p:nvPr>
+        </p:nvSpPr>
+        <p:spPr/>
+        <p:txBody>
+          <a:bodyPr/>
+          <a:lstStyle/>
+          <a:p>
+            <a:r>
+              <a:rPr lang="id-ID" smtClean="0">
+                <a:latin typeface="Times New Roman" pitchFamily="18" charset="0"/>
+                <a:cs typeface="Times New Roman" pitchFamily="18" charset="0"/>
+              </a:rPr>
               <a:t>Menghitung Luas Persegi Panjang</a:t>
             </a:r>
           </a:p>
@@ -11563,6 +11737,12 @@
               </a:rPr>
               <a:t>Detik ke Menit</a:t>
             </a:r>
+          </a:p>
+          <a:p>
+            <a:endParaRPr lang="id-ID" smtClean="0">
+              <a:latin typeface="Times New Roman" pitchFamily="18" charset="0"/>
+              <a:cs typeface="Times New Roman" pitchFamily="18" charset="0"/>
+            </a:endParaRPr>
           </a:p>
           <a:p>
             <a:endParaRPr lang="id-ID">
@@ -11577,6 +11757,7 @@
   <p:clrMapOvr>
     <a:masterClrMapping/>
   </p:clrMapOvr>
+  <p:transition/>
   <p:timing>
     <p:tnLst>
       <p:par>
@@ -11587,7 +11768,138 @@
 </p:sld>
 </file>
 
-<file path=ppt/slides/slide31.xml><?xml version="1.0" encoding="utf-8"?>
+<file path=ppt/slides/slide33.xml><?xml version="1.0" encoding="utf-8"?>
+<p:sld xmlns:a="http://schemas.openxmlformats.org/drawingml/2006/main" xmlns:r="http://schemas.openxmlformats.org/officeDocument/2006/relationships" xmlns:p="http://schemas.openxmlformats.org/presentationml/2006/main" show="0">
+  <p:cSld>
+    <p:spTree>
+      <p:nvGrpSpPr>
+        <p:cNvPr id="1" name=""/>
+        <p:cNvGrpSpPr/>
+        <p:nvPr/>
+      </p:nvGrpSpPr>
+      <p:grpSpPr>
+        <a:xfrm>
+          <a:off x="0" y="0"/>
+          <a:ext cx="0" cy="0"/>
+          <a:chOff x="0" y="0"/>
+          <a:chExt cx="0" cy="0"/>
+        </a:xfrm>
+      </p:grpSpPr>
+      <p:sp>
+        <p:nvSpPr>
+          <p:cNvPr id="2" name="Title 1"/>
+          <p:cNvSpPr>
+            <a:spLocks noGrp="1"/>
+          </p:cNvSpPr>
+          <p:nvPr>
+            <p:ph type="title"/>
+          </p:nvPr>
+        </p:nvSpPr>
+        <p:spPr/>
+        <p:txBody>
+          <a:bodyPr>
+            <a:normAutofit fontScale="90000"/>
+          </a:bodyPr>
+          <a:lstStyle/>
+          <a:p>
+            <a:r>
+              <a:rPr lang="id-ID" smtClean="0">
+                <a:latin typeface="Times New Roman" pitchFamily="18" charset="0"/>
+                <a:cs typeface="Times New Roman" pitchFamily="18" charset="0"/>
+              </a:rPr>
+              <a:t>Gaya Input pada Kontes Pemrograman</a:t>
+            </a:r>
+            <a:endParaRPr lang="id-ID">
+              <a:latin typeface="Times New Roman" pitchFamily="18" charset="0"/>
+              <a:cs typeface="Times New Roman" pitchFamily="18" charset="0"/>
+            </a:endParaRPr>
+          </a:p>
+        </p:txBody>
+      </p:sp>
+      <p:sp>
+        <p:nvSpPr>
+          <p:cNvPr id="3" name="Content Placeholder 2"/>
+          <p:cNvSpPr>
+            <a:spLocks noGrp="1"/>
+          </p:cNvSpPr>
+          <p:nvPr>
+            <p:ph idx="1"/>
+          </p:nvPr>
+        </p:nvSpPr>
+        <p:spPr/>
+        <p:txBody>
+          <a:bodyPr/>
+          <a:lstStyle/>
+          <a:p>
+            <a:r>
+              <a:rPr lang="id-ID" smtClean="0">
+                <a:latin typeface="Times New Roman" pitchFamily="18" charset="0"/>
+                <a:cs typeface="Times New Roman" pitchFamily="18" charset="0"/>
+              </a:rPr>
+              <a:t>Menghitung Luas Persegi Panjang</a:t>
+            </a:r>
+          </a:p>
+          <a:p>
+            <a:r>
+              <a:rPr lang="id-ID" smtClean="0">
+                <a:latin typeface="Times New Roman" pitchFamily="18" charset="0"/>
+                <a:cs typeface="Times New Roman" pitchFamily="18" charset="0"/>
+              </a:rPr>
+              <a:t>Menghitung Luas Lingkaran</a:t>
+            </a:r>
+          </a:p>
+          <a:p>
+            <a:r>
+              <a:rPr lang="id-ID" smtClean="0">
+                <a:latin typeface="Times New Roman" pitchFamily="18" charset="0"/>
+                <a:cs typeface="Times New Roman" pitchFamily="18" charset="0"/>
+              </a:rPr>
+              <a:t>Konversi Suhu</a:t>
+            </a:r>
+          </a:p>
+          <a:p>
+            <a:r>
+              <a:rPr lang="id-ID" smtClean="0">
+                <a:latin typeface="Times New Roman" pitchFamily="18" charset="0"/>
+                <a:cs typeface="Times New Roman" pitchFamily="18" charset="0"/>
+              </a:rPr>
+              <a:t>Mencari titik tengah dari 2 buah titik</a:t>
+            </a:r>
+          </a:p>
+          <a:p>
+            <a:r>
+              <a:rPr lang="id-ID" smtClean="0">
+                <a:latin typeface="Times New Roman" pitchFamily="18" charset="0"/>
+                <a:cs typeface="Times New Roman" pitchFamily="18" charset="0"/>
+              </a:rPr>
+              <a:t>Detik ke Menit</a:t>
+            </a:r>
+          </a:p>
+          <a:p>
+            <a:endParaRPr lang="id-ID">
+              <a:latin typeface="Times New Roman" pitchFamily="18" charset="0"/>
+              <a:cs typeface="Times New Roman" pitchFamily="18" charset="0"/>
+            </a:endParaRPr>
+          </a:p>
+        </p:txBody>
+      </p:sp>
+    </p:spTree>
+  </p:cSld>
+  <p:clrMapOvr>
+    <a:masterClrMapping/>
+  </p:clrMapOvr>
+  <p:transition/>
+  <p:timing>
+    <p:tnLst>
+      <p:par>
+        <p:cTn id="1" dur="indefinite" restart="never" nodeType="tmRoot"/>
+      </p:par>
+    </p:tnLst>
+  </p:timing>
+</p:sld>
+</file>
+
+<file path=ppt/slides/slide34.xml><?xml version="1.0" encoding="utf-8"?>
 <p:sld xmlns:a="http://schemas.openxmlformats.org/drawingml/2006/main" xmlns:r="http://schemas.openxmlformats.org/officeDocument/2006/relationships" xmlns:p="http://schemas.openxmlformats.org/presentationml/2006/main">
   <p:cSld>
     <p:spTree>

</xml_diff>